<commit_message>
Add charts to modernization report.
</commit_message>
<xml_diff>
--- a/report-generator/src/report_generator/presets/templates/modernization.pptx
+++ b/report-generator/src/report_generator/presets/templates/modernization.pptx
@@ -5,17 +5,19 @@
     <p:sldMasterId id="2147483648" r:id="rId4"/>
   </p:sldMasterIdLst>
   <p:notesMasterIdLst>
-    <p:notesMasterId r:id="rId10"/>
+    <p:notesMasterId r:id="rId12"/>
   </p:notesMasterIdLst>
   <p:handoutMasterIdLst>
-    <p:handoutMasterId r:id="rId11"/>
+    <p:handoutMasterId r:id="rId13"/>
   </p:handoutMasterIdLst>
   <p:sldIdLst>
     <p:sldId id="561" r:id="rId5"/>
     <p:sldId id="1547" r:id="rId6"/>
     <p:sldId id="1507" r:id="rId7"/>
     <p:sldId id="1763" r:id="rId8"/>
-    <p:sldId id="597" r:id="rId9"/>
+    <p:sldId id="1764" r:id="rId9"/>
+    <p:sldId id="1765" r:id="rId10"/>
+    <p:sldId id="597" r:id="rId11"/>
   </p:sldIdLst>
   <p:sldSz cx="12192000" cy="6858000"/>
   <p:notesSz cx="6858000" cy="9144000"/>
@@ -126,6 +128,8 @@
             <p14:sldId id="1547"/>
             <p14:sldId id="1507"/>
             <p14:sldId id="1763"/>
+            <p14:sldId id="1764"/>
+            <p14:sldId id="1765"/>
           </p14:sldIdLst>
         </p14:section>
         <p14:section name="Back matter" id="{3FD0872C-192F-5B46-895B-A626D88A1562}">
@@ -168,6 +172,1788 @@
     <p1510:client id="{A32094BA-3324-E44C-AFE3-01F0E8F31A48}" v="69" dt="2024-01-12T19:24:27.556"/>
   </p1510:revLst>
 </p1510:revInfo>
+</file>
+
+<file path=ppt/charts/chart1.xml><?xml version="1.0" encoding="utf-8"?>
+<c:chartSpace xmlns:c="http://schemas.openxmlformats.org/drawingml/2006/chart" xmlns:a="http://schemas.openxmlformats.org/drawingml/2006/main" xmlns:r="http://schemas.openxmlformats.org/officeDocument/2006/relationships" xmlns:c16r2="http://schemas.microsoft.com/office/drawing/2015/06/chart">
+  <c:date1904 val="0"/>
+  <c:lang val="en-US"/>
+  <c:roundedCorners val="0"/>
+  <mc:AlternateContent xmlns:mc="http://schemas.openxmlformats.org/markup-compatibility/2006">
+    <mc:Choice xmlns:c14="http://schemas.microsoft.com/office/drawing/2007/8/2/chart" Requires="c14">
+      <c14:style val="104"/>
+    </mc:Choice>
+    <mc:Fallback>
+      <c:style val="4"/>
+    </mc:Fallback>
+  </mc:AlternateContent>
+  <c:chart>
+    <c:autoTitleDeleted val="1"/>
+    <c:plotArea>
+      <c:layout/>
+      <c:barChart>
+        <c:barDir val="bar"/>
+        <c:grouping val="stacked"/>
+        <c:varyColors val="0"/>
+        <c:ser>
+          <c:idx val="0"/>
+          <c:order val="0"/>
+          <c:tx>
+            <c:strRef>
+              <c:f>Sheet1!$B$1</c:f>
+              <c:strCache>
+                <c:ptCount val="1"/>
+                <c:pt idx="0">
+                  <c:v>Technical debt</c:v>
+                </c:pt>
+              </c:strCache>
+            </c:strRef>
+          </c:tx>
+          <c:spPr>
+            <a:solidFill>
+              <a:srgbClr val="E17526"/>
+            </a:solidFill>
+            <a:ln w="19050">
+              <a:noFill/>
+            </a:ln>
+            <a:effectLst>
+              <a:outerShdw blurRad="241300" dist="38100" dir="2700000" algn="tl" rotWithShape="0">
+                <a:prstClr val="black">
+                  <a:alpha val="15000"/>
+                </a:prstClr>
+              </a:outerShdw>
+            </a:effectLst>
+          </c:spPr>
+          <c:invertIfNegative val="0"/>
+          <c:dPt>
+            <c:idx val="0"/>
+            <c:invertIfNegative val="0"/>
+            <c:bubble3D val="0"/>
+            <c:explosion val="6"/>
+            <c:spPr>
+              <a:solidFill>
+                <a:srgbClr val="E17526"/>
+              </a:solidFill>
+              <a:ln w="19050">
+                <a:noFill/>
+              </a:ln>
+              <a:effectLst>
+                <a:outerShdw blurRad="241300" dist="38100" dir="2700000" algn="tl" rotWithShape="0">
+                  <a:prstClr val="black">
+                    <a:alpha val="15000"/>
+                  </a:prstClr>
+                </a:outerShdw>
+              </a:effectLst>
+            </c:spPr>
+            <c:extLst xmlns:w="http://schemas.openxmlformats.org/wordprocessingml/2006/main" xmlns:w15="http://schemas.microsoft.com/office/word/2012/wordml" xmlns:w14="http://schemas.microsoft.com/office/word/2010/wordml" xmlns:m="http://schemas.openxmlformats.org/officeDocument/2006/math" xmlns:wp="http://schemas.openxmlformats.org/drawingml/2006/wordprocessingDrawing" xmlns:wp14="http://schemas.microsoft.com/office/word/2010/wordprocessingDrawing" xmlns:mc="http://schemas.openxmlformats.org/markup-compatibility/2006" xmlns:sl="http://schemas.openxmlformats.org/schemaLibrary/2006/main" xmlns:wne="http://schemas.microsoft.com/office/word/2006/wordml" xmlns:cdr="http://schemas.openxmlformats.org/drawingml/2006/chartDrawing" xmlns:c14="http://schemas.microsoft.com/office/drawing/2007/8/2/chart" xmlns:dgm="http://schemas.openxmlformats.org/drawingml/2006/diagram" xmlns:pic="http://schemas.openxmlformats.org/drawingml/2006/picture" xmlns:xdr="http://schemas.openxmlformats.org/drawingml/2006/spreadsheetDrawing" xmlns:dsp="http://schemas.microsoft.com/office/drawing/2008/diagram" xmlns:xvml="urn:schemas-microsoft-com:office:excel" xmlns:o="urn:schemas-microsoft-com:office:office" xmlns:v="urn:schemas-microsoft-com:vml" xmlns:w10="urn:schemas-microsoft-com:office:word" xmlns:pvml="urn:schemas-microsoft-com:office:powerpoint" xmlns:cppr="http://schemas.microsoft.com/office/2006/coverPageProps" xmlns:odx="http://opendope.org/xpaths" xmlns:odc="http://opendope.org/conditions" xmlns:odq="http://opendope.org/questions" xmlns:oda="http://opendope.org/answers" xmlns:odi="http://opendope.org/components" xmlns:odgm="http://opendope.org/SmartArt/DataHierarchy" xmlns:b="http://schemas.openxmlformats.org/officeDocument/2006/bibliography" xmlns:wps="http://schemas.microsoft.com/office/word/2010/wordprocessingShape" xmlns:w16se="http://schemas.microsoft.com/office/word/2015/wordml/symex" xmlns:w16cid="http://schemas.microsoft.com/office/word/2016/wordml/cid" xmlns:wetp="http://schemas.microsoft.com/office/webextensions/taskpanes/2010/11" xmlns:we="http://schemas.microsoft.com/office/webextensions/webextension/2010/11" xmlns:comp="http://schemas.openxmlformats.org/drawingml/2006/compatibility" xmlns:lc="http://schemas.openxmlformats.org/drawingml/2006/lockedCanvas">
+              <c:ext xmlns:c16="http://schemas.microsoft.com/office/drawing/2014/chart" uri="{C3380CC4-5D6E-409C-BE32-E72D297353CC}">
+                <c16:uniqueId val="{00000001-8D46-3D4B-996A-4B880DC4E095}"/>
+              </c:ext>
+            </c:extLst>
+          </c:dPt>
+          <c:cat>
+            <c:strRef>
+              <c:f>Sheet1!$A$2:$A$11</c:f>
+              <c:strCache>
+                <c:ptCount val="10"/>
+                <c:pt idx="0">
+                  <c:v>System 1 has a very long name</c:v>
+                </c:pt>
+                <c:pt idx="1">
+                  <c:v>System 2</c:v>
+                </c:pt>
+                <c:pt idx="2">
+                  <c:v>System 3</c:v>
+                </c:pt>
+                <c:pt idx="3">
+                  <c:v>System 4</c:v>
+                </c:pt>
+                <c:pt idx="4">
+                  <c:v>System 5</c:v>
+                </c:pt>
+                <c:pt idx="5">
+                  <c:v>System 6</c:v>
+                </c:pt>
+                <c:pt idx="6">
+                  <c:v>System 7</c:v>
+                </c:pt>
+                <c:pt idx="7">
+                  <c:v>System 8</c:v>
+                </c:pt>
+                <c:pt idx="8">
+                  <c:v>System 9</c:v>
+                </c:pt>
+                <c:pt idx="9">
+                  <c:v>System 10</c:v>
+                </c:pt>
+              </c:strCache>
+            </c:strRef>
+          </c:cat>
+          <c:val>
+            <c:numRef>
+              <c:f>Sheet1!$B$2:$B$11</c:f>
+              <c:numCache>
+                <c:formatCode>0.0</c:formatCode>
+                <c:ptCount val="10"/>
+                <c:pt idx="0">
+                  <c:v>100</c:v>
+                </c:pt>
+                <c:pt idx="1">
+                  <c:v>80</c:v>
+                </c:pt>
+                <c:pt idx="2">
+                  <c:v>70</c:v>
+                </c:pt>
+                <c:pt idx="3">
+                  <c:v>60</c:v>
+                </c:pt>
+                <c:pt idx="4">
+                  <c:v>50</c:v>
+                </c:pt>
+                <c:pt idx="5">
+                  <c:v>40</c:v>
+                </c:pt>
+                <c:pt idx="6">
+                  <c:v>30</c:v>
+                </c:pt>
+                <c:pt idx="7">
+                  <c:v>20</c:v>
+                </c:pt>
+                <c:pt idx="8">
+                  <c:v>10</c:v>
+                </c:pt>
+                <c:pt idx="9">
+                  <c:v>5</c:v>
+                </c:pt>
+              </c:numCache>
+            </c:numRef>
+          </c:val>
+          <c:extLst xmlns:w="http://schemas.openxmlformats.org/wordprocessingml/2006/main" xmlns:w15="http://schemas.microsoft.com/office/word/2012/wordml" xmlns:w14="http://schemas.microsoft.com/office/word/2010/wordml" xmlns:m="http://schemas.openxmlformats.org/officeDocument/2006/math" xmlns:wp="http://schemas.openxmlformats.org/drawingml/2006/wordprocessingDrawing" xmlns:wp14="http://schemas.microsoft.com/office/word/2010/wordprocessingDrawing" xmlns:mc="http://schemas.openxmlformats.org/markup-compatibility/2006" xmlns:sl="http://schemas.openxmlformats.org/schemaLibrary/2006/main" xmlns:wne="http://schemas.microsoft.com/office/word/2006/wordml" xmlns:cdr="http://schemas.openxmlformats.org/drawingml/2006/chartDrawing" xmlns:c14="http://schemas.microsoft.com/office/drawing/2007/8/2/chart" xmlns:dgm="http://schemas.openxmlformats.org/drawingml/2006/diagram" xmlns:pic="http://schemas.openxmlformats.org/drawingml/2006/picture" xmlns:xdr="http://schemas.openxmlformats.org/drawingml/2006/spreadsheetDrawing" xmlns:dsp="http://schemas.microsoft.com/office/drawing/2008/diagram" xmlns:xvml="urn:schemas-microsoft-com:office:excel" xmlns:o="urn:schemas-microsoft-com:office:office" xmlns:v="urn:schemas-microsoft-com:vml" xmlns:w10="urn:schemas-microsoft-com:office:word" xmlns:pvml="urn:schemas-microsoft-com:office:powerpoint" xmlns:cppr="http://schemas.microsoft.com/office/2006/coverPageProps" xmlns:odx="http://opendope.org/xpaths" xmlns:odc="http://opendope.org/conditions" xmlns:odq="http://opendope.org/questions" xmlns:oda="http://opendope.org/answers" xmlns:odi="http://opendope.org/components" xmlns:odgm="http://opendope.org/SmartArt/DataHierarchy" xmlns:b="http://schemas.openxmlformats.org/officeDocument/2006/bibliography" xmlns:wps="http://schemas.microsoft.com/office/word/2010/wordprocessingShape" xmlns:w16se="http://schemas.microsoft.com/office/word/2015/wordml/symex" xmlns:w16cid="http://schemas.microsoft.com/office/word/2016/wordml/cid" xmlns:wetp="http://schemas.microsoft.com/office/webextensions/taskpanes/2010/11" xmlns:we="http://schemas.microsoft.com/office/webextensions/webextension/2010/11" xmlns:comp="http://schemas.openxmlformats.org/drawingml/2006/compatibility" xmlns:lc="http://schemas.openxmlformats.org/drawingml/2006/lockedCanvas">
+            <c:ext xmlns:c16="http://schemas.microsoft.com/office/drawing/2014/chart" uri="{C3380CC4-5D6E-409C-BE32-E72D297353CC}">
+              <c16:uniqueId val="{00000004-8D46-3D4B-996A-4B880DC4E095}"/>
+            </c:ext>
+          </c:extLst>
+        </c:ser>
+        <c:ser>
+          <c:idx val="1"/>
+          <c:order val="1"/>
+          <c:tx>
+            <c:strRef>
+              <c:f>Sheet1!$C$1</c:f>
+              <c:strCache>
+                <c:ptCount val="1"/>
+                <c:pt idx="0">
+                  <c:v>Remaining code volume</c:v>
+                </c:pt>
+              </c:strCache>
+            </c:strRef>
+          </c:tx>
+          <c:spPr>
+            <a:solidFill>
+              <a:srgbClr val="C0CEDA"/>
+            </a:solidFill>
+            <a:ln w="19050">
+              <a:noFill/>
+            </a:ln>
+            <a:effectLst/>
+          </c:spPr>
+          <c:invertIfNegative val="0"/>
+          <c:cat>
+            <c:strRef>
+              <c:f>Sheet1!$A$2:$A$11</c:f>
+              <c:strCache>
+                <c:ptCount val="10"/>
+                <c:pt idx="0">
+                  <c:v>System 1 has a very long name</c:v>
+                </c:pt>
+                <c:pt idx="1">
+                  <c:v>System 2</c:v>
+                </c:pt>
+                <c:pt idx="2">
+                  <c:v>System 3</c:v>
+                </c:pt>
+                <c:pt idx="3">
+                  <c:v>System 4</c:v>
+                </c:pt>
+                <c:pt idx="4">
+                  <c:v>System 5</c:v>
+                </c:pt>
+                <c:pt idx="5">
+                  <c:v>System 6</c:v>
+                </c:pt>
+                <c:pt idx="6">
+                  <c:v>System 7</c:v>
+                </c:pt>
+                <c:pt idx="7">
+                  <c:v>System 8</c:v>
+                </c:pt>
+                <c:pt idx="8">
+                  <c:v>System 9</c:v>
+                </c:pt>
+                <c:pt idx="9">
+                  <c:v>System 10</c:v>
+                </c:pt>
+              </c:strCache>
+            </c:strRef>
+          </c:cat>
+          <c:val>
+            <c:numRef>
+              <c:f>Sheet1!$C$2:$C$11</c:f>
+              <c:numCache>
+                <c:formatCode>0.0</c:formatCode>
+                <c:ptCount val="10"/>
+                <c:pt idx="0">
+                  <c:v>50</c:v>
+                </c:pt>
+                <c:pt idx="1">
+                  <c:v>100</c:v>
+                </c:pt>
+                <c:pt idx="2">
+                  <c:v>50</c:v>
+                </c:pt>
+                <c:pt idx="3">
+                  <c:v>100</c:v>
+                </c:pt>
+                <c:pt idx="4">
+                  <c:v>20</c:v>
+                </c:pt>
+                <c:pt idx="5">
+                  <c:v>30</c:v>
+                </c:pt>
+                <c:pt idx="6">
+                  <c:v>40</c:v>
+                </c:pt>
+                <c:pt idx="7">
+                  <c:v>50</c:v>
+                </c:pt>
+                <c:pt idx="8">
+                  <c:v>30</c:v>
+                </c:pt>
+                <c:pt idx="9">
+                  <c:v>20</c:v>
+                </c:pt>
+              </c:numCache>
+            </c:numRef>
+          </c:val>
+          <c:extLst>
+            <c:ext xmlns:c16="http://schemas.microsoft.com/office/drawing/2014/chart" uri="{C3380CC4-5D6E-409C-BE32-E72D297353CC}">
+              <c16:uniqueId val="{00000005-8D46-3D4B-996A-4B880DC4E095}"/>
+            </c:ext>
+          </c:extLst>
+        </c:ser>
+        <c:dLbls>
+          <c:showLegendKey val="0"/>
+          <c:showVal val="0"/>
+          <c:showCatName val="0"/>
+          <c:showSerName val="0"/>
+          <c:showPercent val="0"/>
+          <c:showBubbleSize val="0"/>
+        </c:dLbls>
+        <c:gapWidth val="20"/>
+        <c:overlap val="100"/>
+        <c:axId val="476387520"/>
+        <c:axId val="477616192"/>
+      </c:barChart>
+      <c:catAx>
+        <c:axId val="476387520"/>
+        <c:scaling>
+          <c:orientation val="maxMin"/>
+        </c:scaling>
+        <c:delete val="0"/>
+        <c:axPos val="l"/>
+        <c:numFmt formatCode="General" sourceLinked="1"/>
+        <c:majorTickMark val="out"/>
+        <c:minorTickMark val="none"/>
+        <c:tickLblPos val="nextTo"/>
+        <c:spPr>
+          <a:noFill/>
+          <a:ln w="9525" cap="flat" cmpd="sng" algn="ctr">
+            <a:solidFill>
+              <a:schemeClr val="tx1">
+                <a:lumMod val="15000"/>
+                <a:lumOff val="85000"/>
+              </a:schemeClr>
+            </a:solidFill>
+            <a:round/>
+          </a:ln>
+          <a:effectLst/>
+        </c:spPr>
+        <c:txPr>
+          <a:bodyPr rot="-60000000" spcFirstLastPara="1" vertOverflow="ellipsis" vert="horz" wrap="square" anchor="ctr" anchorCtr="1"/>
+          <a:lstStyle/>
+          <a:p>
+            <a:pPr>
+              <a:defRPr sz="1400" b="0" i="0" u="none" strike="noStrike" kern="1200" baseline="0">
+                <a:solidFill>
+                  <a:schemeClr val="tx2"/>
+                </a:solidFill>
+                <a:latin typeface="+mn-lt"/>
+                <a:ea typeface="+mn-ea"/>
+                <a:cs typeface="+mn-cs"/>
+              </a:defRPr>
+            </a:pPr>
+            <a:endParaRPr lang="en-NL"/>
+          </a:p>
+        </c:txPr>
+        <c:crossAx val="477616192"/>
+        <c:crosses val="autoZero"/>
+        <c:auto val="1"/>
+        <c:lblAlgn val="ctr"/>
+        <c:lblOffset val="100"/>
+        <c:noMultiLvlLbl val="0"/>
+      </c:catAx>
+      <c:valAx>
+        <c:axId val="477616192"/>
+        <c:scaling>
+          <c:orientation val="minMax"/>
+        </c:scaling>
+        <c:delete val="0"/>
+        <c:axPos val="t"/>
+        <c:majorGridlines>
+          <c:spPr>
+            <a:ln w="9525" cap="flat" cmpd="sng" algn="ctr">
+              <a:solidFill>
+                <a:schemeClr val="tx1">
+                  <a:lumMod val="15000"/>
+                  <a:lumOff val="85000"/>
+                </a:schemeClr>
+              </a:solidFill>
+              <a:round/>
+            </a:ln>
+            <a:effectLst/>
+          </c:spPr>
+        </c:majorGridlines>
+        <c:numFmt formatCode="0" sourceLinked="0"/>
+        <c:majorTickMark val="out"/>
+        <c:minorTickMark val="none"/>
+        <c:tickLblPos val="nextTo"/>
+        <c:spPr>
+          <a:noFill/>
+          <a:ln>
+            <a:noFill/>
+          </a:ln>
+          <a:effectLst/>
+        </c:spPr>
+        <c:txPr>
+          <a:bodyPr rot="-60000000" spcFirstLastPara="1" vertOverflow="ellipsis" vert="horz" wrap="square" anchor="ctr" anchorCtr="1"/>
+          <a:lstStyle/>
+          <a:p>
+            <a:pPr>
+              <a:defRPr sz="1197" b="0" i="0" u="none" strike="noStrike" kern="1200" baseline="0">
+                <a:solidFill>
+                  <a:schemeClr val="tx2"/>
+                </a:solidFill>
+                <a:latin typeface="+mn-lt"/>
+                <a:ea typeface="+mn-ea"/>
+                <a:cs typeface="+mn-cs"/>
+              </a:defRPr>
+            </a:pPr>
+            <a:endParaRPr lang="en-US"/>
+          </a:p>
+        </c:txPr>
+        <c:crossAx val="476387520"/>
+        <c:crosses val="autoZero"/>
+        <c:crossBetween val="between"/>
+      </c:valAx>
+      <c:spPr>
+        <a:solidFill>
+          <a:schemeClr val="bg1"/>
+        </a:solidFill>
+        <a:ln>
+          <a:noFill/>
+        </a:ln>
+        <a:effectLst/>
+      </c:spPr>
+    </c:plotArea>
+    <c:plotVisOnly val="1"/>
+    <c:dispBlanksAs val="gap"/>
+    <c:extLst xmlns:w="http://schemas.openxmlformats.org/wordprocessingml/2006/main" xmlns:w15="http://schemas.microsoft.com/office/word/2012/wordml" xmlns:w14="http://schemas.microsoft.com/office/word/2010/wordml" xmlns:m="http://schemas.openxmlformats.org/officeDocument/2006/math" xmlns:wp="http://schemas.openxmlformats.org/drawingml/2006/wordprocessingDrawing" xmlns:wp14="http://schemas.microsoft.com/office/word/2010/wordprocessingDrawing" xmlns:mc="http://schemas.openxmlformats.org/markup-compatibility/2006" xmlns:sl="http://schemas.openxmlformats.org/schemaLibrary/2006/main" xmlns:wne="http://schemas.microsoft.com/office/word/2006/wordml" xmlns:cdr="http://schemas.openxmlformats.org/drawingml/2006/chartDrawing" xmlns:c14="http://schemas.microsoft.com/office/drawing/2007/8/2/chart" xmlns:dgm="http://schemas.openxmlformats.org/drawingml/2006/diagram" xmlns:pic="http://schemas.openxmlformats.org/drawingml/2006/picture" xmlns:xdr="http://schemas.openxmlformats.org/drawingml/2006/spreadsheetDrawing" xmlns:dsp="http://schemas.microsoft.com/office/drawing/2008/diagram" xmlns:xvml="urn:schemas-microsoft-com:office:excel" xmlns:o="urn:schemas-microsoft-com:office:office" xmlns:v="urn:schemas-microsoft-com:vml" xmlns:w10="urn:schemas-microsoft-com:office:word" xmlns:pvml="urn:schemas-microsoft-com:office:powerpoint" xmlns:cppr="http://schemas.microsoft.com/office/2006/coverPageProps" xmlns:odx="http://opendope.org/xpaths" xmlns:odc="http://opendope.org/conditions" xmlns:odq="http://opendope.org/questions" xmlns:oda="http://opendope.org/answers" xmlns:odi="http://opendope.org/components" xmlns:odgm="http://opendope.org/SmartArt/DataHierarchy" xmlns:b="http://schemas.openxmlformats.org/officeDocument/2006/bibliography" xmlns:wps="http://schemas.microsoft.com/office/word/2010/wordprocessingShape" xmlns:w16se="http://schemas.microsoft.com/office/word/2015/wordml/symex" xmlns:w16cid="http://schemas.microsoft.com/office/word/2016/wordml/cid" xmlns:wetp="http://schemas.microsoft.com/office/webextensions/taskpanes/2010/11" xmlns:we="http://schemas.microsoft.com/office/webextensions/webextension/2010/11" xmlns:comp="http://schemas.openxmlformats.org/drawingml/2006/compatibility" xmlns:lc="http://schemas.openxmlformats.org/drawingml/2006/lockedCanvas">
+      <c:ext xmlns:c16r3="http://schemas.microsoft.com/office/drawing/2017/03/chart" uri="{56B9EC1D-385E-4148-901F-78D8002777C0}">
+        <c16r3:dataDisplayOptions16>
+          <c16r3:dispNaAsBlank val="1"/>
+        </c16r3:dataDisplayOptions16>
+      </c:ext>
+    </c:extLst>
+    <c:showDLblsOverMax val="0"/>
+  </c:chart>
+  <c:spPr>
+    <a:noFill/>
+    <a:ln>
+      <a:noFill/>
+    </a:ln>
+    <a:effectLst/>
+  </c:spPr>
+  <c:txPr>
+    <a:bodyPr/>
+    <a:lstStyle/>
+    <a:p>
+      <a:pPr>
+        <a:defRPr/>
+      </a:pPr>
+      <a:endParaRPr lang="en-NL"/>
+    </a:p>
+  </c:txPr>
+  <c:externalData r:id="rId3">
+    <c:autoUpdate val="0"/>
+  </c:externalData>
+</c:chartSpace>
+</file>
+
+<file path=ppt/charts/chart2.xml><?xml version="1.0" encoding="utf-8"?>
+<c:chartSpace xmlns:c="http://schemas.openxmlformats.org/drawingml/2006/chart" xmlns:a="http://schemas.openxmlformats.org/drawingml/2006/main" xmlns:r="http://schemas.openxmlformats.org/officeDocument/2006/relationships" xmlns:c16r2="http://schemas.microsoft.com/office/drawing/2015/06/chart">
+  <c:date1904 val="0"/>
+  <c:lang val="en-US"/>
+  <c:roundedCorners val="0"/>
+  <mc:AlternateContent xmlns:mc="http://schemas.openxmlformats.org/markup-compatibility/2006">
+    <mc:Choice xmlns:c14="http://schemas.microsoft.com/office/drawing/2007/8/2/chart" Requires="c14">
+      <c14:style val="102"/>
+    </mc:Choice>
+    <mc:Fallback>
+      <c:style val="2"/>
+    </mc:Fallback>
+  </mc:AlternateContent>
+  <c:chart>
+    <c:autoTitleDeleted val="1"/>
+    <c:plotArea>
+      <c:layout/>
+      <c:bubbleChart>
+        <c:varyColors val="0"/>
+        <c:ser>
+          <c:idx val="0"/>
+          <c:order val="0"/>
+          <c:tx>
+            <c:strRef>
+              <c:f>Sheet1!$B$1</c:f>
+              <c:strCache>
+                <c:ptCount val="1"/>
+                <c:pt idx="0">
+                  <c:v>Estimated change speed increase</c:v>
+                </c:pt>
+              </c:strCache>
+            </c:strRef>
+          </c:tx>
+          <c:spPr>
+            <a:solidFill>
+              <a:schemeClr val="accent1"/>
+            </a:solidFill>
+            <a:ln w="19050">
+              <a:noFill/>
+            </a:ln>
+            <a:effectLst/>
+          </c:spPr>
+          <c:invertIfNegative val="0"/>
+          <c:xVal>
+            <c:numRef>
+              <c:f>Sheet1!$A$2:$A$4</c:f>
+              <c:numCache>
+                <c:formatCode>General</c:formatCode>
+                <c:ptCount val="3"/>
+                <c:pt idx="0">
+                  <c:v>0.7</c:v>
+                </c:pt>
+                <c:pt idx="1">
+                  <c:v>1.8</c:v>
+                </c:pt>
+                <c:pt idx="2">
+                  <c:v>2.6</c:v>
+                </c:pt>
+              </c:numCache>
+            </c:numRef>
+          </c:xVal>
+          <c:yVal>
+            <c:numRef>
+              <c:f>Sheet1!$B$2:$B$4</c:f>
+              <c:numCache>
+                <c:formatCode>0%</c:formatCode>
+                <c:ptCount val="3"/>
+                <c:pt idx="0">
+                  <c:v>2.7</c:v>
+                </c:pt>
+                <c:pt idx="1">
+                  <c:v>3.2</c:v>
+                </c:pt>
+                <c:pt idx="2">
+                  <c:v>0.8</c:v>
+                </c:pt>
+              </c:numCache>
+            </c:numRef>
+          </c:yVal>
+          <c:bubbleSize>
+            <c:numLit>
+              <c:formatCode>General</c:formatCode>
+              <c:ptCount val="3"/>
+              <c:pt idx="0">
+                <c:v>1</c:v>
+              </c:pt>
+              <c:pt idx="1">
+                <c:v>1</c:v>
+              </c:pt>
+              <c:pt idx="2">
+                <c:v>1</c:v>
+              </c:pt>
+            </c:numLit>
+          </c:bubbleSize>
+          <c:bubble3D val="0"/>
+          <c:extLst>
+            <c:ext xmlns:c16="http://schemas.microsoft.com/office/drawing/2014/chart" uri="{C3380CC4-5D6E-409C-BE32-E72D297353CC}">
+              <c16:uniqueId val="{00000000-D4B8-B94C-91E4-2DDF998DBB50}"/>
+            </c:ext>
+          </c:extLst>
+        </c:ser>
+        <c:dLbls>
+          <c:showLegendKey val="0"/>
+          <c:showVal val="0"/>
+          <c:showCatName val="0"/>
+          <c:showSerName val="0"/>
+          <c:showPercent val="0"/>
+          <c:showBubbleSize val="0"/>
+        </c:dLbls>
+        <c:bubbleScale val="100"/>
+        <c:showNegBubbles val="0"/>
+        <c:axId val="392045280"/>
+        <c:axId val="392046992"/>
+      </c:bubbleChart>
+      <c:valAx>
+        <c:axId val="392045280"/>
+        <c:scaling>
+          <c:orientation val="minMax"/>
+        </c:scaling>
+        <c:delete val="0"/>
+        <c:axPos val="b"/>
+        <c:majorGridlines>
+          <c:spPr>
+            <a:ln w="9525" cap="flat" cmpd="sng" algn="ctr">
+              <a:solidFill>
+                <a:schemeClr val="tx1">
+                  <a:lumMod val="15000"/>
+                  <a:lumOff val="85000"/>
+                </a:schemeClr>
+              </a:solidFill>
+              <a:round/>
+            </a:ln>
+            <a:effectLst/>
+          </c:spPr>
+        </c:majorGridlines>
+        <c:numFmt formatCode="General" sourceLinked="1"/>
+        <c:majorTickMark val="none"/>
+        <c:minorTickMark val="none"/>
+        <c:tickLblPos val="nextTo"/>
+        <c:spPr>
+          <a:noFill/>
+          <a:ln w="9525" cap="flat" cmpd="sng" algn="ctr">
+            <a:solidFill>
+              <a:schemeClr val="tx1">
+                <a:lumMod val="25000"/>
+                <a:lumOff val="75000"/>
+              </a:schemeClr>
+            </a:solidFill>
+            <a:round/>
+          </a:ln>
+          <a:effectLst/>
+        </c:spPr>
+        <c:txPr>
+          <a:bodyPr rot="-60000000" spcFirstLastPara="1" vertOverflow="ellipsis" vert="horz" wrap="square" anchor="ctr" anchorCtr="1"/>
+          <a:lstStyle/>
+          <a:p>
+            <a:pPr>
+              <a:defRPr sz="1197" b="0" i="0" u="none" strike="noStrike" kern="1200" baseline="0">
+                <a:solidFill>
+                  <a:schemeClr val="tx2"/>
+                </a:solidFill>
+                <a:latin typeface="+mn-lt"/>
+                <a:ea typeface="+mn-ea"/>
+                <a:cs typeface="+mn-cs"/>
+              </a:defRPr>
+            </a:pPr>
+            <a:endParaRPr lang="en-US"/>
+          </a:p>
+        </c:txPr>
+        <c:crossAx val="392046992"/>
+        <c:crosses val="autoZero"/>
+        <c:crossBetween val="midCat"/>
+      </c:valAx>
+      <c:valAx>
+        <c:axId val="392046992"/>
+        <c:scaling>
+          <c:orientation val="minMax"/>
+        </c:scaling>
+        <c:delete val="0"/>
+        <c:axPos val="l"/>
+        <c:majorGridlines>
+          <c:spPr>
+            <a:ln w="9525" cap="flat" cmpd="sng" algn="ctr">
+              <a:solidFill>
+                <a:schemeClr val="tx1">
+                  <a:lumMod val="15000"/>
+                  <a:lumOff val="85000"/>
+                </a:schemeClr>
+              </a:solidFill>
+              <a:round/>
+            </a:ln>
+            <a:effectLst/>
+          </c:spPr>
+        </c:majorGridlines>
+        <c:numFmt formatCode="0%" sourceLinked="1"/>
+        <c:majorTickMark val="none"/>
+        <c:minorTickMark val="none"/>
+        <c:tickLblPos val="nextTo"/>
+        <c:spPr>
+          <a:noFill/>
+          <a:ln w="9525" cap="flat" cmpd="sng" algn="ctr">
+            <a:solidFill>
+              <a:schemeClr val="tx1">
+                <a:lumMod val="25000"/>
+                <a:lumOff val="75000"/>
+              </a:schemeClr>
+            </a:solidFill>
+            <a:round/>
+          </a:ln>
+          <a:effectLst/>
+        </c:spPr>
+        <c:txPr>
+          <a:bodyPr rot="-60000000" spcFirstLastPara="1" vertOverflow="ellipsis" vert="horz" wrap="square" anchor="ctr" anchorCtr="1"/>
+          <a:lstStyle/>
+          <a:p>
+            <a:pPr>
+              <a:defRPr sz="1197" b="0" i="0" u="none" strike="noStrike" kern="1200" baseline="0">
+                <a:solidFill>
+                  <a:schemeClr val="tx2"/>
+                </a:solidFill>
+                <a:latin typeface="+mn-lt"/>
+                <a:ea typeface="+mn-ea"/>
+                <a:cs typeface="+mn-cs"/>
+              </a:defRPr>
+            </a:pPr>
+            <a:endParaRPr lang="en-US"/>
+          </a:p>
+        </c:txPr>
+        <c:crossAx val="392045280"/>
+        <c:crosses val="autoZero"/>
+        <c:crossBetween val="midCat"/>
+      </c:valAx>
+      <c:spPr>
+        <a:solidFill>
+          <a:schemeClr val="bg1"/>
+        </a:solidFill>
+        <a:ln>
+          <a:noFill/>
+        </a:ln>
+        <a:effectLst/>
+      </c:spPr>
+    </c:plotArea>
+    <c:plotVisOnly val="1"/>
+    <c:dispBlanksAs val="gap"/>
+    <c:extLst>
+      <c:ext xmlns:c16r3="http://schemas.microsoft.com/office/drawing/2017/03/chart" uri="{56B9EC1D-385E-4148-901F-78D8002777C0}">
+        <c16r3:dataDisplayOptions16>
+          <c16r3:dispNaAsBlank val="1"/>
+        </c16r3:dataDisplayOptions16>
+      </c:ext>
+    </c:extLst>
+    <c:showDLblsOverMax val="0"/>
+  </c:chart>
+  <c:spPr>
+    <a:noFill/>
+    <a:ln>
+      <a:noFill/>
+    </a:ln>
+    <a:effectLst/>
+  </c:spPr>
+  <c:txPr>
+    <a:bodyPr/>
+    <a:lstStyle/>
+    <a:p>
+      <a:pPr>
+        <a:defRPr/>
+      </a:pPr>
+      <a:endParaRPr lang="en-US"/>
+    </a:p>
+  </c:txPr>
+  <c:externalData r:id="rId3">
+    <c:autoUpdate val="0"/>
+  </c:externalData>
+</c:chartSpace>
+</file>
+
+<file path=ppt/charts/colors1.xml><?xml version="1.0" encoding="utf-8"?>
+<cs:colorStyle xmlns:cs="http://schemas.microsoft.com/office/drawing/2012/chartStyle" xmlns:a="http://schemas.openxmlformats.org/drawingml/2006/main" meth="withinLinear" id="15">
+  <a:schemeClr val="accent2"/>
+</cs:colorStyle>
+</file>
+
+<file path=ppt/charts/colors2.xml><?xml version="1.0" encoding="utf-8"?>
+<cs:colorStyle xmlns:cs="http://schemas.microsoft.com/office/drawing/2012/chartStyle" xmlns:a="http://schemas.openxmlformats.org/drawingml/2006/main" meth="cycle" id="10">
+  <a:schemeClr val="accent1"/>
+  <a:schemeClr val="accent2"/>
+  <a:schemeClr val="accent3"/>
+  <a:schemeClr val="accent4"/>
+  <a:schemeClr val="accent5"/>
+  <a:schemeClr val="accent6"/>
+  <cs:variation/>
+  <cs:variation>
+    <a:lumMod val="60000"/>
+  </cs:variation>
+  <cs:variation>
+    <a:lumMod val="80000"/>
+    <a:lumOff val="20000"/>
+  </cs:variation>
+  <cs:variation>
+    <a:lumMod val="80000"/>
+  </cs:variation>
+  <cs:variation>
+    <a:lumMod val="60000"/>
+    <a:lumOff val="40000"/>
+  </cs:variation>
+  <cs:variation>
+    <a:lumMod val="50000"/>
+  </cs:variation>
+  <cs:variation>
+    <a:lumMod val="70000"/>
+    <a:lumOff val="30000"/>
+  </cs:variation>
+  <cs:variation>
+    <a:lumMod val="70000"/>
+  </cs:variation>
+  <cs:variation>
+    <a:lumMod val="50000"/>
+    <a:lumOff val="50000"/>
+  </cs:variation>
+</cs:colorStyle>
+</file>
+
+<file path=ppt/charts/style1.xml><?xml version="1.0" encoding="utf-8"?>
+<cs:chartStyle xmlns:cs="http://schemas.microsoft.com/office/drawing/2012/chartStyle" xmlns:a="http://schemas.openxmlformats.org/drawingml/2006/main" id="251">
+  <cs:axisTitle>
+    <cs:lnRef idx="0"/>
+    <cs:fillRef idx="0"/>
+    <cs:effectRef idx="0"/>
+    <cs:fontRef idx="minor">
+      <a:schemeClr val="tx1">
+        <a:lumMod val="65000"/>
+        <a:lumOff val="35000"/>
+      </a:schemeClr>
+    </cs:fontRef>
+    <cs:defRPr sz="1330" kern="1200"/>
+  </cs:axisTitle>
+  <cs:categoryAxis>
+    <cs:lnRef idx="0"/>
+    <cs:fillRef idx="0"/>
+    <cs:effectRef idx="0"/>
+    <cs:fontRef idx="minor">
+      <a:schemeClr val="tx1">
+        <a:lumMod val="65000"/>
+        <a:lumOff val="35000"/>
+      </a:schemeClr>
+    </cs:fontRef>
+    <cs:spPr>
+      <a:ln w="9525" cap="flat" cmpd="sng" algn="ctr">
+        <a:solidFill>
+          <a:schemeClr val="tx1">
+            <a:lumMod val="15000"/>
+            <a:lumOff val="85000"/>
+          </a:schemeClr>
+        </a:solidFill>
+        <a:round/>
+      </a:ln>
+    </cs:spPr>
+    <cs:defRPr sz="1197" kern="1200"/>
+  </cs:categoryAxis>
+  <cs:chartArea mods="allowNoFillOverride allowNoLineOverride">
+    <cs:lnRef idx="0"/>
+    <cs:fillRef idx="0"/>
+    <cs:effectRef idx="0"/>
+    <cs:fontRef idx="minor">
+      <a:schemeClr val="tx1"/>
+    </cs:fontRef>
+    <cs:spPr>
+      <a:solidFill>
+        <a:schemeClr val="bg1"/>
+      </a:solidFill>
+      <a:ln w="9525" cap="flat" cmpd="sng" algn="ctr">
+        <a:solidFill>
+          <a:schemeClr val="tx1">
+            <a:lumMod val="15000"/>
+            <a:lumOff val="85000"/>
+          </a:schemeClr>
+        </a:solidFill>
+        <a:round/>
+      </a:ln>
+    </cs:spPr>
+    <cs:defRPr sz="1197" kern="1200"/>
+  </cs:chartArea>
+  <cs:dataLabel>
+    <cs:lnRef idx="0"/>
+    <cs:fillRef idx="0"/>
+    <cs:effectRef idx="0"/>
+    <cs:fontRef idx="minor">
+      <a:schemeClr val="tx1">
+        <a:lumMod val="75000"/>
+        <a:lumOff val="25000"/>
+      </a:schemeClr>
+    </cs:fontRef>
+    <cs:defRPr sz="1197" kern="1200"/>
+  </cs:dataLabel>
+  <cs:dataLabelCallout>
+    <cs:lnRef idx="0"/>
+    <cs:fillRef idx="0"/>
+    <cs:effectRef idx="0"/>
+    <cs:fontRef idx="minor">
+      <a:schemeClr val="dk1">
+        <a:lumMod val="65000"/>
+        <a:lumOff val="35000"/>
+      </a:schemeClr>
+    </cs:fontRef>
+    <cs:spPr>
+      <a:solidFill>
+        <a:schemeClr val="lt1"/>
+      </a:solidFill>
+      <a:ln>
+        <a:solidFill>
+          <a:schemeClr val="dk1">
+            <a:lumMod val="25000"/>
+            <a:lumOff val="75000"/>
+          </a:schemeClr>
+        </a:solidFill>
+      </a:ln>
+    </cs:spPr>
+    <cs:defRPr sz="1197" kern="1200"/>
+    <cs:bodyPr rot="0" spcFirstLastPara="1" vertOverflow="clip" horzOverflow="clip" vert="horz" wrap="square" lIns="36576" tIns="18288" rIns="36576" bIns="18288" anchor="ctr" anchorCtr="1">
+      <a:spAutoFit/>
+    </cs:bodyPr>
+  </cs:dataLabelCallout>
+  <cs:dataPoint>
+    <cs:lnRef idx="0"/>
+    <cs:fillRef idx="1">
+      <cs:styleClr val="auto"/>
+    </cs:fillRef>
+    <cs:effectRef idx="0"/>
+    <cs:fontRef idx="minor">
+      <a:schemeClr val="tx1"/>
+    </cs:fontRef>
+    <cs:spPr>
+      <a:ln w="19050">
+        <a:solidFill>
+          <a:schemeClr val="lt1"/>
+        </a:solidFill>
+      </a:ln>
+    </cs:spPr>
+  </cs:dataPoint>
+  <cs:dataPoint3D>
+    <cs:lnRef idx="0"/>
+    <cs:fillRef idx="1">
+      <cs:styleClr val="auto"/>
+    </cs:fillRef>
+    <cs:effectRef idx="0"/>
+    <cs:fontRef idx="minor">
+      <a:schemeClr val="tx1"/>
+    </cs:fontRef>
+    <cs:spPr>
+      <a:ln w="25400">
+        <a:solidFill>
+          <a:schemeClr val="lt1"/>
+        </a:solidFill>
+      </a:ln>
+    </cs:spPr>
+  </cs:dataPoint3D>
+  <cs:dataPointLine>
+    <cs:lnRef idx="0">
+      <cs:styleClr val="auto"/>
+    </cs:lnRef>
+    <cs:fillRef idx="0"/>
+    <cs:effectRef idx="0"/>
+    <cs:fontRef idx="minor">
+      <a:schemeClr val="tx1"/>
+    </cs:fontRef>
+    <cs:spPr>
+      <a:ln w="28575" cap="rnd">
+        <a:solidFill>
+          <a:schemeClr val="phClr"/>
+        </a:solidFill>
+        <a:round/>
+      </a:ln>
+    </cs:spPr>
+  </cs:dataPointLine>
+  <cs:dataPointMarker>
+    <cs:lnRef idx="0">
+      <cs:styleClr val="auto"/>
+    </cs:lnRef>
+    <cs:fillRef idx="1">
+      <cs:styleClr val="auto"/>
+    </cs:fillRef>
+    <cs:effectRef idx="0"/>
+    <cs:fontRef idx="minor">
+      <a:schemeClr val="tx1"/>
+    </cs:fontRef>
+    <cs:spPr>
+      <a:ln w="9525">
+        <a:solidFill>
+          <a:schemeClr val="phClr"/>
+        </a:solidFill>
+      </a:ln>
+    </cs:spPr>
+  </cs:dataPointMarker>
+  <cs:dataPointMarkerLayout symbol="circle" size="5"/>
+  <cs:dataPointWireframe>
+    <cs:lnRef idx="0">
+      <cs:styleClr val="auto"/>
+    </cs:lnRef>
+    <cs:fillRef idx="0"/>
+    <cs:effectRef idx="0"/>
+    <cs:fontRef idx="minor">
+      <a:schemeClr val="tx1"/>
+    </cs:fontRef>
+    <cs:spPr>
+      <a:ln w="9525" cap="rnd">
+        <a:solidFill>
+          <a:schemeClr val="phClr"/>
+        </a:solidFill>
+        <a:round/>
+      </a:ln>
+    </cs:spPr>
+  </cs:dataPointWireframe>
+  <cs:dataTable>
+    <cs:lnRef idx="0"/>
+    <cs:fillRef idx="0"/>
+    <cs:effectRef idx="0"/>
+    <cs:fontRef idx="minor">
+      <a:schemeClr val="tx1">
+        <a:lumMod val="65000"/>
+        <a:lumOff val="35000"/>
+      </a:schemeClr>
+    </cs:fontRef>
+    <cs:spPr>
+      <a:noFill/>
+      <a:ln w="9525" cap="flat" cmpd="sng" algn="ctr">
+        <a:solidFill>
+          <a:schemeClr val="tx1">
+            <a:lumMod val="15000"/>
+            <a:lumOff val="85000"/>
+          </a:schemeClr>
+        </a:solidFill>
+        <a:round/>
+      </a:ln>
+    </cs:spPr>
+    <cs:defRPr sz="1197" kern="1200"/>
+  </cs:dataTable>
+  <cs:downBar>
+    <cs:lnRef idx="0"/>
+    <cs:fillRef idx="0"/>
+    <cs:effectRef idx="0"/>
+    <cs:fontRef idx="minor">
+      <a:schemeClr val="tx1"/>
+    </cs:fontRef>
+    <cs:spPr>
+      <a:solidFill>
+        <a:schemeClr val="dk1">
+          <a:lumMod val="75000"/>
+          <a:lumOff val="25000"/>
+        </a:schemeClr>
+      </a:solidFill>
+      <a:ln w="9525" cap="flat" cmpd="sng" algn="ctr">
+        <a:solidFill>
+          <a:schemeClr val="tx1">
+            <a:lumMod val="65000"/>
+            <a:lumOff val="35000"/>
+          </a:schemeClr>
+        </a:solidFill>
+        <a:round/>
+      </a:ln>
+    </cs:spPr>
+  </cs:downBar>
+  <cs:dropLine>
+    <cs:lnRef idx="0"/>
+    <cs:fillRef idx="0"/>
+    <cs:effectRef idx="0"/>
+    <cs:fontRef idx="minor">
+      <a:schemeClr val="tx1"/>
+    </cs:fontRef>
+    <cs:spPr>
+      <a:ln w="9525" cap="flat" cmpd="sng" algn="ctr">
+        <a:solidFill>
+          <a:schemeClr val="tx1">
+            <a:lumMod val="35000"/>
+            <a:lumOff val="65000"/>
+          </a:schemeClr>
+        </a:solidFill>
+        <a:round/>
+      </a:ln>
+    </cs:spPr>
+  </cs:dropLine>
+  <cs:errorBar>
+    <cs:lnRef idx="0"/>
+    <cs:fillRef idx="0"/>
+    <cs:effectRef idx="0"/>
+    <cs:fontRef idx="minor">
+      <a:schemeClr val="tx1"/>
+    </cs:fontRef>
+    <cs:spPr>
+      <a:ln w="9525" cap="flat" cmpd="sng" algn="ctr">
+        <a:solidFill>
+          <a:schemeClr val="tx1">
+            <a:lumMod val="65000"/>
+            <a:lumOff val="35000"/>
+          </a:schemeClr>
+        </a:solidFill>
+        <a:round/>
+      </a:ln>
+    </cs:spPr>
+  </cs:errorBar>
+  <cs:floor>
+    <cs:lnRef idx="0"/>
+    <cs:fillRef idx="0"/>
+    <cs:effectRef idx="0"/>
+    <cs:fontRef idx="minor">
+      <a:schemeClr val="tx1"/>
+    </cs:fontRef>
+    <cs:spPr>
+      <a:noFill/>
+      <a:ln>
+        <a:noFill/>
+      </a:ln>
+    </cs:spPr>
+  </cs:floor>
+  <cs:gridlineMajor>
+    <cs:lnRef idx="0"/>
+    <cs:fillRef idx="0"/>
+    <cs:effectRef idx="0"/>
+    <cs:fontRef idx="minor">
+      <a:schemeClr val="tx1"/>
+    </cs:fontRef>
+    <cs:spPr>
+      <a:ln w="9525" cap="flat" cmpd="sng" algn="ctr">
+        <a:solidFill>
+          <a:schemeClr val="tx1">
+            <a:lumMod val="15000"/>
+            <a:lumOff val="85000"/>
+          </a:schemeClr>
+        </a:solidFill>
+        <a:round/>
+      </a:ln>
+    </cs:spPr>
+  </cs:gridlineMajor>
+  <cs:gridlineMinor>
+    <cs:lnRef idx="0"/>
+    <cs:fillRef idx="0"/>
+    <cs:effectRef idx="0"/>
+    <cs:fontRef idx="minor">
+      <a:schemeClr val="tx1"/>
+    </cs:fontRef>
+    <cs:spPr>
+      <a:ln w="9525" cap="flat" cmpd="sng" algn="ctr">
+        <a:solidFill>
+          <a:schemeClr val="tx1">
+            <a:lumMod val="5000"/>
+            <a:lumOff val="95000"/>
+          </a:schemeClr>
+        </a:solidFill>
+        <a:round/>
+      </a:ln>
+    </cs:spPr>
+  </cs:gridlineMinor>
+  <cs:hiLoLine>
+    <cs:lnRef idx="0"/>
+    <cs:fillRef idx="0"/>
+    <cs:effectRef idx="0"/>
+    <cs:fontRef idx="minor">
+      <a:schemeClr val="tx1"/>
+    </cs:fontRef>
+    <cs:spPr>
+      <a:ln w="9525" cap="flat" cmpd="sng" algn="ctr">
+        <a:solidFill>
+          <a:schemeClr val="tx1">
+            <a:lumMod val="50000"/>
+            <a:lumOff val="50000"/>
+          </a:schemeClr>
+        </a:solidFill>
+        <a:round/>
+      </a:ln>
+    </cs:spPr>
+  </cs:hiLoLine>
+  <cs:leaderLine>
+    <cs:lnRef idx="0"/>
+    <cs:fillRef idx="0"/>
+    <cs:effectRef idx="0"/>
+    <cs:fontRef idx="minor">
+      <a:schemeClr val="tx1"/>
+    </cs:fontRef>
+    <cs:spPr>
+      <a:ln w="9525" cap="flat" cmpd="sng" algn="ctr">
+        <a:solidFill>
+          <a:schemeClr val="tx1">
+            <a:lumMod val="35000"/>
+            <a:lumOff val="65000"/>
+          </a:schemeClr>
+        </a:solidFill>
+        <a:round/>
+      </a:ln>
+    </cs:spPr>
+  </cs:leaderLine>
+  <cs:legend>
+    <cs:lnRef idx="0"/>
+    <cs:fillRef idx="0"/>
+    <cs:effectRef idx="0"/>
+    <cs:fontRef idx="minor">
+      <a:schemeClr val="tx1">
+        <a:lumMod val="65000"/>
+        <a:lumOff val="35000"/>
+      </a:schemeClr>
+    </cs:fontRef>
+    <cs:defRPr sz="1197" kern="1200"/>
+  </cs:legend>
+  <cs:plotArea mods="allowNoFillOverride allowNoLineOverride">
+    <cs:lnRef idx="0"/>
+    <cs:fillRef idx="0"/>
+    <cs:effectRef idx="0"/>
+    <cs:fontRef idx="minor">
+      <a:schemeClr val="tx1"/>
+    </cs:fontRef>
+  </cs:plotArea>
+  <cs:plotArea3D mods="allowNoFillOverride allowNoLineOverride">
+    <cs:lnRef idx="0"/>
+    <cs:fillRef idx="0"/>
+    <cs:effectRef idx="0"/>
+    <cs:fontRef idx="minor">
+      <a:schemeClr val="tx1"/>
+    </cs:fontRef>
+  </cs:plotArea3D>
+  <cs:seriesAxis>
+    <cs:lnRef idx="0"/>
+    <cs:fillRef idx="0"/>
+    <cs:effectRef idx="0"/>
+    <cs:fontRef idx="minor">
+      <a:schemeClr val="tx1">
+        <a:lumMod val="65000"/>
+        <a:lumOff val="35000"/>
+      </a:schemeClr>
+    </cs:fontRef>
+    <cs:defRPr sz="1197" kern="1200"/>
+  </cs:seriesAxis>
+  <cs:seriesLine>
+    <cs:lnRef idx="0"/>
+    <cs:fillRef idx="0"/>
+    <cs:effectRef idx="0"/>
+    <cs:fontRef idx="minor">
+      <a:schemeClr val="tx1"/>
+    </cs:fontRef>
+    <cs:spPr>
+      <a:ln w="9525" cap="flat" cmpd="sng" algn="ctr">
+        <a:solidFill>
+          <a:schemeClr val="tx1">
+            <a:lumMod val="35000"/>
+            <a:lumOff val="65000"/>
+          </a:schemeClr>
+        </a:solidFill>
+        <a:round/>
+      </a:ln>
+    </cs:spPr>
+  </cs:seriesLine>
+  <cs:title>
+    <cs:lnRef idx="0"/>
+    <cs:fillRef idx="0"/>
+    <cs:effectRef idx="0"/>
+    <cs:fontRef idx="minor">
+      <a:schemeClr val="tx1">
+        <a:lumMod val="65000"/>
+        <a:lumOff val="35000"/>
+      </a:schemeClr>
+    </cs:fontRef>
+    <cs:defRPr sz="1862" b="0" kern="1200" spc="0" baseline="0"/>
+  </cs:title>
+  <cs:trendline>
+    <cs:lnRef idx="0">
+      <cs:styleClr val="auto"/>
+    </cs:lnRef>
+    <cs:fillRef idx="0"/>
+    <cs:effectRef idx="0"/>
+    <cs:fontRef idx="minor">
+      <a:schemeClr val="tx1"/>
+    </cs:fontRef>
+    <cs:spPr>
+      <a:ln w="19050" cap="rnd">
+        <a:solidFill>
+          <a:schemeClr val="phClr"/>
+        </a:solidFill>
+        <a:prstDash val="sysDot"/>
+      </a:ln>
+    </cs:spPr>
+  </cs:trendline>
+  <cs:trendlineLabel>
+    <cs:lnRef idx="0"/>
+    <cs:fillRef idx="0"/>
+    <cs:effectRef idx="0"/>
+    <cs:fontRef idx="minor">
+      <a:schemeClr val="tx1">
+        <a:lumMod val="65000"/>
+        <a:lumOff val="35000"/>
+      </a:schemeClr>
+    </cs:fontRef>
+    <cs:defRPr sz="1197" kern="1200"/>
+  </cs:trendlineLabel>
+  <cs:upBar>
+    <cs:lnRef idx="0"/>
+    <cs:fillRef idx="0"/>
+    <cs:effectRef idx="0"/>
+    <cs:fontRef idx="minor">
+      <a:schemeClr val="tx1"/>
+    </cs:fontRef>
+    <cs:spPr>
+      <a:solidFill>
+        <a:schemeClr val="lt1"/>
+      </a:solidFill>
+      <a:ln w="9525" cap="flat" cmpd="sng" algn="ctr">
+        <a:solidFill>
+          <a:schemeClr val="tx1">
+            <a:lumMod val="65000"/>
+            <a:lumOff val="35000"/>
+          </a:schemeClr>
+        </a:solidFill>
+        <a:round/>
+      </a:ln>
+    </cs:spPr>
+  </cs:upBar>
+  <cs:valueAxis>
+    <cs:lnRef idx="0"/>
+    <cs:fillRef idx="0"/>
+    <cs:effectRef idx="0"/>
+    <cs:fontRef idx="minor">
+      <a:schemeClr val="tx1">
+        <a:lumMod val="65000"/>
+        <a:lumOff val="35000"/>
+      </a:schemeClr>
+    </cs:fontRef>
+    <cs:defRPr sz="1197" kern="1200"/>
+  </cs:valueAxis>
+  <cs:wall>
+    <cs:lnRef idx="0"/>
+    <cs:fillRef idx="0"/>
+    <cs:effectRef idx="0"/>
+    <cs:fontRef idx="minor">
+      <a:schemeClr val="tx1"/>
+    </cs:fontRef>
+    <cs:spPr>
+      <a:noFill/>
+      <a:ln>
+        <a:noFill/>
+      </a:ln>
+    </cs:spPr>
+  </cs:wall>
+</cs:chartStyle>
+</file>
+
+<file path=ppt/charts/style2.xml><?xml version="1.0" encoding="utf-8"?>
+<cs:chartStyle xmlns:cs="http://schemas.microsoft.com/office/drawing/2012/chartStyle" xmlns:a="http://schemas.openxmlformats.org/drawingml/2006/main" id="240">
+  <cs:axisTitle>
+    <cs:lnRef idx="0"/>
+    <cs:fillRef idx="0"/>
+    <cs:effectRef idx="0"/>
+    <cs:fontRef idx="minor">
+      <a:schemeClr val="tx1">
+        <a:lumMod val="65000"/>
+        <a:lumOff val="35000"/>
+      </a:schemeClr>
+    </cs:fontRef>
+    <cs:defRPr sz="1330" kern="1200"/>
+  </cs:axisTitle>
+  <cs:categoryAxis>
+    <cs:lnRef idx="0"/>
+    <cs:fillRef idx="0"/>
+    <cs:effectRef idx="0"/>
+    <cs:fontRef idx="minor">
+      <a:schemeClr val="tx1">
+        <a:lumMod val="65000"/>
+        <a:lumOff val="35000"/>
+      </a:schemeClr>
+    </cs:fontRef>
+    <cs:spPr>
+      <a:ln w="9525" cap="flat" cmpd="sng" algn="ctr">
+        <a:solidFill>
+          <a:schemeClr val="tx1">
+            <a:lumMod val="25000"/>
+            <a:lumOff val="75000"/>
+          </a:schemeClr>
+        </a:solidFill>
+        <a:round/>
+      </a:ln>
+    </cs:spPr>
+    <cs:defRPr sz="1197" kern="1200"/>
+  </cs:categoryAxis>
+  <cs:chartArea mods="allowNoFillOverride allowNoLineOverride">
+    <cs:lnRef idx="0"/>
+    <cs:fillRef idx="0"/>
+    <cs:effectRef idx="0"/>
+    <cs:fontRef idx="minor">
+      <a:schemeClr val="tx1"/>
+    </cs:fontRef>
+    <cs:spPr>
+      <a:solidFill>
+        <a:schemeClr val="bg1"/>
+      </a:solidFill>
+      <a:ln w="9525" cap="flat" cmpd="sng" algn="ctr">
+        <a:solidFill>
+          <a:schemeClr val="tx1">
+            <a:lumMod val="15000"/>
+            <a:lumOff val="85000"/>
+          </a:schemeClr>
+        </a:solidFill>
+        <a:round/>
+      </a:ln>
+    </cs:spPr>
+    <cs:defRPr sz="1330" kern="1200"/>
+  </cs:chartArea>
+  <cs:dataLabel>
+    <cs:lnRef idx="0"/>
+    <cs:fillRef idx="0"/>
+    <cs:effectRef idx="0"/>
+    <cs:fontRef idx="minor">
+      <a:schemeClr val="tx1">
+        <a:lumMod val="75000"/>
+        <a:lumOff val="25000"/>
+      </a:schemeClr>
+    </cs:fontRef>
+    <cs:defRPr sz="1197" kern="1200"/>
+  </cs:dataLabel>
+  <cs:dataLabelCallout>
+    <cs:lnRef idx="0"/>
+    <cs:fillRef idx="0"/>
+    <cs:effectRef idx="0"/>
+    <cs:fontRef idx="minor">
+      <a:schemeClr val="dk1">
+        <a:lumMod val="65000"/>
+        <a:lumOff val="35000"/>
+      </a:schemeClr>
+    </cs:fontRef>
+    <cs:spPr>
+      <a:solidFill>
+        <a:schemeClr val="lt1"/>
+      </a:solidFill>
+      <a:ln>
+        <a:solidFill>
+          <a:schemeClr val="dk1">
+            <a:lumMod val="25000"/>
+            <a:lumOff val="75000"/>
+          </a:schemeClr>
+        </a:solidFill>
+      </a:ln>
+    </cs:spPr>
+    <cs:defRPr sz="1197" kern="1200"/>
+    <cs:bodyPr rot="0" spcFirstLastPara="1" vertOverflow="clip" horzOverflow="clip" vert="horz" wrap="square" lIns="36576" tIns="18288" rIns="36576" bIns="18288" anchor="ctr" anchorCtr="1">
+      <a:spAutoFit/>
+    </cs:bodyPr>
+  </cs:dataLabelCallout>
+  <cs:dataPoint>
+    <cs:lnRef idx="0"/>
+    <cs:fillRef idx="1">
+      <cs:styleClr val="auto"/>
+    </cs:fillRef>
+    <cs:effectRef idx="0"/>
+    <cs:fontRef idx="minor">
+      <a:schemeClr val="tx1"/>
+    </cs:fontRef>
+  </cs:dataPoint>
+  <cs:dataPoint3D>
+    <cs:lnRef idx="0"/>
+    <cs:fillRef idx="1">
+      <cs:styleClr val="auto"/>
+    </cs:fillRef>
+    <cs:effectRef idx="0"/>
+    <cs:fontRef idx="minor">
+      <a:schemeClr val="tx1"/>
+    </cs:fontRef>
+  </cs:dataPoint3D>
+  <cs:dataPointLine>
+    <cs:lnRef idx="0">
+      <cs:styleClr val="auto"/>
+    </cs:lnRef>
+    <cs:fillRef idx="1"/>
+    <cs:effectRef idx="0"/>
+    <cs:fontRef idx="minor">
+      <a:schemeClr val="tx1"/>
+    </cs:fontRef>
+    <cs:spPr>
+      <a:ln w="19050" cap="rnd">
+        <a:solidFill>
+          <a:schemeClr val="phClr"/>
+        </a:solidFill>
+        <a:round/>
+      </a:ln>
+    </cs:spPr>
+  </cs:dataPointLine>
+  <cs:dataPointMarker>
+    <cs:lnRef idx="0">
+      <cs:styleClr val="auto"/>
+    </cs:lnRef>
+    <cs:fillRef idx="1">
+      <cs:styleClr val="auto"/>
+    </cs:fillRef>
+    <cs:effectRef idx="0"/>
+    <cs:fontRef idx="minor">
+      <a:schemeClr val="tx1"/>
+    </cs:fontRef>
+    <cs:spPr>
+      <a:ln w="9525">
+        <a:solidFill>
+          <a:schemeClr val="phClr"/>
+        </a:solidFill>
+      </a:ln>
+    </cs:spPr>
+  </cs:dataPointMarker>
+  <cs:dataPointMarkerLayout symbol="circle" size="5"/>
+  <cs:dataPointWireframe>
+    <cs:lnRef idx="0">
+      <cs:styleClr val="auto"/>
+    </cs:lnRef>
+    <cs:fillRef idx="0"/>
+    <cs:effectRef idx="0"/>
+    <cs:fontRef idx="minor">
+      <a:schemeClr val="dk1"/>
+    </cs:fontRef>
+    <cs:spPr>
+      <a:ln w="9525" cap="rnd">
+        <a:solidFill>
+          <a:schemeClr val="phClr"/>
+        </a:solidFill>
+        <a:round/>
+      </a:ln>
+    </cs:spPr>
+  </cs:dataPointWireframe>
+  <cs:dataTable>
+    <cs:lnRef idx="0"/>
+    <cs:fillRef idx="0"/>
+    <cs:effectRef idx="0"/>
+    <cs:fontRef idx="minor">
+      <a:schemeClr val="tx1">
+        <a:lumMod val="65000"/>
+        <a:lumOff val="35000"/>
+      </a:schemeClr>
+    </cs:fontRef>
+    <cs:spPr>
+      <a:noFill/>
+      <a:ln w="9525" cap="flat" cmpd="sng" algn="ctr">
+        <a:solidFill>
+          <a:schemeClr val="tx1">
+            <a:lumMod val="15000"/>
+            <a:lumOff val="85000"/>
+          </a:schemeClr>
+        </a:solidFill>
+        <a:round/>
+      </a:ln>
+    </cs:spPr>
+    <cs:defRPr sz="1197" kern="1200"/>
+  </cs:dataTable>
+  <cs:downBar>
+    <cs:lnRef idx="0"/>
+    <cs:fillRef idx="0"/>
+    <cs:effectRef idx="0"/>
+    <cs:fontRef idx="minor">
+      <a:schemeClr val="tx1"/>
+    </cs:fontRef>
+    <cs:spPr>
+      <a:solidFill>
+        <a:schemeClr val="dk1">
+          <a:lumMod val="75000"/>
+          <a:lumOff val="25000"/>
+        </a:schemeClr>
+      </a:solidFill>
+      <a:ln w="9525" cap="flat" cmpd="sng" algn="ctr">
+        <a:solidFill>
+          <a:schemeClr val="tx1">
+            <a:lumMod val="65000"/>
+            <a:lumOff val="35000"/>
+          </a:schemeClr>
+        </a:solidFill>
+        <a:round/>
+      </a:ln>
+    </cs:spPr>
+  </cs:downBar>
+  <cs:dropLine>
+    <cs:lnRef idx="0"/>
+    <cs:fillRef idx="0"/>
+    <cs:effectRef idx="0"/>
+    <cs:fontRef idx="minor">
+      <a:schemeClr val="tx1"/>
+    </cs:fontRef>
+    <cs:spPr>
+      <a:ln w="9525" cap="flat" cmpd="sng" algn="ctr">
+        <a:solidFill>
+          <a:schemeClr val="tx1">
+            <a:lumMod val="35000"/>
+            <a:lumOff val="65000"/>
+          </a:schemeClr>
+        </a:solidFill>
+        <a:round/>
+      </a:ln>
+    </cs:spPr>
+  </cs:dropLine>
+  <cs:errorBar>
+    <cs:lnRef idx="0"/>
+    <cs:fillRef idx="0"/>
+    <cs:effectRef idx="0"/>
+    <cs:fontRef idx="minor">
+      <a:schemeClr val="tx1"/>
+    </cs:fontRef>
+    <cs:spPr>
+      <a:ln w="9525" cap="flat" cmpd="sng" algn="ctr">
+        <a:solidFill>
+          <a:schemeClr val="tx1">
+            <a:lumMod val="65000"/>
+            <a:lumOff val="35000"/>
+          </a:schemeClr>
+        </a:solidFill>
+        <a:round/>
+      </a:ln>
+    </cs:spPr>
+  </cs:errorBar>
+  <cs:floor>
+    <cs:lnRef idx="0"/>
+    <cs:fillRef idx="0"/>
+    <cs:effectRef idx="0"/>
+    <cs:fontRef idx="minor">
+      <a:schemeClr val="tx1"/>
+    </cs:fontRef>
+    <cs:spPr>
+      <a:noFill/>
+      <a:ln>
+        <a:noFill/>
+      </a:ln>
+    </cs:spPr>
+  </cs:floor>
+  <cs:gridlineMajor>
+    <cs:lnRef idx="0"/>
+    <cs:fillRef idx="0"/>
+    <cs:effectRef idx="0"/>
+    <cs:fontRef idx="minor">
+      <a:schemeClr val="tx1"/>
+    </cs:fontRef>
+    <cs:spPr>
+      <a:ln w="9525" cap="flat" cmpd="sng" algn="ctr">
+        <a:solidFill>
+          <a:schemeClr val="tx1">
+            <a:lumMod val="15000"/>
+            <a:lumOff val="85000"/>
+          </a:schemeClr>
+        </a:solidFill>
+        <a:round/>
+      </a:ln>
+    </cs:spPr>
+  </cs:gridlineMajor>
+  <cs:gridlineMinor>
+    <cs:lnRef idx="0"/>
+    <cs:fillRef idx="0"/>
+    <cs:effectRef idx="0"/>
+    <cs:fontRef idx="minor">
+      <a:schemeClr val="tx1"/>
+    </cs:fontRef>
+    <cs:spPr>
+      <a:ln w="9525" cap="flat" cmpd="sng" algn="ctr">
+        <a:solidFill>
+          <a:schemeClr val="tx1">
+            <a:lumMod val="5000"/>
+            <a:lumOff val="95000"/>
+          </a:schemeClr>
+        </a:solidFill>
+        <a:round/>
+      </a:ln>
+    </cs:spPr>
+  </cs:gridlineMinor>
+  <cs:hiLoLine>
+    <cs:lnRef idx="0"/>
+    <cs:fillRef idx="0"/>
+    <cs:effectRef idx="0"/>
+    <cs:fontRef idx="minor">
+      <a:schemeClr val="tx1"/>
+    </cs:fontRef>
+    <cs:spPr>
+      <a:ln w="9525" cap="flat" cmpd="sng" algn="ctr">
+        <a:solidFill>
+          <a:schemeClr val="tx1">
+            <a:lumMod val="50000"/>
+            <a:lumOff val="50000"/>
+          </a:schemeClr>
+        </a:solidFill>
+        <a:round/>
+      </a:ln>
+    </cs:spPr>
+  </cs:hiLoLine>
+  <cs:leaderLine>
+    <cs:lnRef idx="0"/>
+    <cs:fillRef idx="0"/>
+    <cs:effectRef idx="0"/>
+    <cs:fontRef idx="minor">
+      <a:schemeClr val="tx1"/>
+    </cs:fontRef>
+    <cs:spPr>
+      <a:ln w="9525" cap="flat" cmpd="sng" algn="ctr">
+        <a:solidFill>
+          <a:schemeClr val="tx1">
+            <a:lumMod val="35000"/>
+            <a:lumOff val="65000"/>
+          </a:schemeClr>
+        </a:solidFill>
+        <a:round/>
+      </a:ln>
+    </cs:spPr>
+  </cs:leaderLine>
+  <cs:legend>
+    <cs:lnRef idx="0"/>
+    <cs:fillRef idx="0"/>
+    <cs:effectRef idx="0"/>
+    <cs:fontRef idx="minor">
+      <a:schemeClr val="tx1">
+        <a:lumMod val="65000"/>
+        <a:lumOff val="35000"/>
+      </a:schemeClr>
+    </cs:fontRef>
+    <cs:defRPr sz="1197" kern="1200"/>
+  </cs:legend>
+  <cs:plotArea mods="allowNoFillOverride allowNoLineOverride">
+    <cs:lnRef idx="0"/>
+    <cs:fillRef idx="0"/>
+    <cs:effectRef idx="0"/>
+    <cs:fontRef idx="minor">
+      <a:schemeClr val="tx1"/>
+    </cs:fontRef>
+  </cs:plotArea>
+  <cs:plotArea3D mods="allowNoFillOverride allowNoLineOverride">
+    <cs:lnRef idx="0"/>
+    <cs:fillRef idx="0"/>
+    <cs:effectRef idx="0"/>
+    <cs:fontRef idx="minor">
+      <a:schemeClr val="tx1"/>
+    </cs:fontRef>
+  </cs:plotArea3D>
+  <cs:seriesAxis>
+    <cs:lnRef idx="0"/>
+    <cs:fillRef idx="0"/>
+    <cs:effectRef idx="0"/>
+    <cs:fontRef idx="minor">
+      <a:schemeClr val="tx1">
+        <a:lumMod val="65000"/>
+        <a:lumOff val="35000"/>
+      </a:schemeClr>
+    </cs:fontRef>
+    <cs:defRPr sz="1197" kern="1200"/>
+  </cs:seriesAxis>
+  <cs:seriesLine>
+    <cs:lnRef idx="0"/>
+    <cs:fillRef idx="0"/>
+    <cs:effectRef idx="0"/>
+    <cs:fontRef idx="minor">
+      <a:schemeClr val="tx1"/>
+    </cs:fontRef>
+    <cs:spPr>
+      <a:ln w="9525" cap="flat" cmpd="sng" algn="ctr">
+        <a:solidFill>
+          <a:schemeClr val="tx1">
+            <a:lumMod val="35000"/>
+            <a:lumOff val="65000"/>
+          </a:schemeClr>
+        </a:solidFill>
+        <a:round/>
+      </a:ln>
+    </cs:spPr>
+  </cs:seriesLine>
+  <cs:title>
+    <cs:lnRef idx="0"/>
+    <cs:fillRef idx="0"/>
+    <cs:effectRef idx="0"/>
+    <cs:fontRef idx="minor">
+      <a:schemeClr val="tx1">
+        <a:lumMod val="65000"/>
+        <a:lumOff val="35000"/>
+      </a:schemeClr>
+    </cs:fontRef>
+    <cs:defRPr sz="1862" b="0" kern="1200" spc="0" baseline="0"/>
+  </cs:title>
+  <cs:trendline>
+    <cs:lnRef idx="0">
+      <cs:styleClr val="auto"/>
+    </cs:lnRef>
+    <cs:fillRef idx="0"/>
+    <cs:effectRef idx="0"/>
+    <cs:fontRef idx="minor">
+      <a:schemeClr val="tx1"/>
+    </cs:fontRef>
+    <cs:spPr>
+      <a:ln w="19050" cap="rnd">
+        <a:solidFill>
+          <a:schemeClr val="phClr"/>
+        </a:solidFill>
+        <a:prstDash val="sysDot"/>
+      </a:ln>
+    </cs:spPr>
+  </cs:trendline>
+  <cs:trendlineLabel>
+    <cs:lnRef idx="0"/>
+    <cs:fillRef idx="0"/>
+    <cs:effectRef idx="0"/>
+    <cs:fontRef idx="minor">
+      <a:schemeClr val="tx1">
+        <a:lumMod val="65000"/>
+        <a:lumOff val="35000"/>
+      </a:schemeClr>
+    </cs:fontRef>
+    <cs:defRPr sz="1197" kern="1200"/>
+  </cs:trendlineLabel>
+  <cs:upBar>
+    <cs:lnRef idx="0"/>
+    <cs:fillRef idx="0"/>
+    <cs:effectRef idx="0"/>
+    <cs:fontRef idx="minor">
+      <a:schemeClr val="tx1"/>
+    </cs:fontRef>
+    <cs:spPr>
+      <a:solidFill>
+        <a:schemeClr val="lt1"/>
+      </a:solidFill>
+      <a:ln w="9525" cap="flat" cmpd="sng" algn="ctr">
+        <a:solidFill>
+          <a:schemeClr val="tx1">
+            <a:lumMod val="65000"/>
+            <a:lumOff val="35000"/>
+          </a:schemeClr>
+        </a:solidFill>
+        <a:round/>
+      </a:ln>
+    </cs:spPr>
+  </cs:upBar>
+  <cs:valueAxis>
+    <cs:lnRef idx="0"/>
+    <cs:fillRef idx="0"/>
+    <cs:effectRef idx="0"/>
+    <cs:fontRef idx="minor">
+      <a:schemeClr val="tx1">
+        <a:lumMod val="65000"/>
+        <a:lumOff val="35000"/>
+      </a:schemeClr>
+    </cs:fontRef>
+    <cs:spPr>
+      <a:ln w="9525" cap="flat" cmpd="sng" algn="ctr">
+        <a:solidFill>
+          <a:schemeClr val="tx1">
+            <a:lumMod val="25000"/>
+            <a:lumOff val="75000"/>
+          </a:schemeClr>
+        </a:solidFill>
+        <a:round/>
+      </a:ln>
+    </cs:spPr>
+    <cs:defRPr sz="1197" kern="1200"/>
+  </cs:valueAxis>
+  <cs:wall>
+    <cs:lnRef idx="0"/>
+    <cs:fillRef idx="0"/>
+    <cs:effectRef idx="0"/>
+    <cs:fontRef idx="minor">
+      <a:schemeClr val="tx1"/>
+    </cs:fontRef>
+    <cs:spPr>
+      <a:noFill/>
+      <a:ln>
+        <a:noFill/>
+      </a:ln>
+    </cs:spPr>
+  </cs:wall>
+</cs:chartStyle>
 </file>
 
 <file path=ppt/handoutMasters/handoutMaster1.xml><?xml version="1.0" encoding="utf-8"?>
@@ -264,7 +2050,7 @@
           <a:p>
             <a:fld id="{C1255C68-584F-174D-BB81-51BF91708794}" type="datetimeFigureOut">
               <a:rPr lang="en-US" smtClean="0"/>
-              <a:t>5/30/25</a:t>
+              <a:t>6/13/25</a:t>
             </a:fld>
             <a:endParaRPr lang="en-US"/>
           </a:p>
@@ -441,7 +2227,7 @@
           <a:p>
             <a:fld id="{A1EDAAC4-819D-C544-9EA1-C73624CFD70B}" type="datetimeFigureOut">
               <a:rPr lang="en-US" smtClean="0"/>
-              <a:t>5/30/25</a:t>
+              <a:t>6/13/25</a:t>
             </a:fld>
             <a:endParaRPr lang="en-US"/>
           </a:p>
@@ -28123,14 +29909,14 @@
           <p:nvPr>
             <p:extLst>
               <p:ext uri="{D42A27DB-BD31-4B8C-83A1-F6EECF244321}">
-                <p14:modId xmlns:p14="http://schemas.microsoft.com/office/powerpoint/2010/main" val="226434136"/>
+                <p14:modId xmlns:p14="http://schemas.microsoft.com/office/powerpoint/2010/main" val="787610961"/>
               </p:ext>
             </p:extLst>
           </p:nvPr>
         </p:nvGraphicFramePr>
         <p:xfrm>
           <a:off x="514800" y="1466791"/>
-          <a:ext cx="11230868" cy="23742720"/>
+          <a:ext cx="11230868" cy="17341920"/>
         </p:xfrm>
         <a:graphic>
           <a:graphicData uri="http://schemas.openxmlformats.org/drawingml/2006/table">
@@ -28140,14 +29926,14 @@
                 <a:tableStyleId>{F2DE63D5-997A-4646-A377-4702673A728D}</a:tableStyleId>
               </a:tblPr>
               <a:tblGrid>
-                <a:gridCol w="443291">
+                <a:gridCol w="524291">
                   <a:extLst>
                     <a:ext uri="{9D8B030D-6E8A-4147-A177-3AD203B41FA5}">
                       <a16:colId xmlns:a16="http://schemas.microsoft.com/office/drawing/2014/main" val="1413959097"/>
                     </a:ext>
                   </a:extLst>
                 </a:gridCol>
-                <a:gridCol w="3083973">
+                <a:gridCol w="3002973">
                   <a:extLst>
                     <a:ext uri="{9D8B030D-6E8A-4147-A177-3AD203B41FA5}">
                       <a16:colId xmlns:a16="http://schemas.microsoft.com/office/drawing/2014/main" val="20000"/>
@@ -35835,6 +37621,924 @@
 </file>
 
 <file path=ppt/slides/slide5.xml><?xml version="1.0" encoding="utf-8"?>
+<p:sld xmlns:a="http://schemas.openxmlformats.org/drawingml/2006/main" xmlns:r="http://schemas.openxmlformats.org/officeDocument/2006/relationships" xmlns:p="http://schemas.openxmlformats.org/presentationml/2006/main">
+  <p:cSld>
+    <p:spTree>
+      <p:nvGrpSpPr>
+        <p:cNvPr id="1" name=""/>
+        <p:cNvGrpSpPr/>
+        <p:nvPr/>
+      </p:nvGrpSpPr>
+      <p:grpSpPr>
+        <a:xfrm>
+          <a:off x="0" y="0"/>
+          <a:ext cx="0" cy="0"/>
+          <a:chOff x="0" y="0"/>
+          <a:chExt cx="0" cy="0"/>
+        </a:xfrm>
+      </p:grpSpPr>
+      <p:sp>
+        <p:nvSpPr>
+          <p:cNvPr id="2" name="Slide Number Placeholder 1">
+            <a:extLst>
+              <a:ext uri="{FF2B5EF4-FFF2-40B4-BE49-F238E27FC236}">
+                <a16:creationId xmlns:a16="http://schemas.microsoft.com/office/drawing/2014/main" id="{5578F9F4-ED89-F956-1891-100EADA188EC}"/>
+              </a:ext>
+            </a:extLst>
+          </p:cNvPr>
+          <p:cNvSpPr>
+            <a:spLocks noGrp="1"/>
+          </p:cNvSpPr>
+          <p:nvPr>
+            <p:ph type="sldNum" sz="quarter" idx="4"/>
+          </p:nvPr>
+        </p:nvSpPr>
+        <p:spPr/>
+        <p:txBody>
+          <a:bodyPr/>
+          <a:lstStyle/>
+          <a:p>
+            <a:fld id="{E242BD21-9B61-2246-BCB1-4BE5E1BEBE1C}" type="slidenum">
+              <a:rPr lang="en-US" smtClean="0"/>
+              <a:pPr/>
+              <a:t>5</a:t>
+            </a:fld>
+            <a:endParaRPr lang="en-US"/>
+          </a:p>
+        </p:txBody>
+      </p:sp>
+      <p:sp>
+        <p:nvSpPr>
+          <p:cNvPr id="3" name="Text Placeholder 2">
+            <a:extLst>
+              <a:ext uri="{FF2B5EF4-FFF2-40B4-BE49-F238E27FC236}">
+                <a16:creationId xmlns:a16="http://schemas.microsoft.com/office/drawing/2014/main" id="{6B82B7C7-F4EF-4C86-EE64-B11C541DC5E2}"/>
+              </a:ext>
+            </a:extLst>
+          </p:cNvPr>
+          <p:cNvSpPr>
+            <a:spLocks noGrp="1"/>
+          </p:cNvSpPr>
+          <p:nvPr>
+            <p:ph type="body" sz="quarter" idx="12"/>
+          </p:nvPr>
+        </p:nvSpPr>
+        <p:spPr>
+          <a:xfrm>
+            <a:off x="2105790" y="169213"/>
+            <a:ext cx="9639877" cy="504206"/>
+          </a:xfrm>
+        </p:spPr>
+        <p:txBody>
+          <a:bodyPr/>
+          <a:lstStyle/>
+          <a:p>
+            <a:r>
+              <a:rPr lang="en-US" dirty="0"/>
+              <a:t>Key findings – </a:t>
+            </a:r>
+            <a:r>
+              <a:rPr lang="en-US" dirty="0">
+                <a:solidFill>
+                  <a:schemeClr val="accent3"/>
+                </a:solidFill>
+              </a:rPr>
+              <a:t>Cost estimation</a:t>
+            </a:r>
+          </a:p>
+          <a:p>
+            <a:endParaRPr lang="en-US"/>
+          </a:p>
+        </p:txBody>
+      </p:sp>
+      <p:sp>
+        <p:nvSpPr>
+          <p:cNvPr id="4" name="Title 3">
+            <a:extLst>
+              <a:ext uri="{FF2B5EF4-FFF2-40B4-BE49-F238E27FC236}">
+                <a16:creationId xmlns:a16="http://schemas.microsoft.com/office/drawing/2014/main" id="{6E56A6D8-09CB-7545-730D-D92AAEE73CA7}"/>
+              </a:ext>
+            </a:extLst>
+          </p:cNvPr>
+          <p:cNvSpPr>
+            <a:spLocks noGrp="1"/>
+          </p:cNvSpPr>
+          <p:nvPr>
+            <p:ph type="title"/>
+          </p:nvPr>
+        </p:nvSpPr>
+        <p:spPr/>
+        <p:txBody>
+          <a:bodyPr/>
+          <a:lstStyle/>
+          <a:p>
+            <a:r>
+              <a:rPr lang="en-US"/>
+              <a:t>Systems with the most technical debt</a:t>
+            </a:r>
+          </a:p>
+        </p:txBody>
+      </p:sp>
+      <p:sp>
+        <p:nvSpPr>
+          <p:cNvPr id="6" name="TextBox 5">
+            <a:extLst>
+              <a:ext uri="{FF2B5EF4-FFF2-40B4-BE49-F238E27FC236}">
+                <a16:creationId xmlns:a16="http://schemas.microsoft.com/office/drawing/2014/main" id="{777043DA-728E-44E3-4252-8FC6DEA66304}"/>
+              </a:ext>
+            </a:extLst>
+          </p:cNvPr>
+          <p:cNvSpPr txBox="1"/>
+          <p:nvPr/>
+        </p:nvSpPr>
+        <p:spPr>
+          <a:xfrm>
+            <a:off x="10058400" y="-373182"/>
+            <a:ext cx="3177686" cy="355162"/>
+          </a:xfrm>
+          <a:prstGeom prst="rect">
+            <a:avLst/>
+          </a:prstGeom>
+          <a:noFill/>
+        </p:spPr>
+        <p:txBody>
+          <a:bodyPr wrap="none" lIns="90000" rtlCol="0" anchor="t">
+            <a:spAutoFit/>
+          </a:bodyPr>
+          <a:lstStyle/>
+          <a:p>
+            <a:pPr algn="l">
+              <a:lnSpc>
+                <a:spcPct val="113000"/>
+              </a:lnSpc>
+            </a:pPr>
+            <a:r>
+              <a:rPr lang="en-US" sz="1600" dirty="0" err="1">
+                <a:solidFill>
+                  <a:schemeClr val="tx2"/>
+                </a:solidFill>
+              </a:rPr>
+              <a:t>TECHNICAL_DEBT_SYSTEMS_CHART</a:t>
+            </a:r>
+            <a:endParaRPr lang="en-US" sz="1600" dirty="0">
+              <a:solidFill>
+                <a:schemeClr val="tx2"/>
+              </a:solidFill>
+            </a:endParaRPr>
+          </a:p>
+        </p:txBody>
+      </p:sp>
+      <p:sp>
+        <p:nvSpPr>
+          <p:cNvPr id="7" name="TextBox 6">
+            <a:extLst>
+              <a:ext uri="{FF2B5EF4-FFF2-40B4-BE49-F238E27FC236}">
+                <a16:creationId xmlns:a16="http://schemas.microsoft.com/office/drawing/2014/main" id="{528FAD63-FD9D-D60C-90D1-A55EE503E9B1}"/>
+              </a:ext>
+            </a:extLst>
+          </p:cNvPr>
+          <p:cNvSpPr txBox="1"/>
+          <p:nvPr/>
+        </p:nvSpPr>
+        <p:spPr>
+          <a:xfrm>
+            <a:off x="478224" y="6317714"/>
+            <a:ext cx="6481667" cy="322332"/>
+          </a:xfrm>
+          <a:prstGeom prst="rect">
+            <a:avLst/>
+          </a:prstGeom>
+          <a:noFill/>
+        </p:spPr>
+        <p:txBody>
+          <a:bodyPr wrap="none" lIns="90000" rtlCol="0" anchor="t">
+            <a:spAutoFit/>
+          </a:bodyPr>
+          <a:lstStyle/>
+          <a:p>
+            <a:pPr algn="l">
+              <a:lnSpc>
+                <a:spcPct val="113000"/>
+              </a:lnSpc>
+            </a:pPr>
+            <a:r>
+              <a:rPr lang="en-US" sz="1400" i="1" dirty="0" err="1">
+                <a:solidFill>
+                  <a:schemeClr val="tx2"/>
+                </a:solidFill>
+              </a:rPr>
+              <a:t>Modernization analysis was performed on MODERNIZATION_SYSTEM_COUNT systems.</a:t>
+            </a:r>
+          </a:p>
+        </p:txBody>
+      </p:sp>
+      <p:graphicFrame>
+        <p:nvGraphicFramePr>
+          <p:cNvPr id="8" name="Chart 7">
+            <a:extLst>
+              <a:ext uri="{FF2B5EF4-FFF2-40B4-BE49-F238E27FC236}">
+                <a16:creationId xmlns:a16="http://schemas.microsoft.com/office/drawing/2014/main" id="{220D7F51-72F0-DC6F-B733-E9F269FA92FE}"/>
+              </a:ext>
+            </a:extLst>
+          </p:cNvPr>
+          <p:cNvGraphicFramePr/>
+          <p:nvPr>
+            <p:extLst>
+              <p:ext uri="{D42A27DB-BD31-4B8C-83A1-F6EECF244321}">
+                <p14:modId xmlns:p14="http://schemas.microsoft.com/office/powerpoint/2010/main" val="3802377821"/>
+              </p:ext>
+            </p:extLst>
+          </p:nvPr>
+        </p:nvGraphicFramePr>
+        <p:xfrm>
+          <a:off x="478224" y="1483096"/>
+          <a:ext cx="11267443" cy="4198376"/>
+        </p:xfrm>
+        <a:graphic>
+          <a:graphicData uri="http://schemas.openxmlformats.org/drawingml/2006/chart">
+            <c:chart xmlns:c="http://schemas.openxmlformats.org/drawingml/2006/chart" xmlns:r="http://schemas.openxmlformats.org/officeDocument/2006/relationships" r:id="rId2"/>
+          </a:graphicData>
+        </a:graphic>
+      </p:graphicFrame>
+      <p:sp>
+        <p:nvSpPr>
+          <p:cNvPr id="9" name="TextBox 8">
+            <a:extLst>
+              <a:ext uri="{FF2B5EF4-FFF2-40B4-BE49-F238E27FC236}">
+                <a16:creationId xmlns:a16="http://schemas.microsoft.com/office/drawing/2014/main" id="{907BA8D1-8150-E6E3-849C-0B4B4196A999}"/>
+              </a:ext>
+            </a:extLst>
+          </p:cNvPr>
+          <p:cNvSpPr txBox="1"/>
+          <p:nvPr/>
+        </p:nvSpPr>
+        <p:spPr>
+          <a:xfrm>
+            <a:off x="9880522" y="1193593"/>
+            <a:ext cx="1984474" cy="289503"/>
+          </a:xfrm>
+          <a:prstGeom prst="rect">
+            <a:avLst/>
+          </a:prstGeom>
+          <a:noFill/>
+        </p:spPr>
+        <p:txBody>
+          <a:bodyPr wrap="none" lIns="90000" rtlCol="0" anchor="t">
+            <a:spAutoFit/>
+          </a:bodyPr>
+          <a:lstStyle/>
+          <a:p>
+            <a:pPr algn="l">
+              <a:lnSpc>
+                <a:spcPct val="113000"/>
+              </a:lnSpc>
+            </a:pPr>
+            <a:r>
+              <a:rPr lang="en-US" sz="1200" dirty="0" err="1">
+                <a:solidFill>
+                  <a:schemeClr val="tx2"/>
+                </a:solidFill>
+              </a:rPr>
+              <a:t>Code volume in person years</a:t>
+            </a:r>
+          </a:p>
+        </p:txBody>
+      </p:sp>
+      <p:sp>
+        <p:nvSpPr>
+          <p:cNvPr id="10" name="TextBox 9">
+            <a:extLst>
+              <a:ext uri="{FF2B5EF4-FFF2-40B4-BE49-F238E27FC236}">
+                <a16:creationId xmlns:a16="http://schemas.microsoft.com/office/drawing/2014/main" id="{D4EA5188-42F3-957B-3D03-356F5A986459}"/>
+              </a:ext>
+            </a:extLst>
+          </p:cNvPr>
+          <p:cNvSpPr txBox="1"/>
+          <p:nvPr/>
+        </p:nvSpPr>
+        <p:spPr>
+          <a:xfrm>
+            <a:off x="7807069" y="5618547"/>
+            <a:ext cx="3768681" cy="320922"/>
+          </a:xfrm>
+          <a:prstGeom prst="rect">
+            <a:avLst/>
+          </a:prstGeom>
+          <a:noFill/>
+        </p:spPr>
+        <p:txBody>
+          <a:bodyPr wrap="none" lIns="90000" rtlCol="0" anchor="t">
+            <a:spAutoFit/>
+          </a:bodyPr>
+          <a:lstStyle/>
+          <a:p>
+            <a:pPr>
+              <a:lnSpc>
+                <a:spcPct val="113000"/>
+              </a:lnSpc>
+            </a:pPr>
+            <a:r>
+              <a:rPr lang="en-US" sz="1400" dirty="0" err="1">
+                <a:solidFill>
+                  <a:srgbClr val="E17526"/>
+                </a:solidFill>
+              </a:rPr>
+              <a:t>⬤</a:t>
+            </a:r>
+            <a:r>
+              <a:rPr lang="en-US" sz="1400" dirty="0" err="1">
+                <a:solidFill>
+                  <a:schemeClr val="tx2"/>
+                </a:solidFill>
+              </a:rPr>
+              <a:t>  Technical debt        </a:t>
+            </a:r>
+            <a:r>
+              <a:rPr lang="en-US" sz="1400" dirty="0" err="1">
+                <a:solidFill>
+                  <a:srgbClr val="C0CEDA"/>
+                </a:solidFill>
+              </a:rPr>
+              <a:t>⬤</a:t>
+            </a:r>
+            <a:r>
+              <a:rPr lang="en-US" sz="1400" dirty="0" err="1">
+                <a:solidFill>
+                  <a:schemeClr val="tx2"/>
+                </a:solidFill>
+              </a:rPr>
+              <a:t>  Remaining code volume</a:t>
+            </a:r>
+          </a:p>
+        </p:txBody>
+      </p:sp>
+    </p:spTree>
+    <p:extLst>
+      <p:ext uri="{BB962C8B-B14F-4D97-AF65-F5344CB8AC3E}">
+        <p14:creationId xmlns:p14="http://schemas.microsoft.com/office/powerpoint/2010/main" val="610074000"/>
+      </p:ext>
+    </p:extLst>
+  </p:cSld>
+  <p:clrMapOvr>
+    <a:masterClrMapping/>
+  </p:clrMapOvr>
+</p:sld>
+</file>
+
+<file path=ppt/slides/slide6.xml><?xml version="1.0" encoding="utf-8"?>
+<p:sld xmlns:a="http://schemas.openxmlformats.org/drawingml/2006/main" xmlns:r="http://schemas.openxmlformats.org/officeDocument/2006/relationships" xmlns:p="http://schemas.openxmlformats.org/presentationml/2006/main">
+  <p:cSld>
+    <p:spTree>
+      <p:nvGrpSpPr>
+        <p:cNvPr id="1" name="">
+          <a:extLst>
+            <a:ext uri="{FF2B5EF4-FFF2-40B4-BE49-F238E27FC236}">
+              <a16:creationId xmlns:a16="http://schemas.microsoft.com/office/drawing/2014/main" id="{FE4DF886-A81C-4A0E-6FCD-3BE49FCA3DF3}"/>
+            </a:ext>
+          </a:extLst>
+        </p:cNvPr>
+        <p:cNvGrpSpPr/>
+        <p:nvPr/>
+      </p:nvGrpSpPr>
+      <p:grpSpPr>
+        <a:xfrm>
+          <a:off x="0" y="0"/>
+          <a:ext cx="0" cy="0"/>
+          <a:chOff x="0" y="0"/>
+          <a:chExt cx="0" cy="0"/>
+        </a:xfrm>
+      </p:grpSpPr>
+      <p:sp>
+        <p:nvSpPr>
+          <p:cNvPr id="2" name="Slide Number Placeholder 1">
+            <a:extLst>
+              <a:ext uri="{FF2B5EF4-FFF2-40B4-BE49-F238E27FC236}">
+                <a16:creationId xmlns:a16="http://schemas.microsoft.com/office/drawing/2014/main" id="{02F41744-6095-9476-FF65-F52E3A93C6CD}"/>
+              </a:ext>
+            </a:extLst>
+          </p:cNvPr>
+          <p:cNvSpPr>
+            <a:spLocks noGrp="1"/>
+          </p:cNvSpPr>
+          <p:nvPr>
+            <p:ph type="sldNum" sz="quarter" idx="4"/>
+          </p:nvPr>
+        </p:nvSpPr>
+        <p:spPr/>
+        <p:txBody>
+          <a:bodyPr/>
+          <a:lstStyle/>
+          <a:p>
+            <a:fld id="{E242BD21-9B61-2246-BCB1-4BE5E1BEBE1C}" type="slidenum">
+              <a:rPr lang="en-US" smtClean="0"/>
+              <a:pPr/>
+              <a:t>6</a:t>
+            </a:fld>
+            <a:endParaRPr lang="en-US"/>
+          </a:p>
+        </p:txBody>
+      </p:sp>
+      <p:sp>
+        <p:nvSpPr>
+          <p:cNvPr id="3" name="Text Placeholder 2">
+            <a:extLst>
+              <a:ext uri="{FF2B5EF4-FFF2-40B4-BE49-F238E27FC236}">
+                <a16:creationId xmlns:a16="http://schemas.microsoft.com/office/drawing/2014/main" id="{04BF57BF-8092-E114-5769-D4C82E742FD1}"/>
+              </a:ext>
+            </a:extLst>
+          </p:cNvPr>
+          <p:cNvSpPr>
+            <a:spLocks noGrp="1"/>
+          </p:cNvSpPr>
+          <p:nvPr>
+            <p:ph type="body" sz="quarter" idx="12"/>
+          </p:nvPr>
+        </p:nvSpPr>
+        <p:spPr>
+          <a:xfrm>
+            <a:off x="2105790" y="169213"/>
+            <a:ext cx="9639877" cy="504206"/>
+          </a:xfrm>
+        </p:spPr>
+        <p:txBody>
+          <a:bodyPr/>
+          <a:lstStyle/>
+          <a:p>
+            <a:r>
+              <a:rPr lang="en-US" dirty="0"/>
+              <a:t>Key findings – </a:t>
+            </a:r>
+            <a:r>
+              <a:rPr lang="en-US" dirty="0">
+                <a:solidFill>
+                  <a:schemeClr val="accent3"/>
+                </a:solidFill>
+              </a:rPr>
+              <a:t>Cost estimation</a:t>
+            </a:r>
+          </a:p>
+          <a:p>
+            <a:endParaRPr lang="en-US"/>
+          </a:p>
+        </p:txBody>
+      </p:sp>
+      <p:sp>
+        <p:nvSpPr>
+          <p:cNvPr id="4" name="Title 3">
+            <a:extLst>
+              <a:ext uri="{FF2B5EF4-FFF2-40B4-BE49-F238E27FC236}">
+                <a16:creationId xmlns:a16="http://schemas.microsoft.com/office/drawing/2014/main" id="{8600AE25-DFA8-CE88-5B65-AEFB78172E8A}"/>
+              </a:ext>
+            </a:extLst>
+          </p:cNvPr>
+          <p:cNvSpPr>
+            <a:spLocks noGrp="1"/>
+          </p:cNvSpPr>
+          <p:nvPr>
+            <p:ph type="title"/>
+          </p:nvPr>
+        </p:nvSpPr>
+        <p:spPr/>
+        <p:txBody>
+          <a:bodyPr/>
+          <a:lstStyle/>
+          <a:p>
+            <a:r>
+              <a:rPr lang="en-US"/>
+              <a:t>Top modernization candidates: Estimated technical benefits versus effort</a:t>
+            </a:r>
+          </a:p>
+        </p:txBody>
+      </p:sp>
+      <p:sp>
+        <p:nvSpPr>
+          <p:cNvPr id="6" name="TextBox 5">
+            <a:extLst>
+              <a:ext uri="{FF2B5EF4-FFF2-40B4-BE49-F238E27FC236}">
+                <a16:creationId xmlns:a16="http://schemas.microsoft.com/office/drawing/2014/main" id="{009D56D2-B9FA-4135-E5E1-F63E2C139CCE}"/>
+              </a:ext>
+            </a:extLst>
+          </p:cNvPr>
+          <p:cNvSpPr txBox="1"/>
+          <p:nvPr/>
+        </p:nvSpPr>
+        <p:spPr>
+          <a:xfrm>
+            <a:off x="10058400" y="-373182"/>
+            <a:ext cx="3648263" cy="355162"/>
+          </a:xfrm>
+          <a:prstGeom prst="rect">
+            <a:avLst/>
+          </a:prstGeom>
+          <a:noFill/>
+        </p:spPr>
+        <p:txBody>
+          <a:bodyPr wrap="none" lIns="90000" rtlCol="0" anchor="t">
+            <a:spAutoFit/>
+          </a:bodyPr>
+          <a:lstStyle/>
+          <a:p>
+            <a:pPr algn="l">
+              <a:lnSpc>
+                <a:spcPct val="113000"/>
+              </a:lnSpc>
+            </a:pPr>
+            <a:r>
+              <a:rPr lang="en-US" sz="1600" dirty="0" err="1">
+                <a:solidFill>
+                  <a:schemeClr val="tx2"/>
+                </a:solidFill>
+              </a:rPr>
+              <a:t>MODERNIZATION_SCATTER_PLOT_CHART</a:t>
+            </a:r>
+            <a:endParaRPr lang="en-US" sz="1600" dirty="0">
+              <a:solidFill>
+                <a:schemeClr val="tx2"/>
+              </a:solidFill>
+            </a:endParaRPr>
+          </a:p>
+        </p:txBody>
+      </p:sp>
+      <p:sp>
+        <p:nvSpPr>
+          <p:cNvPr id="7" name="TextBox 6">
+            <a:extLst>
+              <a:ext uri="{FF2B5EF4-FFF2-40B4-BE49-F238E27FC236}">
+                <a16:creationId xmlns:a16="http://schemas.microsoft.com/office/drawing/2014/main" id="{F1AE3CDC-A5AE-B588-AF02-77F4F7158C1C}"/>
+              </a:ext>
+            </a:extLst>
+          </p:cNvPr>
+          <p:cNvSpPr txBox="1"/>
+          <p:nvPr/>
+        </p:nvSpPr>
+        <p:spPr>
+          <a:xfrm>
+            <a:off x="478224" y="6317714"/>
+            <a:ext cx="6481667" cy="322332"/>
+          </a:xfrm>
+          <a:prstGeom prst="rect">
+            <a:avLst/>
+          </a:prstGeom>
+          <a:noFill/>
+        </p:spPr>
+        <p:txBody>
+          <a:bodyPr wrap="none" lIns="90000" rtlCol="0" anchor="t">
+            <a:spAutoFit/>
+          </a:bodyPr>
+          <a:lstStyle/>
+          <a:p>
+            <a:pPr algn="l">
+              <a:lnSpc>
+                <a:spcPct val="113000"/>
+              </a:lnSpc>
+            </a:pPr>
+            <a:r>
+              <a:rPr lang="en-US" sz="1400" i="1" dirty="0" err="1">
+                <a:solidFill>
+                  <a:schemeClr val="tx2"/>
+                </a:solidFill>
+              </a:rPr>
+              <a:t>Modernization analysis was performed on MODERNIZATION_SYSTEM_COUNT systems.</a:t>
+            </a:r>
+          </a:p>
+        </p:txBody>
+      </p:sp>
+      <p:sp>
+        <p:nvSpPr>
+          <p:cNvPr id="9" name="TextBox 8">
+            <a:extLst>
+              <a:ext uri="{FF2B5EF4-FFF2-40B4-BE49-F238E27FC236}">
+                <a16:creationId xmlns:a16="http://schemas.microsoft.com/office/drawing/2014/main" id="{41DD329B-7B5E-5594-AA10-E59357E3F4A1}"/>
+              </a:ext>
+            </a:extLst>
+          </p:cNvPr>
+          <p:cNvSpPr txBox="1"/>
+          <p:nvPr/>
+        </p:nvSpPr>
+        <p:spPr>
+          <a:xfrm>
+            <a:off x="1915875" y="1454041"/>
+            <a:ext cx="1289605" cy="498150"/>
+          </a:xfrm>
+          <a:prstGeom prst="rect">
+            <a:avLst/>
+          </a:prstGeom>
+          <a:noFill/>
+        </p:spPr>
+        <p:txBody>
+          <a:bodyPr wrap="none" lIns="90000" rtlCol="0" anchor="t">
+            <a:spAutoFit/>
+          </a:bodyPr>
+          <a:lstStyle/>
+          <a:p>
+            <a:pPr algn="r">
+              <a:lnSpc>
+                <a:spcPct val="113000"/>
+              </a:lnSpc>
+            </a:pPr>
+            <a:r>
+              <a:rPr lang="en-US" sz="1200" dirty="0" err="1">
+                <a:solidFill>
+                  <a:schemeClr val="tx2"/>
+                </a:solidFill>
+              </a:rPr>
+              <a:t>Estimated change</a:t>
+            </a:r>
+            <a:br>
+              <a:rPr lang="en-US" sz="1200" dirty="0" err="1">
+                <a:solidFill>
+                  <a:schemeClr val="tx2"/>
+                </a:solidFill>
+              </a:rPr>
+            </a:br>
+            <a:r>
+              <a:rPr lang="en-US" sz="1200" dirty="0" err="1">
+                <a:solidFill>
+                  <a:schemeClr val="tx2"/>
+                </a:solidFill>
+              </a:rPr>
+              <a:t>speed increase %</a:t>
+            </a:r>
+          </a:p>
+        </p:txBody>
+      </p:sp>
+      <p:sp>
+        <p:nvSpPr>
+          <p:cNvPr id="5" name="TextBox 4">
+            <a:extLst>
+              <a:ext uri="{FF2B5EF4-FFF2-40B4-BE49-F238E27FC236}">
+                <a16:creationId xmlns:a16="http://schemas.microsoft.com/office/drawing/2014/main" id="{418D4FAD-46DE-E90D-A6F1-58C401FBAA15}"/>
+              </a:ext>
+            </a:extLst>
+          </p:cNvPr>
+          <p:cNvSpPr txBox="1"/>
+          <p:nvPr/>
+        </p:nvSpPr>
+        <p:spPr>
+          <a:xfrm>
+            <a:off x="8986520" y="5830039"/>
+            <a:ext cx="2172218" cy="289503"/>
+          </a:xfrm>
+          <a:prstGeom prst="rect">
+            <a:avLst/>
+          </a:prstGeom>
+          <a:noFill/>
+        </p:spPr>
+        <p:txBody>
+          <a:bodyPr wrap="none" lIns="90000" rtlCol="0" anchor="t">
+            <a:spAutoFit/>
+          </a:bodyPr>
+          <a:lstStyle/>
+          <a:p>
+            <a:pPr algn="l">
+              <a:lnSpc>
+                <a:spcPct val="113000"/>
+              </a:lnSpc>
+            </a:pPr>
+            <a:r>
+              <a:rPr lang="en-US" sz="1200" dirty="0" err="1">
+                <a:solidFill>
+                  <a:schemeClr val="tx2"/>
+                </a:solidFill>
+              </a:rPr>
+              <a:t>Estimated effort in person years</a:t>
+            </a:r>
+          </a:p>
+        </p:txBody>
+      </p:sp>
+      <p:graphicFrame>
+        <p:nvGraphicFramePr>
+          <p:cNvPr id="10" name="Chart 9">
+            <a:extLst>
+              <a:ext uri="{FF2B5EF4-FFF2-40B4-BE49-F238E27FC236}">
+                <a16:creationId xmlns:a16="http://schemas.microsoft.com/office/drawing/2014/main" id="{FA04012A-8076-57D9-16E6-FD4DB5AABD99}"/>
+              </a:ext>
+            </a:extLst>
+          </p:cNvPr>
+          <p:cNvGraphicFramePr/>
+          <p:nvPr>
+            <p:extLst>
+              <p:ext uri="{D42A27DB-BD31-4B8C-83A1-F6EECF244321}">
+                <p14:modId xmlns:p14="http://schemas.microsoft.com/office/powerpoint/2010/main" val="1381336464"/>
+              </p:ext>
+            </p:extLst>
+          </p:nvPr>
+        </p:nvGraphicFramePr>
+        <p:xfrm>
+          <a:off x="3205480" y="1258969"/>
+          <a:ext cx="5781040" cy="4884957"/>
+        </p:xfrm>
+        <a:graphic>
+          <a:graphicData uri="http://schemas.openxmlformats.org/drawingml/2006/chart">
+            <c:chart xmlns:c="http://schemas.openxmlformats.org/drawingml/2006/chart" xmlns:r="http://schemas.openxmlformats.org/officeDocument/2006/relationships" r:id="rId2"/>
+          </a:graphicData>
+        </a:graphic>
+      </p:graphicFrame>
+      <p:sp>
+        <p:nvSpPr>
+          <p:cNvPr id="11" name="TextBox 10">
+            <a:extLst>
+              <a:ext uri="{FF2B5EF4-FFF2-40B4-BE49-F238E27FC236}">
+                <a16:creationId xmlns:a16="http://schemas.microsoft.com/office/drawing/2014/main" id="{FAC59350-5BAE-C14A-E256-A8547FC717B5}"/>
+              </a:ext>
+            </a:extLst>
+          </p:cNvPr>
+          <p:cNvSpPr txBox="1"/>
+          <p:nvPr/>
+        </p:nvSpPr>
+        <p:spPr>
+          <a:xfrm>
+            <a:off x="8989693" y="2764630"/>
+            <a:ext cx="1559166" cy="1538242"/>
+          </a:xfrm>
+          <a:prstGeom prst="rect">
+            <a:avLst/>
+          </a:prstGeom>
+          <a:noFill/>
+        </p:spPr>
+        <p:txBody>
+          <a:bodyPr wrap="none" lIns="90000" rtlCol="0" anchor="t">
+            <a:spAutoFit/>
+          </a:bodyPr>
+          <a:lstStyle/>
+          <a:p>
+            <a:pPr>
+              <a:lnSpc>
+                <a:spcPct val="113000"/>
+              </a:lnSpc>
+            </a:pPr>
+            <a:r>
+              <a:rPr lang="en-US" sz="1400" b="1" dirty="0" err="1">
+                <a:solidFill>
+                  <a:schemeClr val="tx2"/>
+                </a:solidFill>
+              </a:rPr>
+              <a:t>Business criticality</a:t>
+            </a:r>
+          </a:p>
+          <a:p>
+            <a:pPr>
+              <a:lnSpc>
+                <a:spcPct val="113000"/>
+              </a:lnSpc>
+            </a:pPr>
+            <a:r>
+              <a:rPr lang="en-US" sz="1400" dirty="0" err="1">
+                <a:solidFill>
+                  <a:srgbClr val="003DAB"/>
+                </a:solidFill>
+              </a:rPr>
+              <a:t>⬤</a:t>
+            </a:r>
+            <a:r>
+              <a:rPr lang="en-US" sz="1400" dirty="0" err="1">
+                <a:solidFill>
+                  <a:schemeClr val="tx2"/>
+                </a:solidFill>
+              </a:rPr>
+              <a:t>  Critical</a:t>
+            </a:r>
+          </a:p>
+          <a:p>
+            <a:pPr>
+              <a:lnSpc>
+                <a:spcPct val="113000"/>
+              </a:lnSpc>
+            </a:pPr>
+            <a:r>
+              <a:rPr lang="en-US" sz="1400" dirty="0" err="1">
+                <a:solidFill>
+                  <a:srgbClr val="2E6BFF"/>
+                </a:solidFill>
+              </a:rPr>
+              <a:t>⬤</a:t>
+            </a:r>
+            <a:r>
+              <a:rPr lang="en-US" sz="1400" dirty="0" err="1">
+                <a:solidFill>
+                  <a:srgbClr val="E17526"/>
+                </a:solidFill>
+              </a:rPr>
+              <a:t> </a:t>
+            </a:r>
+            <a:r>
+              <a:rPr lang="en-US" sz="1400" dirty="0" err="1">
+                <a:solidFill>
+                  <a:schemeClr val="tx2"/>
+                </a:solidFill>
+              </a:rPr>
+              <a:t> High</a:t>
+            </a:r>
+          </a:p>
+          <a:p>
+            <a:pPr>
+              <a:lnSpc>
+                <a:spcPct val="113000"/>
+              </a:lnSpc>
+            </a:pPr>
+            <a:r>
+              <a:rPr lang="en-US" sz="1400" dirty="0" err="1">
+                <a:solidFill>
+                  <a:srgbClr val="8DA8FF"/>
+                </a:solidFill>
+              </a:rPr>
+              <a:t>⬤</a:t>
+            </a:r>
+            <a:r>
+              <a:rPr lang="en-US" sz="1400" dirty="0" err="1">
+                <a:solidFill>
+                  <a:srgbClr val="E17526"/>
+                </a:solidFill>
+              </a:rPr>
+              <a:t> </a:t>
+            </a:r>
+            <a:r>
+              <a:rPr lang="en-US" sz="1400" dirty="0" err="1">
+                <a:solidFill>
+                  <a:schemeClr val="tx2"/>
+                </a:solidFill>
+              </a:rPr>
+              <a:t> Medium</a:t>
+            </a:r>
+          </a:p>
+          <a:p>
+            <a:pPr>
+              <a:lnSpc>
+                <a:spcPct val="113000"/>
+              </a:lnSpc>
+            </a:pPr>
+            <a:r>
+              <a:rPr lang="en-US" sz="1400" dirty="0" err="1">
+                <a:solidFill>
+                  <a:srgbClr val="DBE1FF"/>
+                </a:solidFill>
+              </a:rPr>
+              <a:t>⬤</a:t>
+            </a:r>
+            <a:r>
+              <a:rPr lang="en-US" sz="1400" dirty="0" err="1">
+                <a:solidFill>
+                  <a:srgbClr val="E17526"/>
+                </a:solidFill>
+              </a:rPr>
+              <a:t> </a:t>
+            </a:r>
+            <a:r>
+              <a:rPr lang="en-US" sz="1400" dirty="0" err="1">
+                <a:solidFill>
+                  <a:schemeClr val="tx2"/>
+                </a:solidFill>
+              </a:rPr>
+              <a:t> Low</a:t>
+            </a:r>
+          </a:p>
+          <a:p>
+            <a:pPr>
+              <a:lnSpc>
+                <a:spcPct val="113000"/>
+              </a:lnSpc>
+            </a:pPr>
+            <a:r>
+              <a:rPr lang="en-US" sz="1400" dirty="0" err="1">
+                <a:solidFill>
+                  <a:srgbClr val="8A98A8"/>
+                </a:solidFill>
+              </a:rPr>
+              <a:t>⬤</a:t>
+            </a:r>
+            <a:r>
+              <a:rPr lang="en-US" sz="1400" dirty="0" err="1">
+                <a:solidFill>
+                  <a:srgbClr val="E17526"/>
+                </a:solidFill>
+              </a:rPr>
+              <a:t> </a:t>
+            </a:r>
+            <a:r>
+              <a:rPr lang="en-US" sz="1400" dirty="0" err="1">
+                <a:solidFill>
+                  <a:schemeClr val="tx2"/>
+                </a:solidFill>
+              </a:rPr>
+              <a:t> Unknown</a:t>
+            </a:r>
+          </a:p>
+        </p:txBody>
+      </p:sp>
+    </p:spTree>
+    <p:extLst>
+      <p:ext uri="{BB962C8B-B14F-4D97-AF65-F5344CB8AC3E}">
+        <p14:creationId xmlns:p14="http://schemas.microsoft.com/office/powerpoint/2010/main" val="2061729025"/>
+      </p:ext>
+    </p:extLst>
+  </p:cSld>
+  <p:clrMapOvr>
+    <a:masterClrMapping/>
+  </p:clrMapOvr>
+</p:sld>
+</file>
+
+<file path=ppt/slides/slide7.xml><?xml version="1.0" encoding="utf-8"?>
 <p:sld xmlns:a="http://schemas.openxmlformats.org/drawingml/2006/main" xmlns:r="http://schemas.openxmlformats.org/officeDocument/2006/relationships" xmlns:p="http://schemas.openxmlformats.org/presentationml/2006/main">
   <p:cSld>
     <p:spTree>

</xml_diff>

<commit_message>
Add management summary to modernization report.
</commit_message>
<xml_diff>
--- a/report-generator/src/report_generator/presets/templates/modernization.pptx
+++ b/report-generator/src/report_generator/presets/templates/modernization.pptx
@@ -5,19 +5,20 @@
     <p:sldMasterId id="2147483648" r:id="rId4"/>
   </p:sldMasterIdLst>
   <p:notesMasterIdLst>
-    <p:notesMasterId r:id="rId12"/>
+    <p:notesMasterId r:id="rId13"/>
   </p:notesMasterIdLst>
   <p:handoutMasterIdLst>
-    <p:handoutMasterId r:id="rId13"/>
+    <p:handoutMasterId r:id="rId14"/>
   </p:handoutMasterIdLst>
   <p:sldIdLst>
     <p:sldId id="561" r:id="rId5"/>
     <p:sldId id="1547" r:id="rId6"/>
     <p:sldId id="1507" r:id="rId7"/>
-    <p:sldId id="1763" r:id="rId8"/>
-    <p:sldId id="1764" r:id="rId9"/>
-    <p:sldId id="1765" r:id="rId10"/>
-    <p:sldId id="597" r:id="rId11"/>
+    <p:sldId id="1766" r:id="rId8"/>
+    <p:sldId id="1763" r:id="rId9"/>
+    <p:sldId id="1764" r:id="rId10"/>
+    <p:sldId id="1765" r:id="rId11"/>
+    <p:sldId id="597" r:id="rId12"/>
   </p:sldIdLst>
   <p:sldSz cx="12192000" cy="6858000"/>
   <p:notesSz cx="6858000" cy="9144000"/>
@@ -127,6 +128,7 @@
             <p14:sldId id="561"/>
             <p14:sldId id="1547"/>
             <p14:sldId id="1507"/>
+            <p14:sldId id="1766"/>
             <p14:sldId id="1763"/>
             <p14:sldId id="1764"/>
             <p14:sldId id="1765"/>
@@ -245,7 +247,7 @@
                 </a:outerShdw>
               </a:effectLst>
             </c:spPr>
-            <c:extLst xmlns:w="http://schemas.openxmlformats.org/wordprocessingml/2006/main" xmlns:w15="http://schemas.microsoft.com/office/word/2012/wordml" xmlns:w14="http://schemas.microsoft.com/office/word/2010/wordml" xmlns:m="http://schemas.openxmlformats.org/officeDocument/2006/math" xmlns:wp="http://schemas.openxmlformats.org/drawingml/2006/wordprocessingDrawing" xmlns:wp14="http://schemas.microsoft.com/office/word/2010/wordprocessingDrawing" xmlns:mc="http://schemas.openxmlformats.org/markup-compatibility/2006" xmlns:sl="http://schemas.openxmlformats.org/schemaLibrary/2006/main" xmlns:wne="http://schemas.microsoft.com/office/word/2006/wordml" xmlns:cdr="http://schemas.openxmlformats.org/drawingml/2006/chartDrawing" xmlns:c14="http://schemas.microsoft.com/office/drawing/2007/8/2/chart" xmlns:dgm="http://schemas.openxmlformats.org/drawingml/2006/diagram" xmlns:pic="http://schemas.openxmlformats.org/drawingml/2006/picture" xmlns:xdr="http://schemas.openxmlformats.org/drawingml/2006/spreadsheetDrawing" xmlns:dsp="http://schemas.microsoft.com/office/drawing/2008/diagram" xmlns:xvml="urn:schemas-microsoft-com:office:excel" xmlns:o="urn:schemas-microsoft-com:office:office" xmlns:v="urn:schemas-microsoft-com:vml" xmlns:w10="urn:schemas-microsoft-com:office:word" xmlns:pvml="urn:schemas-microsoft-com:office:powerpoint" xmlns:cppr="http://schemas.microsoft.com/office/2006/coverPageProps" xmlns:odx="http://opendope.org/xpaths" xmlns:odc="http://opendope.org/conditions" xmlns:odq="http://opendope.org/questions" xmlns:oda="http://opendope.org/answers" xmlns:odi="http://opendope.org/components" xmlns:odgm="http://opendope.org/SmartArt/DataHierarchy" xmlns:b="http://schemas.openxmlformats.org/officeDocument/2006/bibliography" xmlns:wps="http://schemas.microsoft.com/office/word/2010/wordprocessingShape" xmlns:w16se="http://schemas.microsoft.com/office/word/2015/wordml/symex" xmlns:w16cid="http://schemas.microsoft.com/office/word/2016/wordml/cid" xmlns:wetp="http://schemas.microsoft.com/office/webextensions/taskpanes/2010/11" xmlns:we="http://schemas.microsoft.com/office/webextensions/webextension/2010/11" xmlns:comp="http://schemas.openxmlformats.org/drawingml/2006/compatibility" xmlns:lc="http://schemas.openxmlformats.org/drawingml/2006/lockedCanvas">
+            <c:extLst xmlns:lc="http://schemas.openxmlformats.org/drawingml/2006/lockedCanvas" xmlns:comp="http://schemas.openxmlformats.org/drawingml/2006/compatibility" xmlns:we="http://schemas.microsoft.com/office/webextensions/webextension/2010/11" xmlns:wetp="http://schemas.microsoft.com/office/webextensions/taskpanes/2010/11" xmlns:w16cid="http://schemas.microsoft.com/office/word/2016/wordml/cid" xmlns:w16se="http://schemas.microsoft.com/office/word/2015/wordml/symex" xmlns:wps="http://schemas.microsoft.com/office/word/2010/wordprocessingShape" xmlns:b="http://schemas.openxmlformats.org/officeDocument/2006/bibliography" xmlns:odgm="http://opendope.org/SmartArt/DataHierarchy" xmlns:odi="http://opendope.org/components" xmlns:oda="http://opendope.org/answers" xmlns:odq="http://opendope.org/questions" xmlns:odc="http://opendope.org/conditions" xmlns:odx="http://opendope.org/xpaths" xmlns:cppr="http://schemas.microsoft.com/office/2006/coverPageProps" xmlns:pvml="urn:schemas-microsoft-com:office:powerpoint" xmlns:w10="urn:schemas-microsoft-com:office:word" xmlns:v="urn:schemas-microsoft-com:vml" xmlns:o="urn:schemas-microsoft-com:office:office" xmlns:xvml="urn:schemas-microsoft-com:office:excel" xmlns:dsp="http://schemas.microsoft.com/office/drawing/2008/diagram" xmlns:xdr="http://schemas.openxmlformats.org/drawingml/2006/spreadsheetDrawing" xmlns:pic="http://schemas.openxmlformats.org/drawingml/2006/picture" xmlns:dgm="http://schemas.openxmlformats.org/drawingml/2006/diagram" xmlns:c14="http://schemas.microsoft.com/office/drawing/2007/8/2/chart" xmlns:cdr="http://schemas.openxmlformats.org/drawingml/2006/chartDrawing" xmlns:wne="http://schemas.microsoft.com/office/word/2006/wordml" xmlns:sl="http://schemas.openxmlformats.org/schemaLibrary/2006/main" xmlns:mc="http://schemas.openxmlformats.org/markup-compatibility/2006" xmlns:wp14="http://schemas.microsoft.com/office/word/2010/wordprocessingDrawing" xmlns:wp="http://schemas.openxmlformats.org/drawingml/2006/wordprocessingDrawing" xmlns:m="http://schemas.openxmlformats.org/officeDocument/2006/math" xmlns:w14="http://schemas.microsoft.com/office/word/2010/wordml" xmlns:w15="http://schemas.microsoft.com/office/word/2012/wordml" xmlns:w="http://schemas.openxmlformats.org/wordprocessingml/2006/main">
               <c:ext xmlns:c16="http://schemas.microsoft.com/office/drawing/2014/chart" uri="{C3380CC4-5D6E-409C-BE32-E72D297353CC}">
                 <c16:uniqueId val="{00000001-8D46-3D4B-996A-4B880DC4E095}"/>
               </c:ext>
@@ -328,7 +330,7 @@
               </c:numCache>
             </c:numRef>
           </c:val>
-          <c:extLst xmlns:w="http://schemas.openxmlformats.org/wordprocessingml/2006/main" xmlns:w15="http://schemas.microsoft.com/office/word/2012/wordml" xmlns:w14="http://schemas.microsoft.com/office/word/2010/wordml" xmlns:m="http://schemas.openxmlformats.org/officeDocument/2006/math" xmlns:wp="http://schemas.openxmlformats.org/drawingml/2006/wordprocessingDrawing" xmlns:wp14="http://schemas.microsoft.com/office/word/2010/wordprocessingDrawing" xmlns:mc="http://schemas.openxmlformats.org/markup-compatibility/2006" xmlns:sl="http://schemas.openxmlformats.org/schemaLibrary/2006/main" xmlns:wne="http://schemas.microsoft.com/office/word/2006/wordml" xmlns:cdr="http://schemas.openxmlformats.org/drawingml/2006/chartDrawing" xmlns:c14="http://schemas.microsoft.com/office/drawing/2007/8/2/chart" xmlns:dgm="http://schemas.openxmlformats.org/drawingml/2006/diagram" xmlns:pic="http://schemas.openxmlformats.org/drawingml/2006/picture" xmlns:xdr="http://schemas.openxmlformats.org/drawingml/2006/spreadsheetDrawing" xmlns:dsp="http://schemas.microsoft.com/office/drawing/2008/diagram" xmlns:xvml="urn:schemas-microsoft-com:office:excel" xmlns:o="urn:schemas-microsoft-com:office:office" xmlns:v="urn:schemas-microsoft-com:vml" xmlns:w10="urn:schemas-microsoft-com:office:word" xmlns:pvml="urn:schemas-microsoft-com:office:powerpoint" xmlns:cppr="http://schemas.microsoft.com/office/2006/coverPageProps" xmlns:odx="http://opendope.org/xpaths" xmlns:odc="http://opendope.org/conditions" xmlns:odq="http://opendope.org/questions" xmlns:oda="http://opendope.org/answers" xmlns:odi="http://opendope.org/components" xmlns:odgm="http://opendope.org/SmartArt/DataHierarchy" xmlns:b="http://schemas.openxmlformats.org/officeDocument/2006/bibliography" xmlns:wps="http://schemas.microsoft.com/office/word/2010/wordprocessingShape" xmlns:w16se="http://schemas.microsoft.com/office/word/2015/wordml/symex" xmlns:w16cid="http://schemas.microsoft.com/office/word/2016/wordml/cid" xmlns:wetp="http://schemas.microsoft.com/office/webextensions/taskpanes/2010/11" xmlns:we="http://schemas.microsoft.com/office/webextensions/webextension/2010/11" xmlns:comp="http://schemas.openxmlformats.org/drawingml/2006/compatibility" xmlns:lc="http://schemas.openxmlformats.org/drawingml/2006/lockedCanvas">
+          <c:extLst xmlns:lc="http://schemas.openxmlformats.org/drawingml/2006/lockedCanvas" xmlns:comp="http://schemas.openxmlformats.org/drawingml/2006/compatibility" xmlns:we="http://schemas.microsoft.com/office/webextensions/webextension/2010/11" xmlns:wetp="http://schemas.microsoft.com/office/webextensions/taskpanes/2010/11" xmlns:w16cid="http://schemas.microsoft.com/office/word/2016/wordml/cid" xmlns:w16se="http://schemas.microsoft.com/office/word/2015/wordml/symex" xmlns:wps="http://schemas.microsoft.com/office/word/2010/wordprocessingShape" xmlns:b="http://schemas.openxmlformats.org/officeDocument/2006/bibliography" xmlns:odgm="http://opendope.org/SmartArt/DataHierarchy" xmlns:odi="http://opendope.org/components" xmlns:oda="http://opendope.org/answers" xmlns:odq="http://opendope.org/questions" xmlns:odc="http://opendope.org/conditions" xmlns:odx="http://opendope.org/xpaths" xmlns:cppr="http://schemas.microsoft.com/office/2006/coverPageProps" xmlns:pvml="urn:schemas-microsoft-com:office:powerpoint" xmlns:w10="urn:schemas-microsoft-com:office:word" xmlns:v="urn:schemas-microsoft-com:vml" xmlns:o="urn:schemas-microsoft-com:office:office" xmlns:xvml="urn:schemas-microsoft-com:office:excel" xmlns:dsp="http://schemas.microsoft.com/office/drawing/2008/diagram" xmlns:xdr="http://schemas.openxmlformats.org/drawingml/2006/spreadsheetDrawing" xmlns:pic="http://schemas.openxmlformats.org/drawingml/2006/picture" xmlns:dgm="http://schemas.openxmlformats.org/drawingml/2006/diagram" xmlns:c14="http://schemas.microsoft.com/office/drawing/2007/8/2/chart" xmlns:cdr="http://schemas.openxmlformats.org/drawingml/2006/chartDrawing" xmlns:wne="http://schemas.microsoft.com/office/word/2006/wordml" xmlns:sl="http://schemas.openxmlformats.org/schemaLibrary/2006/main" xmlns:mc="http://schemas.openxmlformats.org/markup-compatibility/2006" xmlns:wp14="http://schemas.microsoft.com/office/word/2010/wordprocessingDrawing" xmlns:wp="http://schemas.openxmlformats.org/drawingml/2006/wordprocessingDrawing" xmlns:m="http://schemas.openxmlformats.org/officeDocument/2006/math" xmlns:w14="http://schemas.microsoft.com/office/word/2010/wordml" xmlns:w15="http://schemas.microsoft.com/office/word/2012/wordml" xmlns:w="http://schemas.openxmlformats.org/wordprocessingml/2006/main">
             <c:ext xmlns:c16="http://schemas.microsoft.com/office/drawing/2014/chart" uri="{C3380CC4-5D6E-409C-BE32-E72D297353CC}">
               <c16:uniqueId val="{00000004-8D46-3D4B-996A-4B880DC4E095}"/>
             </c:ext>
@@ -567,7 +569,7 @@
     </c:plotArea>
     <c:plotVisOnly val="1"/>
     <c:dispBlanksAs val="gap"/>
-    <c:extLst xmlns:w="http://schemas.openxmlformats.org/wordprocessingml/2006/main" xmlns:w15="http://schemas.microsoft.com/office/word/2012/wordml" xmlns:w14="http://schemas.microsoft.com/office/word/2010/wordml" xmlns:m="http://schemas.openxmlformats.org/officeDocument/2006/math" xmlns:wp="http://schemas.openxmlformats.org/drawingml/2006/wordprocessingDrawing" xmlns:wp14="http://schemas.microsoft.com/office/word/2010/wordprocessingDrawing" xmlns:mc="http://schemas.openxmlformats.org/markup-compatibility/2006" xmlns:sl="http://schemas.openxmlformats.org/schemaLibrary/2006/main" xmlns:wne="http://schemas.microsoft.com/office/word/2006/wordml" xmlns:cdr="http://schemas.openxmlformats.org/drawingml/2006/chartDrawing" xmlns:c14="http://schemas.microsoft.com/office/drawing/2007/8/2/chart" xmlns:dgm="http://schemas.openxmlformats.org/drawingml/2006/diagram" xmlns:pic="http://schemas.openxmlformats.org/drawingml/2006/picture" xmlns:xdr="http://schemas.openxmlformats.org/drawingml/2006/spreadsheetDrawing" xmlns:dsp="http://schemas.microsoft.com/office/drawing/2008/diagram" xmlns:xvml="urn:schemas-microsoft-com:office:excel" xmlns:o="urn:schemas-microsoft-com:office:office" xmlns:v="urn:schemas-microsoft-com:vml" xmlns:w10="urn:schemas-microsoft-com:office:word" xmlns:pvml="urn:schemas-microsoft-com:office:powerpoint" xmlns:cppr="http://schemas.microsoft.com/office/2006/coverPageProps" xmlns:odx="http://opendope.org/xpaths" xmlns:odc="http://opendope.org/conditions" xmlns:odq="http://opendope.org/questions" xmlns:oda="http://opendope.org/answers" xmlns:odi="http://opendope.org/components" xmlns:odgm="http://opendope.org/SmartArt/DataHierarchy" xmlns:b="http://schemas.openxmlformats.org/officeDocument/2006/bibliography" xmlns:wps="http://schemas.microsoft.com/office/word/2010/wordprocessingShape" xmlns:w16se="http://schemas.microsoft.com/office/word/2015/wordml/symex" xmlns:w16cid="http://schemas.microsoft.com/office/word/2016/wordml/cid" xmlns:wetp="http://schemas.microsoft.com/office/webextensions/taskpanes/2010/11" xmlns:we="http://schemas.microsoft.com/office/webextensions/webextension/2010/11" xmlns:comp="http://schemas.openxmlformats.org/drawingml/2006/compatibility" xmlns:lc="http://schemas.openxmlformats.org/drawingml/2006/lockedCanvas">
+    <c:extLst xmlns:lc="http://schemas.openxmlformats.org/drawingml/2006/lockedCanvas" xmlns:comp="http://schemas.openxmlformats.org/drawingml/2006/compatibility" xmlns:we="http://schemas.microsoft.com/office/webextensions/webextension/2010/11" xmlns:wetp="http://schemas.microsoft.com/office/webextensions/taskpanes/2010/11" xmlns:w16cid="http://schemas.microsoft.com/office/word/2016/wordml/cid" xmlns:w16se="http://schemas.microsoft.com/office/word/2015/wordml/symex" xmlns:wps="http://schemas.microsoft.com/office/word/2010/wordprocessingShape" xmlns:b="http://schemas.openxmlformats.org/officeDocument/2006/bibliography" xmlns:odgm="http://opendope.org/SmartArt/DataHierarchy" xmlns:odi="http://opendope.org/components" xmlns:oda="http://opendope.org/answers" xmlns:odq="http://opendope.org/questions" xmlns:odc="http://opendope.org/conditions" xmlns:odx="http://opendope.org/xpaths" xmlns:cppr="http://schemas.microsoft.com/office/2006/coverPageProps" xmlns:pvml="urn:schemas-microsoft-com:office:powerpoint" xmlns:w10="urn:schemas-microsoft-com:office:word" xmlns:v="urn:schemas-microsoft-com:vml" xmlns:o="urn:schemas-microsoft-com:office:office" xmlns:xvml="urn:schemas-microsoft-com:office:excel" xmlns:dsp="http://schemas.microsoft.com/office/drawing/2008/diagram" xmlns:xdr="http://schemas.openxmlformats.org/drawingml/2006/spreadsheetDrawing" xmlns:pic="http://schemas.openxmlformats.org/drawingml/2006/picture" xmlns:dgm="http://schemas.openxmlformats.org/drawingml/2006/diagram" xmlns:c14="http://schemas.microsoft.com/office/drawing/2007/8/2/chart" xmlns:cdr="http://schemas.openxmlformats.org/drawingml/2006/chartDrawing" xmlns:wne="http://schemas.microsoft.com/office/word/2006/wordml" xmlns:sl="http://schemas.openxmlformats.org/schemaLibrary/2006/main" xmlns:mc="http://schemas.openxmlformats.org/markup-compatibility/2006" xmlns:wp14="http://schemas.microsoft.com/office/word/2010/wordprocessingDrawing" xmlns:wp="http://schemas.openxmlformats.org/drawingml/2006/wordprocessingDrawing" xmlns:m="http://schemas.openxmlformats.org/officeDocument/2006/math" xmlns:w14="http://schemas.microsoft.com/office/word/2010/wordml" xmlns:w15="http://schemas.microsoft.com/office/word/2012/wordml" xmlns:w="http://schemas.openxmlformats.org/wordprocessingml/2006/main">
       <c:ext xmlns:c16r3="http://schemas.microsoft.com/office/drawing/2017/03/chart" uri="{56B9EC1D-385E-4148-901F-78D8002777C0}">
         <c16r3:dataDisplayOptions16>
           <c16r3:dispNaAsBlank val="1"/>
@@ -2050,7 +2052,7 @@
           <a:p>
             <a:fld id="{C1255C68-584F-174D-BB81-51BF91708794}" type="datetimeFigureOut">
               <a:rPr lang="en-US" smtClean="0"/>
-              <a:t>6/13/25</a:t>
+              <a:t>6/24/25</a:t>
             </a:fld>
             <a:endParaRPr lang="en-US"/>
           </a:p>
@@ -2227,7 +2229,7 @@
           <a:p>
             <a:fld id="{A1EDAAC4-819D-C544-9EA1-C73624CFD70B}" type="datetimeFigureOut">
               <a:rPr lang="en-US" smtClean="0"/>
-              <a:t>6/13/25</a:t>
+              <a:t>6/24/25</a:t>
             </a:fld>
             <a:endParaRPr lang="en-US"/>
           </a:p>
@@ -29797,6 +29799,3197 @@
           <p:cNvPr id="2" name="Slide Number Placeholder 1">
             <a:extLst>
               <a:ext uri="{FF2B5EF4-FFF2-40B4-BE49-F238E27FC236}">
+                <a16:creationId xmlns:a16="http://schemas.microsoft.com/office/drawing/2014/main" id="{3C248EB1-A754-5A0F-8F3A-4D8167E84B0F}"/>
+              </a:ext>
+            </a:extLst>
+          </p:cNvPr>
+          <p:cNvSpPr>
+            <a:spLocks noGrp="1"/>
+          </p:cNvSpPr>
+          <p:nvPr>
+            <p:ph type="sldNum" sz="quarter" idx="4"/>
+          </p:nvPr>
+        </p:nvSpPr>
+        <p:spPr/>
+        <p:txBody>
+          <a:bodyPr/>
+          <a:lstStyle/>
+          <a:p>
+            <a:fld id="{E242BD21-9B61-2246-BCB1-4BE5E1BEBE1C}" type="slidenum">
+              <a:rPr lang="en-US" smtClean="0"/>
+              <a:pPr/>
+              <a:t>4</a:t>
+            </a:fld>
+            <a:endParaRPr lang="en-US"/>
+          </a:p>
+        </p:txBody>
+      </p:sp>
+      <p:sp>
+        <p:nvSpPr>
+          <p:cNvPr id="3" name="Text Placeholder 2">
+            <a:extLst>
+              <a:ext uri="{FF2B5EF4-FFF2-40B4-BE49-F238E27FC236}">
+                <a16:creationId xmlns:a16="http://schemas.microsoft.com/office/drawing/2014/main" id="{85FCFEE5-8B4D-BCC2-0FE2-5BF793497CA6}"/>
+              </a:ext>
+            </a:extLst>
+          </p:cNvPr>
+          <p:cNvSpPr>
+            <a:spLocks noGrp="1"/>
+          </p:cNvSpPr>
+          <p:nvPr>
+            <p:ph type="body" sz="quarter" idx="12"/>
+          </p:nvPr>
+        </p:nvSpPr>
+        <p:spPr>
+          <a:xfrm>
+            <a:off x="2105790" y="169213"/>
+            <a:ext cx="9639877" cy="504143"/>
+          </a:xfrm>
+        </p:spPr>
+        <p:txBody>
+          <a:bodyPr/>
+          <a:lstStyle/>
+          <a:p>
+            <a:r>
+              <a:rPr lang="en-US" dirty="0"/>
+              <a:t>Key findings – </a:t>
+            </a:r>
+            <a:r>
+              <a:rPr lang="en-US" dirty="0">
+                <a:solidFill>
+                  <a:schemeClr val="accent3"/>
+                </a:solidFill>
+              </a:rPr>
+              <a:t>Cost estimation</a:t>
+            </a:r>
+          </a:p>
+          <a:p>
+            <a:endParaRPr lang="en-US"/>
+          </a:p>
+        </p:txBody>
+      </p:sp>
+      <p:sp>
+        <p:nvSpPr>
+          <p:cNvPr id="4" name="Title 3">
+            <a:extLst>
+              <a:ext uri="{FF2B5EF4-FFF2-40B4-BE49-F238E27FC236}">
+                <a16:creationId xmlns:a16="http://schemas.microsoft.com/office/drawing/2014/main" id="{483A967A-0A83-C495-346F-AEBDF6AB7E77}"/>
+              </a:ext>
+            </a:extLst>
+          </p:cNvPr>
+          <p:cNvSpPr>
+            <a:spLocks noGrp="1"/>
+          </p:cNvSpPr>
+          <p:nvPr>
+            <p:ph type="title"/>
+          </p:nvPr>
+        </p:nvSpPr>
+        <p:spPr/>
+        <p:txBody>
+          <a:bodyPr/>
+          <a:lstStyle/>
+          <a:p>
+            <a:r>
+              <a:rPr lang="en-US"/>
+              <a:t>Modernization plan: Management summary </a:t>
+            </a:r>
+          </a:p>
+        </p:txBody>
+      </p:sp>
+      <p:sp>
+        <p:nvSpPr>
+          <p:cNvPr id="6" name="Freeform 5">
+            <a:extLst>
+              <a:ext uri="{FF2B5EF4-FFF2-40B4-BE49-F238E27FC236}">
+                <a16:creationId xmlns:a16="http://schemas.microsoft.com/office/drawing/2014/main" id="{944233C7-740C-C72D-4C88-FB362A263B7B}"/>
+              </a:ext>
+            </a:extLst>
+          </p:cNvPr>
+          <p:cNvSpPr/>
+          <p:nvPr/>
+        </p:nvSpPr>
+        <p:spPr>
+          <a:xfrm>
+            <a:off x="3193634" y="2443642"/>
+            <a:ext cx="5468222" cy="7269"/>
+          </a:xfrm>
+          <a:custGeom>
+            <a:avLst/>
+            <a:gdLst>
+              <a:gd name="connsiteX0" fmla="*/ 0 w 5468222"/>
+              <a:gd name="connsiteY0" fmla="*/ 0 h 7269"/>
+              <a:gd name="connsiteX1" fmla="*/ 5468223 w 5468222"/>
+              <a:gd name="connsiteY1" fmla="*/ 0 h 7269"/>
+            </a:gdLst>
+            <a:ahLst/>
+            <a:cxnLst>
+              <a:cxn ang="0">
+                <a:pos x="connsiteX0" y="connsiteY0"/>
+              </a:cxn>
+              <a:cxn ang="0">
+                <a:pos x="connsiteX1" y="connsiteY1"/>
+              </a:cxn>
+            </a:cxnLst>
+            <a:rect l="l" t="t" r="r" b="b"/>
+            <a:pathLst>
+              <a:path w="5468222" h="7269">
+                <a:moveTo>
+                  <a:pt x="0" y="0"/>
+                </a:moveTo>
+                <a:lnTo>
+                  <a:pt x="5468223" y="0"/>
+                </a:lnTo>
+              </a:path>
+            </a:pathLst>
+          </a:custGeom>
+          <a:noFill/>
+          <a:ln w="7263" cap="flat">
+            <a:solidFill>
+              <a:srgbClr val="9EB5C5">
+                <a:alpha val="40000"/>
+              </a:srgbClr>
+            </a:solidFill>
+            <a:prstDash val="solid"/>
+            <a:miter/>
+          </a:ln>
+        </p:spPr>
+        <p:txBody>
+          <a:bodyPr rtlCol="0" anchor="ctr"/>
+          <a:lstStyle/>
+          <a:p>
+            <a:endParaRPr lang="en-US"/>
+          </a:p>
+        </p:txBody>
+      </p:sp>
+      <p:sp>
+        <p:nvSpPr>
+          <p:cNvPr id="7" name="Freeform 6">
+            <a:extLst>
+              <a:ext uri="{FF2B5EF4-FFF2-40B4-BE49-F238E27FC236}">
+                <a16:creationId xmlns:a16="http://schemas.microsoft.com/office/drawing/2014/main" id="{96E004EC-5DD7-630E-DD97-73BB105447D9}"/>
+              </a:ext>
+            </a:extLst>
+          </p:cNvPr>
+          <p:cNvSpPr/>
+          <p:nvPr/>
+        </p:nvSpPr>
+        <p:spPr>
+          <a:xfrm>
+            <a:off x="4585215" y="5358563"/>
+            <a:ext cx="4083908" cy="14538"/>
+          </a:xfrm>
+          <a:custGeom>
+            <a:avLst/>
+            <a:gdLst>
+              <a:gd name="connsiteX0" fmla="*/ 4076642 w 4083908"/>
+              <a:gd name="connsiteY0" fmla="*/ 14538 h 14538"/>
+              <a:gd name="connsiteX1" fmla="*/ 4083909 w 4083908"/>
+              <a:gd name="connsiteY1" fmla="*/ 7269 h 14538"/>
+              <a:gd name="connsiteX2" fmla="*/ 4076642 w 4083908"/>
+              <a:gd name="connsiteY2" fmla="*/ 0 h 14538"/>
+              <a:gd name="connsiteX3" fmla="*/ 4076642 w 4083908"/>
+              <a:gd name="connsiteY3" fmla="*/ 14538 h 14538"/>
+              <a:gd name="connsiteX4" fmla="*/ 0 w 4083908"/>
+              <a:gd name="connsiteY4" fmla="*/ 14538 h 14538"/>
+              <a:gd name="connsiteX5" fmla="*/ 4076642 w 4083908"/>
+              <a:gd name="connsiteY5" fmla="*/ 14538 h 14538"/>
+              <a:gd name="connsiteX6" fmla="*/ 4076642 w 4083908"/>
+              <a:gd name="connsiteY6" fmla="*/ 0 h 14538"/>
+              <a:gd name="connsiteX7" fmla="*/ 0 w 4083908"/>
+              <a:gd name="connsiteY7" fmla="*/ 0 h 14538"/>
+              <a:gd name="connsiteX8" fmla="*/ 0 w 4083908"/>
+              <a:gd name="connsiteY8" fmla="*/ 14538 h 14538"/>
+            </a:gdLst>
+            <a:ahLst/>
+            <a:cxnLst>
+              <a:cxn ang="0">
+                <a:pos x="connsiteX0" y="connsiteY0"/>
+              </a:cxn>
+              <a:cxn ang="0">
+                <a:pos x="connsiteX1" y="connsiteY1"/>
+              </a:cxn>
+              <a:cxn ang="0">
+                <a:pos x="connsiteX2" y="connsiteY2"/>
+              </a:cxn>
+              <a:cxn ang="0">
+                <a:pos x="connsiteX3" y="connsiteY3"/>
+              </a:cxn>
+              <a:cxn ang="0">
+                <a:pos x="connsiteX4" y="connsiteY4"/>
+              </a:cxn>
+              <a:cxn ang="0">
+                <a:pos x="connsiteX5" y="connsiteY5"/>
+              </a:cxn>
+              <a:cxn ang="0">
+                <a:pos x="connsiteX6" y="connsiteY6"/>
+              </a:cxn>
+              <a:cxn ang="0">
+                <a:pos x="connsiteX7" y="connsiteY7"/>
+              </a:cxn>
+              <a:cxn ang="0">
+                <a:pos x="connsiteX8" y="connsiteY8"/>
+              </a:cxn>
+            </a:cxnLst>
+            <a:rect l="l" t="t" r="r" b="b"/>
+            <a:pathLst>
+              <a:path w="4083908" h="14538">
+                <a:moveTo>
+                  <a:pt x="4076642" y="14538"/>
+                </a:moveTo>
+                <a:cubicBezTo>
+                  <a:pt x="4080653" y="14538"/>
+                  <a:pt x="4083909" y="11282"/>
+                  <a:pt x="4083909" y="7269"/>
+                </a:cubicBezTo>
+                <a:cubicBezTo>
+                  <a:pt x="4083909" y="3257"/>
+                  <a:pt x="4080653" y="0"/>
+                  <a:pt x="4076642" y="0"/>
+                </a:cubicBezTo>
+                <a:lnTo>
+                  <a:pt x="4076642" y="14538"/>
+                </a:lnTo>
+                <a:close/>
+                <a:moveTo>
+                  <a:pt x="0" y="14538"/>
+                </a:moveTo>
+                <a:lnTo>
+                  <a:pt x="4076642" y="14538"/>
+                </a:lnTo>
+                <a:lnTo>
+                  <a:pt x="4076642" y="0"/>
+                </a:lnTo>
+                <a:lnTo>
+                  <a:pt x="0" y="0"/>
+                </a:lnTo>
+                <a:lnTo>
+                  <a:pt x="0" y="14538"/>
+                </a:lnTo>
+                <a:close/>
+              </a:path>
+            </a:pathLst>
+          </a:custGeom>
+          <a:gradFill>
+            <a:gsLst>
+              <a:gs pos="0">
+                <a:srgbClr val="DF6838"/>
+              </a:gs>
+              <a:gs pos="50000">
+                <a:srgbClr val="A3A75B"/>
+              </a:gs>
+              <a:gs pos="100000">
+                <a:srgbClr val="67E77F"/>
+              </a:gs>
+            </a:gsLst>
+            <a:lin ang="0" scaled="1"/>
+          </a:gradFill>
+          <a:ln w="7263" cap="flat">
+            <a:noFill/>
+            <a:prstDash val="solid"/>
+            <a:miter/>
+          </a:ln>
+        </p:spPr>
+        <p:txBody>
+          <a:bodyPr rtlCol="0" anchor="ctr"/>
+          <a:lstStyle/>
+          <a:p>
+            <a:endParaRPr lang="en-US"/>
+          </a:p>
+        </p:txBody>
+      </p:sp>
+      <p:sp>
+        <p:nvSpPr>
+          <p:cNvPr id="8" name="Freeform 7">
+            <a:extLst>
+              <a:ext uri="{FF2B5EF4-FFF2-40B4-BE49-F238E27FC236}">
+                <a16:creationId xmlns:a16="http://schemas.microsoft.com/office/drawing/2014/main" id="{E5C56305-2895-3D6B-452A-B162BC9AAEB7}"/>
+              </a:ext>
+            </a:extLst>
+          </p:cNvPr>
+          <p:cNvSpPr/>
+          <p:nvPr/>
+        </p:nvSpPr>
+        <p:spPr>
+          <a:xfrm>
+            <a:off x="3193634" y="3621241"/>
+            <a:ext cx="5468222" cy="7269"/>
+          </a:xfrm>
+          <a:custGeom>
+            <a:avLst/>
+            <a:gdLst>
+              <a:gd name="connsiteX0" fmla="*/ 0 w 5468222"/>
+              <a:gd name="connsiteY0" fmla="*/ 0 h 7269"/>
+              <a:gd name="connsiteX1" fmla="*/ 5468223 w 5468222"/>
+              <a:gd name="connsiteY1" fmla="*/ 0 h 7269"/>
+            </a:gdLst>
+            <a:ahLst/>
+            <a:cxnLst>
+              <a:cxn ang="0">
+                <a:pos x="connsiteX0" y="connsiteY0"/>
+              </a:cxn>
+              <a:cxn ang="0">
+                <a:pos x="connsiteX1" y="connsiteY1"/>
+              </a:cxn>
+            </a:cxnLst>
+            <a:rect l="l" t="t" r="r" b="b"/>
+            <a:pathLst>
+              <a:path w="5468222" h="7269">
+                <a:moveTo>
+                  <a:pt x="0" y="0"/>
+                </a:moveTo>
+                <a:lnTo>
+                  <a:pt x="5468223" y="0"/>
+                </a:lnTo>
+              </a:path>
+            </a:pathLst>
+          </a:custGeom>
+          <a:noFill/>
+          <a:ln w="7263" cap="flat">
+            <a:solidFill>
+              <a:srgbClr val="9EB5C5">
+                <a:alpha val="40000"/>
+              </a:srgbClr>
+            </a:solidFill>
+            <a:prstDash val="solid"/>
+            <a:miter/>
+          </a:ln>
+        </p:spPr>
+        <p:txBody>
+          <a:bodyPr rtlCol="0" anchor="ctr"/>
+          <a:lstStyle/>
+          <a:p>
+            <a:endParaRPr lang="en-US"/>
+          </a:p>
+        </p:txBody>
+      </p:sp>
+      <p:sp>
+        <p:nvSpPr>
+          <p:cNvPr id="9" name="Freeform 8">
+            <a:extLst>
+              <a:ext uri="{FF2B5EF4-FFF2-40B4-BE49-F238E27FC236}">
+                <a16:creationId xmlns:a16="http://schemas.microsoft.com/office/drawing/2014/main" id="{0D24529C-DAE6-8596-14D8-55515B1524D4}"/>
+              </a:ext>
+            </a:extLst>
+          </p:cNvPr>
+          <p:cNvSpPr/>
+          <p:nvPr/>
+        </p:nvSpPr>
+        <p:spPr>
+          <a:xfrm>
+            <a:off x="3193634" y="4791571"/>
+            <a:ext cx="5468222" cy="7269"/>
+          </a:xfrm>
+          <a:custGeom>
+            <a:avLst/>
+            <a:gdLst>
+              <a:gd name="connsiteX0" fmla="*/ 0 w 5468222"/>
+              <a:gd name="connsiteY0" fmla="*/ 0 h 7269"/>
+              <a:gd name="connsiteX1" fmla="*/ 5468223 w 5468222"/>
+              <a:gd name="connsiteY1" fmla="*/ 0 h 7269"/>
+            </a:gdLst>
+            <a:ahLst/>
+            <a:cxnLst>
+              <a:cxn ang="0">
+                <a:pos x="connsiteX0" y="connsiteY0"/>
+              </a:cxn>
+              <a:cxn ang="0">
+                <a:pos x="connsiteX1" y="connsiteY1"/>
+              </a:cxn>
+            </a:cxnLst>
+            <a:rect l="l" t="t" r="r" b="b"/>
+            <a:pathLst>
+              <a:path w="5468222" h="7269">
+                <a:moveTo>
+                  <a:pt x="0" y="0"/>
+                </a:moveTo>
+                <a:lnTo>
+                  <a:pt x="5468223" y="0"/>
+                </a:lnTo>
+              </a:path>
+            </a:pathLst>
+          </a:custGeom>
+          <a:noFill/>
+          <a:ln w="7263" cap="flat">
+            <a:solidFill>
+              <a:srgbClr val="9EB5C5">
+                <a:alpha val="40000"/>
+              </a:srgbClr>
+            </a:solidFill>
+            <a:prstDash val="solid"/>
+            <a:miter/>
+          </a:ln>
+        </p:spPr>
+        <p:txBody>
+          <a:bodyPr rtlCol="0" anchor="ctr"/>
+          <a:lstStyle/>
+          <a:p>
+            <a:endParaRPr lang="en-US"/>
+          </a:p>
+        </p:txBody>
+      </p:sp>
+      <p:sp>
+        <p:nvSpPr>
+          <p:cNvPr id="10" name="Freeform 9">
+            <a:extLst>
+              <a:ext uri="{FF2B5EF4-FFF2-40B4-BE49-F238E27FC236}">
+                <a16:creationId xmlns:a16="http://schemas.microsoft.com/office/drawing/2014/main" id="{2B2E99E9-6FC9-F31E-927C-6F26B225088A}"/>
+              </a:ext>
+            </a:extLst>
+          </p:cNvPr>
+          <p:cNvSpPr/>
+          <p:nvPr/>
+        </p:nvSpPr>
+        <p:spPr>
+          <a:xfrm>
+            <a:off x="3175467" y="1375080"/>
+            <a:ext cx="1090011" cy="988601"/>
+          </a:xfrm>
+          <a:custGeom>
+            <a:avLst/>
+            <a:gdLst>
+              <a:gd name="connsiteX0" fmla="*/ 1053678 w 1090011"/>
+              <a:gd name="connsiteY0" fmla="*/ 0 h 988601"/>
+              <a:gd name="connsiteX1" fmla="*/ 1090011 w 1090011"/>
+              <a:gd name="connsiteY1" fmla="*/ 0 h 988601"/>
+              <a:gd name="connsiteX2" fmla="*/ 1090011 w 1090011"/>
+              <a:gd name="connsiteY2" fmla="*/ 988602 h 988601"/>
+              <a:gd name="connsiteX3" fmla="*/ 1053678 w 1090011"/>
+              <a:gd name="connsiteY3" fmla="*/ 988602 h 988601"/>
+              <a:gd name="connsiteX4" fmla="*/ 36334 w 1090011"/>
+              <a:gd name="connsiteY4" fmla="*/ 988602 h 988601"/>
+              <a:gd name="connsiteX5" fmla="*/ 0 w 1090011"/>
+              <a:gd name="connsiteY5" fmla="*/ 988602 h 988601"/>
+              <a:gd name="connsiteX6" fmla="*/ 0 w 1090011"/>
+              <a:gd name="connsiteY6" fmla="*/ 0 h 988601"/>
+              <a:gd name="connsiteX7" fmla="*/ 36334 w 1090011"/>
+              <a:gd name="connsiteY7" fmla="*/ 0 h 988601"/>
+            </a:gdLst>
+            <a:ahLst/>
+            <a:cxnLst>
+              <a:cxn ang="0">
+                <a:pos x="connsiteX0" y="connsiteY0"/>
+              </a:cxn>
+              <a:cxn ang="0">
+                <a:pos x="connsiteX1" y="connsiteY1"/>
+              </a:cxn>
+              <a:cxn ang="0">
+                <a:pos x="connsiteX2" y="connsiteY2"/>
+              </a:cxn>
+              <a:cxn ang="0">
+                <a:pos x="connsiteX3" y="connsiteY3"/>
+              </a:cxn>
+              <a:cxn ang="0">
+                <a:pos x="connsiteX4" y="connsiteY4"/>
+              </a:cxn>
+              <a:cxn ang="0">
+                <a:pos x="connsiteX5" y="connsiteY5"/>
+              </a:cxn>
+              <a:cxn ang="0">
+                <a:pos x="connsiteX6" y="connsiteY6"/>
+              </a:cxn>
+              <a:cxn ang="0">
+                <a:pos x="connsiteX7" y="connsiteY7"/>
+              </a:cxn>
+            </a:cxnLst>
+            <a:rect l="l" t="t" r="r" b="b"/>
+            <a:pathLst>
+              <a:path w="1090011" h="988601">
+                <a:moveTo>
+                  <a:pt x="1053678" y="0"/>
+                </a:moveTo>
+                <a:cubicBezTo>
+                  <a:pt x="1073744" y="0"/>
+                  <a:pt x="1090011" y="0"/>
+                  <a:pt x="1090011" y="0"/>
+                </a:cubicBezTo>
+                <a:lnTo>
+                  <a:pt x="1090011" y="988602"/>
+                </a:lnTo>
+                <a:cubicBezTo>
+                  <a:pt x="1090011" y="988602"/>
+                  <a:pt x="1073744" y="988602"/>
+                  <a:pt x="1053678" y="988602"/>
+                </a:cubicBezTo>
+                <a:lnTo>
+                  <a:pt x="36334" y="988602"/>
+                </a:lnTo>
+                <a:cubicBezTo>
+                  <a:pt x="16267" y="988602"/>
+                  <a:pt x="0" y="988602"/>
+                  <a:pt x="0" y="988602"/>
+                </a:cubicBezTo>
+                <a:lnTo>
+                  <a:pt x="0" y="0"/>
+                </a:lnTo>
+                <a:cubicBezTo>
+                  <a:pt x="0" y="0"/>
+                  <a:pt x="16267" y="0"/>
+                  <a:pt x="36334" y="0"/>
+                </a:cubicBezTo>
+                <a:close/>
+              </a:path>
+            </a:pathLst>
+          </a:custGeom>
+          <a:gradFill>
+            <a:gsLst>
+              <a:gs pos="0">
+                <a:srgbClr val="1B66FF"/>
+              </a:gs>
+              <a:gs pos="50000">
+                <a:srgbClr val="183E98"/>
+              </a:gs>
+              <a:gs pos="100000">
+                <a:srgbClr val="151632"/>
+              </a:gs>
+            </a:gsLst>
+            <a:lin ang="5400000" scaled="1"/>
+          </a:gradFill>
+          <a:ln w="7263" cap="flat">
+            <a:noFill/>
+            <a:prstDash val="solid"/>
+            <a:miter/>
+          </a:ln>
+        </p:spPr>
+        <p:txBody>
+          <a:bodyPr rtlCol="0" anchor="ctr"/>
+          <a:lstStyle/>
+          <a:p>
+            <a:endParaRPr lang="en-US"/>
+          </a:p>
+        </p:txBody>
+      </p:sp>
+      <p:sp>
+        <p:nvSpPr>
+          <p:cNvPr id="29" name="Freeform 28">
+            <a:extLst>
+              <a:ext uri="{FF2B5EF4-FFF2-40B4-BE49-F238E27FC236}">
+                <a16:creationId xmlns:a16="http://schemas.microsoft.com/office/drawing/2014/main" id="{25F55748-003C-F3CA-BDD3-09DCDC24C4FF}"/>
+              </a:ext>
+            </a:extLst>
+          </p:cNvPr>
+          <p:cNvSpPr/>
+          <p:nvPr/>
+        </p:nvSpPr>
+        <p:spPr>
+          <a:xfrm>
+            <a:off x="3175467" y="2538141"/>
+            <a:ext cx="1090011" cy="995870"/>
+          </a:xfrm>
+          <a:custGeom>
+            <a:avLst/>
+            <a:gdLst>
+              <a:gd name="connsiteX0" fmla="*/ 1053678 w 1090011"/>
+              <a:gd name="connsiteY0" fmla="*/ 0 h 995870"/>
+              <a:gd name="connsiteX1" fmla="*/ 1090011 w 1090011"/>
+              <a:gd name="connsiteY1" fmla="*/ 0 h 995870"/>
+              <a:gd name="connsiteX2" fmla="*/ 1090011 w 1090011"/>
+              <a:gd name="connsiteY2" fmla="*/ 995871 h 995870"/>
+              <a:gd name="connsiteX3" fmla="*/ 1053678 w 1090011"/>
+              <a:gd name="connsiteY3" fmla="*/ 995871 h 995870"/>
+              <a:gd name="connsiteX4" fmla="*/ 36334 w 1090011"/>
+              <a:gd name="connsiteY4" fmla="*/ 995871 h 995870"/>
+              <a:gd name="connsiteX5" fmla="*/ 0 w 1090011"/>
+              <a:gd name="connsiteY5" fmla="*/ 995871 h 995870"/>
+              <a:gd name="connsiteX6" fmla="*/ 0 w 1090011"/>
+              <a:gd name="connsiteY6" fmla="*/ 0 h 995870"/>
+              <a:gd name="connsiteX7" fmla="*/ 36334 w 1090011"/>
+              <a:gd name="connsiteY7" fmla="*/ 0 h 995870"/>
+            </a:gdLst>
+            <a:ahLst/>
+            <a:cxnLst>
+              <a:cxn ang="0">
+                <a:pos x="connsiteX0" y="connsiteY0"/>
+              </a:cxn>
+              <a:cxn ang="0">
+                <a:pos x="connsiteX1" y="connsiteY1"/>
+              </a:cxn>
+              <a:cxn ang="0">
+                <a:pos x="connsiteX2" y="connsiteY2"/>
+              </a:cxn>
+              <a:cxn ang="0">
+                <a:pos x="connsiteX3" y="connsiteY3"/>
+              </a:cxn>
+              <a:cxn ang="0">
+                <a:pos x="connsiteX4" y="connsiteY4"/>
+              </a:cxn>
+              <a:cxn ang="0">
+                <a:pos x="connsiteX5" y="connsiteY5"/>
+              </a:cxn>
+              <a:cxn ang="0">
+                <a:pos x="connsiteX6" y="connsiteY6"/>
+              </a:cxn>
+              <a:cxn ang="0">
+                <a:pos x="connsiteX7" y="connsiteY7"/>
+              </a:cxn>
+            </a:cxnLst>
+            <a:rect l="l" t="t" r="r" b="b"/>
+            <a:pathLst>
+              <a:path w="1090011" h="995870">
+                <a:moveTo>
+                  <a:pt x="1053678" y="0"/>
+                </a:moveTo>
+                <a:cubicBezTo>
+                  <a:pt x="1073744" y="0"/>
+                  <a:pt x="1090011" y="0"/>
+                  <a:pt x="1090011" y="0"/>
+                </a:cubicBezTo>
+                <a:lnTo>
+                  <a:pt x="1090011" y="995871"/>
+                </a:lnTo>
+                <a:cubicBezTo>
+                  <a:pt x="1090011" y="995871"/>
+                  <a:pt x="1073744" y="995871"/>
+                  <a:pt x="1053678" y="995871"/>
+                </a:cubicBezTo>
+                <a:lnTo>
+                  <a:pt x="36334" y="995871"/>
+                </a:lnTo>
+                <a:cubicBezTo>
+                  <a:pt x="16267" y="995871"/>
+                  <a:pt x="0" y="995871"/>
+                  <a:pt x="0" y="995871"/>
+                </a:cubicBezTo>
+                <a:lnTo>
+                  <a:pt x="0" y="0"/>
+                </a:lnTo>
+                <a:cubicBezTo>
+                  <a:pt x="0" y="0"/>
+                  <a:pt x="16267" y="0"/>
+                  <a:pt x="36334" y="0"/>
+                </a:cubicBezTo>
+                <a:close/>
+              </a:path>
+            </a:pathLst>
+          </a:custGeom>
+          <a:gradFill>
+            <a:gsLst>
+              <a:gs pos="0">
+                <a:srgbClr val="151632"/>
+              </a:gs>
+              <a:gs pos="50000">
+                <a:srgbClr val="183E98"/>
+              </a:gs>
+              <a:gs pos="100000">
+                <a:srgbClr val="1B66FF"/>
+              </a:gs>
+            </a:gsLst>
+            <a:lin ang="10800000" scaled="1"/>
+          </a:gradFill>
+          <a:ln w="7263" cap="flat">
+            <a:noFill/>
+            <a:prstDash val="solid"/>
+            <a:miter/>
+          </a:ln>
+        </p:spPr>
+        <p:txBody>
+          <a:bodyPr rtlCol="0" anchor="ctr"/>
+          <a:lstStyle/>
+          <a:p>
+            <a:endParaRPr lang="en-US"/>
+          </a:p>
+        </p:txBody>
+      </p:sp>
+      <p:sp>
+        <p:nvSpPr>
+          <p:cNvPr id="30" name="Freeform 29">
+            <a:extLst>
+              <a:ext uri="{FF2B5EF4-FFF2-40B4-BE49-F238E27FC236}">
+                <a16:creationId xmlns:a16="http://schemas.microsoft.com/office/drawing/2014/main" id="{FC136603-2216-7601-C5DF-D85D8F43160F}"/>
+              </a:ext>
+            </a:extLst>
+          </p:cNvPr>
+          <p:cNvSpPr/>
+          <p:nvPr/>
+        </p:nvSpPr>
+        <p:spPr>
+          <a:xfrm>
+            <a:off x="3175467" y="3708471"/>
+            <a:ext cx="1090011" cy="988601"/>
+          </a:xfrm>
+          <a:custGeom>
+            <a:avLst/>
+            <a:gdLst>
+              <a:gd name="connsiteX0" fmla="*/ 1053678 w 1090011"/>
+              <a:gd name="connsiteY0" fmla="*/ 0 h 988601"/>
+              <a:gd name="connsiteX1" fmla="*/ 1090011 w 1090011"/>
+              <a:gd name="connsiteY1" fmla="*/ 0 h 988601"/>
+              <a:gd name="connsiteX2" fmla="*/ 1090011 w 1090011"/>
+              <a:gd name="connsiteY2" fmla="*/ 988602 h 988601"/>
+              <a:gd name="connsiteX3" fmla="*/ 1053678 w 1090011"/>
+              <a:gd name="connsiteY3" fmla="*/ 988602 h 988601"/>
+              <a:gd name="connsiteX4" fmla="*/ 36334 w 1090011"/>
+              <a:gd name="connsiteY4" fmla="*/ 988602 h 988601"/>
+              <a:gd name="connsiteX5" fmla="*/ 0 w 1090011"/>
+              <a:gd name="connsiteY5" fmla="*/ 988602 h 988601"/>
+              <a:gd name="connsiteX6" fmla="*/ 0 w 1090011"/>
+              <a:gd name="connsiteY6" fmla="*/ 0 h 988601"/>
+              <a:gd name="connsiteX7" fmla="*/ 36334 w 1090011"/>
+              <a:gd name="connsiteY7" fmla="*/ 0 h 988601"/>
+            </a:gdLst>
+            <a:ahLst/>
+            <a:cxnLst>
+              <a:cxn ang="0">
+                <a:pos x="connsiteX0" y="connsiteY0"/>
+              </a:cxn>
+              <a:cxn ang="0">
+                <a:pos x="connsiteX1" y="connsiteY1"/>
+              </a:cxn>
+              <a:cxn ang="0">
+                <a:pos x="connsiteX2" y="connsiteY2"/>
+              </a:cxn>
+              <a:cxn ang="0">
+                <a:pos x="connsiteX3" y="connsiteY3"/>
+              </a:cxn>
+              <a:cxn ang="0">
+                <a:pos x="connsiteX4" y="connsiteY4"/>
+              </a:cxn>
+              <a:cxn ang="0">
+                <a:pos x="connsiteX5" y="connsiteY5"/>
+              </a:cxn>
+              <a:cxn ang="0">
+                <a:pos x="connsiteX6" y="connsiteY6"/>
+              </a:cxn>
+              <a:cxn ang="0">
+                <a:pos x="connsiteX7" y="connsiteY7"/>
+              </a:cxn>
+            </a:cxnLst>
+            <a:rect l="l" t="t" r="r" b="b"/>
+            <a:pathLst>
+              <a:path w="1090011" h="988601">
+                <a:moveTo>
+                  <a:pt x="1053678" y="0"/>
+                </a:moveTo>
+                <a:cubicBezTo>
+                  <a:pt x="1073744" y="0"/>
+                  <a:pt x="1090011" y="0"/>
+                  <a:pt x="1090011" y="0"/>
+                </a:cubicBezTo>
+                <a:lnTo>
+                  <a:pt x="1090011" y="988602"/>
+                </a:lnTo>
+                <a:cubicBezTo>
+                  <a:pt x="1090011" y="988602"/>
+                  <a:pt x="1073744" y="988602"/>
+                  <a:pt x="1053678" y="988602"/>
+                </a:cubicBezTo>
+                <a:lnTo>
+                  <a:pt x="36334" y="988602"/>
+                </a:lnTo>
+                <a:cubicBezTo>
+                  <a:pt x="16267" y="988602"/>
+                  <a:pt x="0" y="988602"/>
+                  <a:pt x="0" y="988602"/>
+                </a:cubicBezTo>
+                <a:lnTo>
+                  <a:pt x="0" y="0"/>
+                </a:lnTo>
+                <a:cubicBezTo>
+                  <a:pt x="0" y="0"/>
+                  <a:pt x="16267" y="0"/>
+                  <a:pt x="36334" y="0"/>
+                </a:cubicBezTo>
+                <a:close/>
+              </a:path>
+            </a:pathLst>
+          </a:custGeom>
+          <a:gradFill>
+            <a:gsLst>
+              <a:gs pos="0">
+                <a:srgbClr val="151632"/>
+              </a:gs>
+              <a:gs pos="50000">
+                <a:srgbClr val="183E98"/>
+              </a:gs>
+              <a:gs pos="100000">
+                <a:srgbClr val="1B66FF"/>
+              </a:gs>
+            </a:gsLst>
+            <a:lin ang="3971604" scaled="1"/>
+          </a:gradFill>
+          <a:ln w="7263" cap="flat">
+            <a:noFill/>
+            <a:prstDash val="solid"/>
+            <a:miter/>
+          </a:ln>
+        </p:spPr>
+        <p:txBody>
+          <a:bodyPr rtlCol="0" anchor="ctr"/>
+          <a:lstStyle/>
+          <a:p>
+            <a:endParaRPr lang="en-US"/>
+          </a:p>
+        </p:txBody>
+      </p:sp>
+      <p:sp>
+        <p:nvSpPr>
+          <p:cNvPr id="31" name="Freeform 30">
+            <a:extLst>
+              <a:ext uri="{FF2B5EF4-FFF2-40B4-BE49-F238E27FC236}">
+                <a16:creationId xmlns:a16="http://schemas.microsoft.com/office/drawing/2014/main" id="{2D8219B0-F329-793E-CC73-F3C72202561E}"/>
+              </a:ext>
+            </a:extLst>
+          </p:cNvPr>
+          <p:cNvSpPr/>
+          <p:nvPr/>
+        </p:nvSpPr>
+        <p:spPr>
+          <a:xfrm>
+            <a:off x="3175467" y="4871531"/>
+            <a:ext cx="1090011" cy="988601"/>
+          </a:xfrm>
+          <a:custGeom>
+            <a:avLst/>
+            <a:gdLst>
+              <a:gd name="connsiteX0" fmla="*/ 1053678 w 1090011"/>
+              <a:gd name="connsiteY0" fmla="*/ 0 h 988601"/>
+              <a:gd name="connsiteX1" fmla="*/ 1090011 w 1090011"/>
+              <a:gd name="connsiteY1" fmla="*/ 0 h 988601"/>
+              <a:gd name="connsiteX2" fmla="*/ 1090011 w 1090011"/>
+              <a:gd name="connsiteY2" fmla="*/ 988602 h 988601"/>
+              <a:gd name="connsiteX3" fmla="*/ 1053678 w 1090011"/>
+              <a:gd name="connsiteY3" fmla="*/ 988602 h 988601"/>
+              <a:gd name="connsiteX4" fmla="*/ 36334 w 1090011"/>
+              <a:gd name="connsiteY4" fmla="*/ 988602 h 988601"/>
+              <a:gd name="connsiteX5" fmla="*/ 0 w 1090011"/>
+              <a:gd name="connsiteY5" fmla="*/ 988602 h 988601"/>
+              <a:gd name="connsiteX6" fmla="*/ 0 w 1090011"/>
+              <a:gd name="connsiteY6" fmla="*/ 0 h 988601"/>
+              <a:gd name="connsiteX7" fmla="*/ 36334 w 1090011"/>
+              <a:gd name="connsiteY7" fmla="*/ 0 h 988601"/>
+            </a:gdLst>
+            <a:ahLst/>
+            <a:cxnLst>
+              <a:cxn ang="0">
+                <a:pos x="connsiteX0" y="connsiteY0"/>
+              </a:cxn>
+              <a:cxn ang="0">
+                <a:pos x="connsiteX1" y="connsiteY1"/>
+              </a:cxn>
+              <a:cxn ang="0">
+                <a:pos x="connsiteX2" y="connsiteY2"/>
+              </a:cxn>
+              <a:cxn ang="0">
+                <a:pos x="connsiteX3" y="connsiteY3"/>
+              </a:cxn>
+              <a:cxn ang="0">
+                <a:pos x="connsiteX4" y="connsiteY4"/>
+              </a:cxn>
+              <a:cxn ang="0">
+                <a:pos x="connsiteX5" y="connsiteY5"/>
+              </a:cxn>
+              <a:cxn ang="0">
+                <a:pos x="connsiteX6" y="connsiteY6"/>
+              </a:cxn>
+              <a:cxn ang="0">
+                <a:pos x="connsiteX7" y="connsiteY7"/>
+              </a:cxn>
+            </a:cxnLst>
+            <a:rect l="l" t="t" r="r" b="b"/>
+            <a:pathLst>
+              <a:path w="1090011" h="988601">
+                <a:moveTo>
+                  <a:pt x="1053678" y="0"/>
+                </a:moveTo>
+                <a:cubicBezTo>
+                  <a:pt x="1073744" y="0"/>
+                  <a:pt x="1090011" y="0"/>
+                  <a:pt x="1090011" y="0"/>
+                </a:cubicBezTo>
+                <a:lnTo>
+                  <a:pt x="1090011" y="988602"/>
+                </a:lnTo>
+                <a:cubicBezTo>
+                  <a:pt x="1090011" y="988602"/>
+                  <a:pt x="1073744" y="988602"/>
+                  <a:pt x="1053678" y="988602"/>
+                </a:cubicBezTo>
+                <a:lnTo>
+                  <a:pt x="36334" y="988602"/>
+                </a:lnTo>
+                <a:cubicBezTo>
+                  <a:pt x="16267" y="988602"/>
+                  <a:pt x="0" y="988602"/>
+                  <a:pt x="0" y="988602"/>
+                </a:cubicBezTo>
+                <a:lnTo>
+                  <a:pt x="0" y="0"/>
+                </a:lnTo>
+                <a:cubicBezTo>
+                  <a:pt x="0" y="0"/>
+                  <a:pt x="16267" y="0"/>
+                  <a:pt x="36334" y="0"/>
+                </a:cubicBezTo>
+                <a:close/>
+              </a:path>
+            </a:pathLst>
+          </a:custGeom>
+          <a:gradFill>
+            <a:gsLst>
+              <a:gs pos="0">
+                <a:srgbClr val="151632"/>
+              </a:gs>
+              <a:gs pos="50000">
+                <a:srgbClr val="183E98"/>
+              </a:gs>
+              <a:gs pos="100000">
+                <a:srgbClr val="1B66FF"/>
+              </a:gs>
+            </a:gsLst>
+            <a:lin ang="5400000" scaled="1"/>
+          </a:gradFill>
+          <a:ln w="7263" cap="flat">
+            <a:noFill/>
+            <a:prstDash val="solid"/>
+            <a:miter/>
+          </a:ln>
+        </p:spPr>
+        <p:txBody>
+          <a:bodyPr rtlCol="0" anchor="ctr"/>
+          <a:lstStyle/>
+          <a:p>
+            <a:endParaRPr lang="en-US"/>
+          </a:p>
+        </p:txBody>
+      </p:sp>
+      <p:sp>
+        <p:nvSpPr>
+          <p:cNvPr id="36" name="Freeform 35">
+            <a:extLst>
+              <a:ext uri="{FF2B5EF4-FFF2-40B4-BE49-F238E27FC236}">
+                <a16:creationId xmlns:a16="http://schemas.microsoft.com/office/drawing/2014/main" id="{B9E9D148-4862-69E9-BA53-F8B9D84E3E99}"/>
+              </a:ext>
+            </a:extLst>
+          </p:cNvPr>
+          <p:cNvSpPr/>
+          <p:nvPr/>
+        </p:nvSpPr>
+        <p:spPr>
+          <a:xfrm>
+            <a:off x="4541614" y="3046980"/>
+            <a:ext cx="4083908" cy="14538"/>
+          </a:xfrm>
+          <a:custGeom>
+            <a:avLst/>
+            <a:gdLst>
+              <a:gd name="connsiteX0" fmla="*/ 4076642 w 4083908"/>
+              <a:gd name="connsiteY0" fmla="*/ 14538 h 14538"/>
+              <a:gd name="connsiteX1" fmla="*/ 4083909 w 4083908"/>
+              <a:gd name="connsiteY1" fmla="*/ 7269 h 14538"/>
+              <a:gd name="connsiteX2" fmla="*/ 4076642 w 4083908"/>
+              <a:gd name="connsiteY2" fmla="*/ 0 h 14538"/>
+              <a:gd name="connsiteX3" fmla="*/ 4076642 w 4083908"/>
+              <a:gd name="connsiteY3" fmla="*/ 14538 h 14538"/>
+              <a:gd name="connsiteX4" fmla="*/ 0 w 4083908"/>
+              <a:gd name="connsiteY4" fmla="*/ 14538 h 14538"/>
+              <a:gd name="connsiteX5" fmla="*/ 4076642 w 4083908"/>
+              <a:gd name="connsiteY5" fmla="*/ 14538 h 14538"/>
+              <a:gd name="connsiteX6" fmla="*/ 4076642 w 4083908"/>
+              <a:gd name="connsiteY6" fmla="*/ 0 h 14538"/>
+              <a:gd name="connsiteX7" fmla="*/ 0 w 4083908"/>
+              <a:gd name="connsiteY7" fmla="*/ 0 h 14538"/>
+              <a:gd name="connsiteX8" fmla="*/ 0 w 4083908"/>
+              <a:gd name="connsiteY8" fmla="*/ 14538 h 14538"/>
+            </a:gdLst>
+            <a:ahLst/>
+            <a:cxnLst>
+              <a:cxn ang="0">
+                <a:pos x="connsiteX0" y="connsiteY0"/>
+              </a:cxn>
+              <a:cxn ang="0">
+                <a:pos x="connsiteX1" y="connsiteY1"/>
+              </a:cxn>
+              <a:cxn ang="0">
+                <a:pos x="connsiteX2" y="connsiteY2"/>
+              </a:cxn>
+              <a:cxn ang="0">
+                <a:pos x="connsiteX3" y="connsiteY3"/>
+              </a:cxn>
+              <a:cxn ang="0">
+                <a:pos x="connsiteX4" y="connsiteY4"/>
+              </a:cxn>
+              <a:cxn ang="0">
+                <a:pos x="connsiteX5" y="connsiteY5"/>
+              </a:cxn>
+              <a:cxn ang="0">
+                <a:pos x="connsiteX6" y="connsiteY6"/>
+              </a:cxn>
+              <a:cxn ang="0">
+                <a:pos x="connsiteX7" y="connsiteY7"/>
+              </a:cxn>
+              <a:cxn ang="0">
+                <a:pos x="connsiteX8" y="connsiteY8"/>
+              </a:cxn>
+            </a:cxnLst>
+            <a:rect l="l" t="t" r="r" b="b"/>
+            <a:pathLst>
+              <a:path w="4083908" h="14538">
+                <a:moveTo>
+                  <a:pt x="4076642" y="14538"/>
+                </a:moveTo>
+                <a:cubicBezTo>
+                  <a:pt x="4080653" y="14538"/>
+                  <a:pt x="4083909" y="11282"/>
+                  <a:pt x="4083909" y="7269"/>
+                </a:cubicBezTo>
+                <a:cubicBezTo>
+                  <a:pt x="4083909" y="3257"/>
+                  <a:pt x="4080653" y="0"/>
+                  <a:pt x="4076642" y="0"/>
+                </a:cubicBezTo>
+                <a:lnTo>
+                  <a:pt x="4076642" y="14538"/>
+                </a:lnTo>
+                <a:close/>
+                <a:moveTo>
+                  <a:pt x="0" y="14538"/>
+                </a:moveTo>
+                <a:lnTo>
+                  <a:pt x="4076642" y="14538"/>
+                </a:lnTo>
+                <a:lnTo>
+                  <a:pt x="4076642" y="0"/>
+                </a:lnTo>
+                <a:lnTo>
+                  <a:pt x="0" y="0"/>
+                </a:lnTo>
+                <a:lnTo>
+                  <a:pt x="0" y="14538"/>
+                </a:lnTo>
+                <a:close/>
+              </a:path>
+            </a:pathLst>
+          </a:custGeom>
+          <a:gradFill>
+            <a:gsLst>
+              <a:gs pos="0">
+                <a:srgbClr val="DF6838"/>
+              </a:gs>
+              <a:gs pos="50000">
+                <a:srgbClr val="A3A75B"/>
+              </a:gs>
+              <a:gs pos="100000">
+                <a:srgbClr val="67E77F"/>
+              </a:gs>
+            </a:gsLst>
+            <a:lin ang="0" scaled="1"/>
+          </a:gradFill>
+          <a:ln w="7263" cap="flat">
+            <a:noFill/>
+            <a:prstDash val="solid"/>
+            <a:miter/>
+          </a:ln>
+        </p:spPr>
+        <p:txBody>
+          <a:bodyPr rtlCol="0" anchor="ctr"/>
+          <a:lstStyle/>
+          <a:p>
+            <a:endParaRPr lang="en-US"/>
+          </a:p>
+        </p:txBody>
+      </p:sp>
+      <p:sp>
+        <p:nvSpPr>
+          <p:cNvPr id="48" name="Freeform 47">
+            <a:extLst>
+              <a:ext uri="{FF2B5EF4-FFF2-40B4-BE49-F238E27FC236}">
+                <a16:creationId xmlns:a16="http://schemas.microsoft.com/office/drawing/2014/main" id="{46575717-713F-D704-3EC6-F5580B9C6370}"/>
+              </a:ext>
+            </a:extLst>
+          </p:cNvPr>
+          <p:cNvSpPr/>
+          <p:nvPr/>
+        </p:nvSpPr>
+        <p:spPr>
+          <a:xfrm>
+            <a:off x="4416786" y="2832540"/>
+            <a:ext cx="343768" cy="301667"/>
+          </a:xfrm>
+          <a:custGeom>
+            <a:avLst/>
+            <a:gdLst>
+              <a:gd name="connsiteX0" fmla="*/ 184470 w 343768"/>
+              <a:gd name="connsiteY0" fmla="*/ 294400 h 301667"/>
+              <a:gd name="connsiteX1" fmla="*/ 159298 w 343768"/>
+              <a:gd name="connsiteY1" fmla="*/ 294400 h 301667"/>
+              <a:gd name="connsiteX2" fmla="*/ 1966 w 343768"/>
+              <a:gd name="connsiteY2" fmla="*/ 21807 h 301667"/>
+              <a:gd name="connsiteX3" fmla="*/ 14552 w 343768"/>
+              <a:gd name="connsiteY3" fmla="*/ 0 h 301667"/>
+              <a:gd name="connsiteX4" fmla="*/ 329216 w 343768"/>
+              <a:gd name="connsiteY4" fmla="*/ 0 h 301667"/>
+              <a:gd name="connsiteX5" fmla="*/ 341802 w 343768"/>
+              <a:gd name="connsiteY5" fmla="*/ 21807 h 301667"/>
+              <a:gd name="connsiteX6" fmla="*/ 184470 w 343768"/>
+              <a:gd name="connsiteY6" fmla="*/ 294400 h 301667"/>
+            </a:gdLst>
+            <a:ahLst/>
+            <a:cxnLst>
+              <a:cxn ang="0">
+                <a:pos x="connsiteX0" y="connsiteY0"/>
+              </a:cxn>
+              <a:cxn ang="0">
+                <a:pos x="connsiteX1" y="connsiteY1"/>
+              </a:cxn>
+              <a:cxn ang="0">
+                <a:pos x="connsiteX2" y="connsiteY2"/>
+              </a:cxn>
+              <a:cxn ang="0">
+                <a:pos x="connsiteX3" y="connsiteY3"/>
+              </a:cxn>
+              <a:cxn ang="0">
+                <a:pos x="connsiteX4" y="connsiteY4"/>
+              </a:cxn>
+              <a:cxn ang="0">
+                <a:pos x="connsiteX5" y="connsiteY5"/>
+              </a:cxn>
+              <a:cxn ang="0">
+                <a:pos x="connsiteX6" y="connsiteY6"/>
+              </a:cxn>
+            </a:cxnLst>
+            <a:rect l="l" t="t" r="r" b="b"/>
+            <a:pathLst>
+              <a:path w="343768" h="301667">
+                <a:moveTo>
+                  <a:pt x="184470" y="294400"/>
+                </a:moveTo>
+                <a:cubicBezTo>
+                  <a:pt x="178875" y="304090"/>
+                  <a:pt x="164893" y="304090"/>
+                  <a:pt x="159298" y="294400"/>
+                </a:cubicBezTo>
+                <a:lnTo>
+                  <a:pt x="1966" y="21807"/>
+                </a:lnTo>
+                <a:cubicBezTo>
+                  <a:pt x="-3622" y="12118"/>
+                  <a:pt x="3368" y="0"/>
+                  <a:pt x="14552" y="0"/>
+                </a:cubicBezTo>
+                <a:lnTo>
+                  <a:pt x="329216" y="0"/>
+                </a:lnTo>
+                <a:cubicBezTo>
+                  <a:pt x="340400" y="0"/>
+                  <a:pt x="347390" y="12118"/>
+                  <a:pt x="341802" y="21807"/>
+                </a:cubicBezTo>
+                <a:lnTo>
+                  <a:pt x="184470" y="294400"/>
+                </a:lnTo>
+                <a:close/>
+              </a:path>
+            </a:pathLst>
+          </a:custGeom>
+          <a:solidFill>
+            <a:srgbClr val="F89B3C"/>
+          </a:solidFill>
+          <a:ln w="7263" cap="flat">
+            <a:noFill/>
+            <a:prstDash val="solid"/>
+            <a:miter/>
+          </a:ln>
+        </p:spPr>
+        <p:txBody>
+          <a:bodyPr rtlCol="0" anchor="ctr"/>
+          <a:lstStyle/>
+          <a:p>
+            <a:r>
+              <a:rPr lang="en-US" sz="800">
+                <a:solidFill>
+                  <a:schemeClr val="tx2"/>
+                </a:solidFill>
+              </a:rPr>
+              <a:t>MARKER_MODERNIZATION_TECHNICAL_DEBT</a:t>
+            </a:r>
+          </a:p>
+        </p:txBody>
+      </p:sp>
+      <p:sp>
+        <p:nvSpPr>
+          <p:cNvPr id="49" name="Freeform 48">
+            <a:extLst>
+              <a:ext uri="{FF2B5EF4-FFF2-40B4-BE49-F238E27FC236}">
+                <a16:creationId xmlns:a16="http://schemas.microsoft.com/office/drawing/2014/main" id="{B2AF553E-630F-A3D7-EEE7-C3302EE3FBAC}"/>
+              </a:ext>
+            </a:extLst>
+          </p:cNvPr>
+          <p:cNvSpPr/>
+          <p:nvPr/>
+        </p:nvSpPr>
+        <p:spPr>
+          <a:xfrm>
+            <a:off x="4585215" y="4195502"/>
+            <a:ext cx="4083908" cy="14538"/>
+          </a:xfrm>
+          <a:custGeom>
+            <a:avLst/>
+            <a:gdLst>
+              <a:gd name="connsiteX0" fmla="*/ 4076642 w 4083908"/>
+              <a:gd name="connsiteY0" fmla="*/ 14538 h 14538"/>
+              <a:gd name="connsiteX1" fmla="*/ 4083909 w 4083908"/>
+              <a:gd name="connsiteY1" fmla="*/ 7269 h 14538"/>
+              <a:gd name="connsiteX2" fmla="*/ 4076642 w 4083908"/>
+              <a:gd name="connsiteY2" fmla="*/ 0 h 14538"/>
+              <a:gd name="connsiteX3" fmla="*/ 4076642 w 4083908"/>
+              <a:gd name="connsiteY3" fmla="*/ 14538 h 14538"/>
+              <a:gd name="connsiteX4" fmla="*/ 0 w 4083908"/>
+              <a:gd name="connsiteY4" fmla="*/ 14538 h 14538"/>
+              <a:gd name="connsiteX5" fmla="*/ 4076642 w 4083908"/>
+              <a:gd name="connsiteY5" fmla="*/ 14538 h 14538"/>
+              <a:gd name="connsiteX6" fmla="*/ 4076642 w 4083908"/>
+              <a:gd name="connsiteY6" fmla="*/ 0 h 14538"/>
+              <a:gd name="connsiteX7" fmla="*/ 0 w 4083908"/>
+              <a:gd name="connsiteY7" fmla="*/ 0 h 14538"/>
+              <a:gd name="connsiteX8" fmla="*/ 0 w 4083908"/>
+              <a:gd name="connsiteY8" fmla="*/ 14538 h 14538"/>
+            </a:gdLst>
+            <a:ahLst/>
+            <a:cxnLst>
+              <a:cxn ang="0">
+                <a:pos x="connsiteX0" y="connsiteY0"/>
+              </a:cxn>
+              <a:cxn ang="0">
+                <a:pos x="connsiteX1" y="connsiteY1"/>
+              </a:cxn>
+              <a:cxn ang="0">
+                <a:pos x="connsiteX2" y="connsiteY2"/>
+              </a:cxn>
+              <a:cxn ang="0">
+                <a:pos x="connsiteX3" y="connsiteY3"/>
+              </a:cxn>
+              <a:cxn ang="0">
+                <a:pos x="connsiteX4" y="connsiteY4"/>
+              </a:cxn>
+              <a:cxn ang="0">
+                <a:pos x="connsiteX5" y="connsiteY5"/>
+              </a:cxn>
+              <a:cxn ang="0">
+                <a:pos x="connsiteX6" y="connsiteY6"/>
+              </a:cxn>
+              <a:cxn ang="0">
+                <a:pos x="connsiteX7" y="connsiteY7"/>
+              </a:cxn>
+              <a:cxn ang="0">
+                <a:pos x="connsiteX8" y="connsiteY8"/>
+              </a:cxn>
+            </a:cxnLst>
+            <a:rect l="l" t="t" r="r" b="b"/>
+            <a:pathLst>
+              <a:path w="4083908" h="14538">
+                <a:moveTo>
+                  <a:pt x="4076642" y="14538"/>
+                </a:moveTo>
+                <a:cubicBezTo>
+                  <a:pt x="4080653" y="14538"/>
+                  <a:pt x="4083909" y="11282"/>
+                  <a:pt x="4083909" y="7269"/>
+                </a:cubicBezTo>
+                <a:cubicBezTo>
+                  <a:pt x="4083909" y="3257"/>
+                  <a:pt x="4080653" y="0"/>
+                  <a:pt x="4076642" y="0"/>
+                </a:cubicBezTo>
+                <a:lnTo>
+                  <a:pt x="4076642" y="14538"/>
+                </a:lnTo>
+                <a:close/>
+                <a:moveTo>
+                  <a:pt x="0" y="14538"/>
+                </a:moveTo>
+                <a:lnTo>
+                  <a:pt x="4076642" y="14538"/>
+                </a:lnTo>
+                <a:lnTo>
+                  <a:pt x="4076642" y="0"/>
+                </a:lnTo>
+                <a:lnTo>
+                  <a:pt x="0" y="0"/>
+                </a:lnTo>
+                <a:lnTo>
+                  <a:pt x="0" y="14538"/>
+                </a:lnTo>
+                <a:close/>
+              </a:path>
+            </a:pathLst>
+          </a:custGeom>
+          <a:gradFill>
+            <a:gsLst>
+              <a:gs pos="0">
+                <a:srgbClr val="DF6838"/>
+              </a:gs>
+              <a:gs pos="50000">
+                <a:srgbClr val="A3A75B"/>
+              </a:gs>
+              <a:gs pos="100000">
+                <a:srgbClr val="67E77F"/>
+              </a:gs>
+            </a:gsLst>
+            <a:lin ang="0" scaled="1"/>
+          </a:gradFill>
+          <a:ln w="7263" cap="flat">
+            <a:noFill/>
+            <a:prstDash val="solid"/>
+            <a:miter/>
+          </a:ln>
+        </p:spPr>
+        <p:txBody>
+          <a:bodyPr rtlCol="0" anchor="ctr"/>
+          <a:lstStyle/>
+          <a:p>
+            <a:endParaRPr lang="en-US"/>
+          </a:p>
+        </p:txBody>
+      </p:sp>
+      <p:sp>
+        <p:nvSpPr>
+          <p:cNvPr id="62" name="Freeform 61">
+            <a:extLst>
+              <a:ext uri="{FF2B5EF4-FFF2-40B4-BE49-F238E27FC236}">
+                <a16:creationId xmlns:a16="http://schemas.microsoft.com/office/drawing/2014/main" id="{5AFD0732-87D6-6F51-90E0-5730B444D262}"/>
+              </a:ext>
+            </a:extLst>
+          </p:cNvPr>
+          <p:cNvSpPr/>
+          <p:nvPr/>
+        </p:nvSpPr>
+        <p:spPr>
+          <a:xfrm>
+            <a:off x="4416786" y="3959256"/>
+            <a:ext cx="343768" cy="301667"/>
+          </a:xfrm>
+          <a:custGeom>
+            <a:avLst/>
+            <a:gdLst>
+              <a:gd name="connsiteX0" fmla="*/ 184470 w 343768"/>
+              <a:gd name="connsiteY0" fmla="*/ 294400 h 301667"/>
+              <a:gd name="connsiteX1" fmla="*/ 159298 w 343768"/>
+              <a:gd name="connsiteY1" fmla="*/ 294400 h 301667"/>
+              <a:gd name="connsiteX2" fmla="*/ 1966 w 343768"/>
+              <a:gd name="connsiteY2" fmla="*/ 21807 h 301667"/>
+              <a:gd name="connsiteX3" fmla="*/ 14552 w 343768"/>
+              <a:gd name="connsiteY3" fmla="*/ 0 h 301667"/>
+              <a:gd name="connsiteX4" fmla="*/ 329216 w 343768"/>
+              <a:gd name="connsiteY4" fmla="*/ 0 h 301667"/>
+              <a:gd name="connsiteX5" fmla="*/ 341802 w 343768"/>
+              <a:gd name="connsiteY5" fmla="*/ 21807 h 301667"/>
+              <a:gd name="connsiteX6" fmla="*/ 184470 w 343768"/>
+              <a:gd name="connsiteY6" fmla="*/ 294400 h 301667"/>
+            </a:gdLst>
+            <a:ahLst/>
+            <a:cxnLst>
+              <a:cxn ang="0">
+                <a:pos x="connsiteX0" y="connsiteY0"/>
+              </a:cxn>
+              <a:cxn ang="0">
+                <a:pos x="connsiteX1" y="connsiteY1"/>
+              </a:cxn>
+              <a:cxn ang="0">
+                <a:pos x="connsiteX2" y="connsiteY2"/>
+              </a:cxn>
+              <a:cxn ang="0">
+                <a:pos x="connsiteX3" y="connsiteY3"/>
+              </a:cxn>
+              <a:cxn ang="0">
+                <a:pos x="connsiteX4" y="connsiteY4"/>
+              </a:cxn>
+              <a:cxn ang="0">
+                <a:pos x="connsiteX5" y="connsiteY5"/>
+              </a:cxn>
+              <a:cxn ang="0">
+                <a:pos x="connsiteX6" y="connsiteY6"/>
+              </a:cxn>
+            </a:cxnLst>
+            <a:rect l="l" t="t" r="r" b="b"/>
+            <a:pathLst>
+              <a:path w="343768" h="301667">
+                <a:moveTo>
+                  <a:pt x="184470" y="294400"/>
+                </a:moveTo>
+                <a:cubicBezTo>
+                  <a:pt x="178875" y="304090"/>
+                  <a:pt x="164893" y="304090"/>
+                  <a:pt x="159298" y="294400"/>
+                </a:cubicBezTo>
+                <a:lnTo>
+                  <a:pt x="1966" y="21807"/>
+                </a:lnTo>
+                <a:cubicBezTo>
+                  <a:pt x="-3622" y="12118"/>
+                  <a:pt x="3368" y="0"/>
+                  <a:pt x="14552" y="0"/>
+                </a:cubicBezTo>
+                <a:lnTo>
+                  <a:pt x="329216" y="0"/>
+                </a:lnTo>
+                <a:cubicBezTo>
+                  <a:pt x="340400" y="0"/>
+                  <a:pt x="347390" y="12118"/>
+                  <a:pt x="341802" y="21807"/>
+                </a:cubicBezTo>
+                <a:lnTo>
+                  <a:pt x="184470" y="294400"/>
+                </a:lnTo>
+                <a:close/>
+              </a:path>
+            </a:pathLst>
+          </a:custGeom>
+          <a:solidFill>
+            <a:srgbClr val="DF6838"/>
+          </a:solidFill>
+          <a:ln w="7263" cap="flat">
+            <a:noFill/>
+            <a:prstDash val="solid"/>
+            <a:miter/>
+          </a:ln>
+        </p:spPr>
+        <p:txBody>
+          <a:bodyPr rtlCol="0" anchor="ctr"/>
+          <a:lstStyle/>
+          <a:p>
+            <a:r>
+              <a:rPr lang="en-US" sz="800">
+                <a:solidFill>
+                  <a:schemeClr val="tx2"/>
+                </a:solidFill>
+              </a:rPr>
+              <a:t>MARKER_MODERNIZATION_SPEED</a:t>
+            </a:r>
+          </a:p>
+        </p:txBody>
+      </p:sp>
+      <p:sp>
+        <p:nvSpPr>
+          <p:cNvPr id="63" name="Freeform 62">
+            <a:extLst>
+              <a:ext uri="{FF2B5EF4-FFF2-40B4-BE49-F238E27FC236}">
+                <a16:creationId xmlns:a16="http://schemas.microsoft.com/office/drawing/2014/main" id="{E09308EB-33D2-D378-2B71-06F03D8AC3BF}"/>
+              </a:ext>
+            </a:extLst>
+          </p:cNvPr>
+          <p:cNvSpPr/>
+          <p:nvPr/>
+        </p:nvSpPr>
+        <p:spPr>
+          <a:xfrm>
+            <a:off x="4416787" y="5144124"/>
+            <a:ext cx="343767" cy="301667"/>
+          </a:xfrm>
+          <a:custGeom>
+            <a:avLst/>
+            <a:gdLst>
+              <a:gd name="connsiteX0" fmla="*/ 184470 w 343767"/>
+              <a:gd name="connsiteY0" fmla="*/ 294400 h 301667"/>
+              <a:gd name="connsiteX1" fmla="*/ 159298 w 343767"/>
+              <a:gd name="connsiteY1" fmla="*/ 294400 h 301667"/>
+              <a:gd name="connsiteX2" fmla="*/ 1966 w 343767"/>
+              <a:gd name="connsiteY2" fmla="*/ 21807 h 301667"/>
+              <a:gd name="connsiteX3" fmla="*/ 14552 w 343767"/>
+              <a:gd name="connsiteY3" fmla="*/ 0 h 301667"/>
+              <a:gd name="connsiteX4" fmla="*/ 329216 w 343767"/>
+              <a:gd name="connsiteY4" fmla="*/ 0 h 301667"/>
+              <a:gd name="connsiteX5" fmla="*/ 341802 w 343767"/>
+              <a:gd name="connsiteY5" fmla="*/ 21807 h 301667"/>
+              <a:gd name="connsiteX6" fmla="*/ 184470 w 343767"/>
+              <a:gd name="connsiteY6" fmla="*/ 294400 h 301667"/>
+            </a:gdLst>
+            <a:ahLst/>
+            <a:cxnLst>
+              <a:cxn ang="0">
+                <a:pos x="connsiteX0" y="connsiteY0"/>
+              </a:cxn>
+              <a:cxn ang="0">
+                <a:pos x="connsiteX1" y="connsiteY1"/>
+              </a:cxn>
+              <a:cxn ang="0">
+                <a:pos x="connsiteX2" y="connsiteY2"/>
+              </a:cxn>
+              <a:cxn ang="0">
+                <a:pos x="connsiteX3" y="connsiteY3"/>
+              </a:cxn>
+              <a:cxn ang="0">
+                <a:pos x="connsiteX4" y="connsiteY4"/>
+              </a:cxn>
+              <a:cxn ang="0">
+                <a:pos x="connsiteX5" y="connsiteY5"/>
+              </a:cxn>
+              <a:cxn ang="0">
+                <a:pos x="connsiteX6" y="connsiteY6"/>
+              </a:cxn>
+            </a:cxnLst>
+            <a:rect l="l" t="t" r="r" b="b"/>
+            <a:pathLst>
+              <a:path w="343767" h="301667">
+                <a:moveTo>
+                  <a:pt x="184470" y="294400"/>
+                </a:moveTo>
+                <a:cubicBezTo>
+                  <a:pt x="178874" y="304090"/>
+                  <a:pt x="164894" y="304090"/>
+                  <a:pt x="159298" y="294400"/>
+                </a:cubicBezTo>
+                <a:lnTo>
+                  <a:pt x="1966" y="21807"/>
+                </a:lnTo>
+                <a:cubicBezTo>
+                  <a:pt x="-3622" y="12118"/>
+                  <a:pt x="3368" y="0"/>
+                  <a:pt x="14552" y="0"/>
+                </a:cubicBezTo>
+                <a:lnTo>
+                  <a:pt x="329216" y="0"/>
+                </a:lnTo>
+                <a:cubicBezTo>
+                  <a:pt x="340400" y="0"/>
+                  <a:pt x="347390" y="12118"/>
+                  <a:pt x="341802" y="21807"/>
+                </a:cubicBezTo>
+                <a:lnTo>
+                  <a:pt x="184470" y="294400"/>
+                </a:lnTo>
+                <a:close/>
+              </a:path>
+            </a:pathLst>
+          </a:custGeom>
+          <a:solidFill>
+            <a:srgbClr val="67E77F"/>
+          </a:solidFill>
+          <a:ln w="7263" cap="flat">
+            <a:noFill/>
+            <a:prstDash val="solid"/>
+            <a:miter/>
+          </a:ln>
+        </p:spPr>
+        <p:txBody>
+          <a:bodyPr rtlCol="0" anchor="ctr"/>
+          <a:lstStyle/>
+          <a:p>
+            <a:r>
+              <a:rPr lang="en-US" sz="800">
+                <a:solidFill>
+                  <a:schemeClr val="tx2"/>
+                </a:solidFill>
+              </a:rPr>
+              <a:t>MARKER_MODERNIZATION_EFFORT</a:t>
+            </a:r>
+          </a:p>
+        </p:txBody>
+      </p:sp>
+      <p:sp>
+        <p:nvSpPr>
+          <p:cNvPr id="64" name="Freeform 63">
+            <a:extLst>
+              <a:ext uri="{FF2B5EF4-FFF2-40B4-BE49-F238E27FC236}">
+                <a16:creationId xmlns:a16="http://schemas.microsoft.com/office/drawing/2014/main" id="{AD7217BB-9C0A-9421-773D-16A8A688C1E1}"/>
+              </a:ext>
+            </a:extLst>
+          </p:cNvPr>
+          <p:cNvSpPr/>
+          <p:nvPr/>
+        </p:nvSpPr>
+        <p:spPr>
+          <a:xfrm>
+            <a:off x="3502470" y="2727138"/>
+            <a:ext cx="436006" cy="436147"/>
+          </a:xfrm>
+          <a:custGeom>
+            <a:avLst/>
+            <a:gdLst>
+              <a:gd name="connsiteX0" fmla="*/ 430293 w 436006"/>
+              <a:gd name="connsiteY0" fmla="*/ 356485 h 436147"/>
+              <a:gd name="connsiteX1" fmla="*/ 250216 w 436006"/>
+              <a:gd name="connsiteY1" fmla="*/ 175259 h 436147"/>
+              <a:gd name="connsiteX2" fmla="*/ 220531 w 436006"/>
+              <a:gd name="connsiteY2" fmla="*/ 37843 h 436147"/>
+              <a:gd name="connsiteX3" fmla="*/ 74097 w 436006"/>
+              <a:gd name="connsiteY3" fmla="*/ 11950 h 436147"/>
+              <a:gd name="connsiteX4" fmla="*/ 159185 w 436006"/>
+              <a:gd name="connsiteY4" fmla="*/ 97588 h 436147"/>
+              <a:gd name="connsiteX5" fmla="*/ 99822 w 436006"/>
+              <a:gd name="connsiteY5" fmla="*/ 157333 h 436147"/>
+              <a:gd name="connsiteX6" fmla="*/ 12752 w 436006"/>
+              <a:gd name="connsiteY6" fmla="*/ 71695 h 436147"/>
+              <a:gd name="connsiteX7" fmla="*/ 38477 w 436006"/>
+              <a:gd name="connsiteY7" fmla="*/ 219070 h 436147"/>
+              <a:gd name="connsiteX8" fmla="*/ 175019 w 436006"/>
+              <a:gd name="connsiteY8" fmla="*/ 248946 h 436147"/>
+              <a:gd name="connsiteX9" fmla="*/ 355097 w 436006"/>
+              <a:gd name="connsiteY9" fmla="*/ 430173 h 436147"/>
+              <a:gd name="connsiteX10" fmla="*/ 382805 w 436006"/>
+              <a:gd name="connsiteY10" fmla="*/ 430173 h 436147"/>
+              <a:gd name="connsiteX11" fmla="*/ 428316 w 436006"/>
+              <a:gd name="connsiteY11" fmla="*/ 384370 h 436147"/>
+              <a:gd name="connsiteX12" fmla="*/ 430293 w 436006"/>
+              <a:gd name="connsiteY12" fmla="*/ 356485 h 436147"/>
+            </a:gdLst>
+            <a:ahLst/>
+            <a:cxnLst>
+              <a:cxn ang="0">
+                <a:pos x="connsiteX0" y="connsiteY0"/>
+              </a:cxn>
+              <a:cxn ang="0">
+                <a:pos x="connsiteX1" y="connsiteY1"/>
+              </a:cxn>
+              <a:cxn ang="0">
+                <a:pos x="connsiteX2" y="connsiteY2"/>
+              </a:cxn>
+              <a:cxn ang="0">
+                <a:pos x="connsiteX3" y="connsiteY3"/>
+              </a:cxn>
+              <a:cxn ang="0">
+                <a:pos x="connsiteX4" y="connsiteY4"/>
+              </a:cxn>
+              <a:cxn ang="0">
+                <a:pos x="connsiteX5" y="connsiteY5"/>
+              </a:cxn>
+              <a:cxn ang="0">
+                <a:pos x="connsiteX6" y="connsiteY6"/>
+              </a:cxn>
+              <a:cxn ang="0">
+                <a:pos x="connsiteX7" y="connsiteY7"/>
+              </a:cxn>
+              <a:cxn ang="0">
+                <a:pos x="connsiteX8" y="connsiteY8"/>
+              </a:cxn>
+              <a:cxn ang="0">
+                <a:pos x="connsiteX9" y="connsiteY9"/>
+              </a:cxn>
+              <a:cxn ang="0">
+                <a:pos x="connsiteX10" y="connsiteY10"/>
+              </a:cxn>
+              <a:cxn ang="0">
+                <a:pos x="connsiteX11" y="connsiteY11"/>
+              </a:cxn>
+              <a:cxn ang="0">
+                <a:pos x="connsiteX12" y="connsiteY12"/>
+              </a:cxn>
+            </a:cxnLst>
+            <a:rect l="l" t="t" r="r" b="b"/>
+            <a:pathLst>
+              <a:path w="436006" h="436147">
+                <a:moveTo>
+                  <a:pt x="430293" y="356485"/>
+                </a:moveTo>
+                <a:lnTo>
+                  <a:pt x="250216" y="175259"/>
+                </a:lnTo>
+                <a:cubicBezTo>
+                  <a:pt x="268027" y="129456"/>
+                  <a:pt x="258129" y="75679"/>
+                  <a:pt x="220531" y="37843"/>
+                </a:cubicBezTo>
+                <a:cubicBezTo>
+                  <a:pt x="180956" y="-1992"/>
+                  <a:pt x="121589" y="-9951"/>
+                  <a:pt x="74097" y="11950"/>
+                </a:cubicBezTo>
+                <a:lnTo>
+                  <a:pt x="159185" y="97588"/>
+                </a:lnTo>
+                <a:lnTo>
+                  <a:pt x="99822" y="157333"/>
+                </a:lnTo>
+                <a:lnTo>
+                  <a:pt x="12752" y="71695"/>
+                </a:lnTo>
+                <a:cubicBezTo>
+                  <a:pt x="-10995" y="119497"/>
+                  <a:pt x="-1101" y="179242"/>
+                  <a:pt x="38477" y="219070"/>
+                </a:cubicBezTo>
+                <a:cubicBezTo>
+                  <a:pt x="76076" y="256913"/>
+                  <a:pt x="129505" y="266872"/>
+                  <a:pt x="175019" y="248946"/>
+                </a:cubicBezTo>
+                <a:lnTo>
+                  <a:pt x="355097" y="430173"/>
+                </a:lnTo>
+                <a:cubicBezTo>
+                  <a:pt x="363010" y="438139"/>
+                  <a:pt x="374884" y="438139"/>
+                  <a:pt x="382805" y="430173"/>
+                </a:cubicBezTo>
+                <a:lnTo>
+                  <a:pt x="428316" y="384370"/>
+                </a:lnTo>
+                <a:cubicBezTo>
+                  <a:pt x="438214" y="376403"/>
+                  <a:pt x="438214" y="362461"/>
+                  <a:pt x="430293" y="356485"/>
+                </a:cubicBezTo>
+                <a:close/>
+              </a:path>
+            </a:pathLst>
+          </a:custGeom>
+          <a:noFill/>
+          <a:ln w="7263" cap="flat">
+            <a:solidFill>
+              <a:srgbClr val="FFFFFF"/>
+            </a:solidFill>
+            <a:prstDash val="solid"/>
+            <a:miter/>
+          </a:ln>
+        </p:spPr>
+        <p:txBody>
+          <a:bodyPr rtlCol="0" anchor="ctr"/>
+          <a:lstStyle/>
+          <a:p>
+            <a:endParaRPr lang="en-US"/>
+          </a:p>
+        </p:txBody>
+      </p:sp>
+      <p:pic>
+        <p:nvPicPr>
+          <p:cNvPr id="68" name="Graphic 67">
+            <a:extLst>
+              <a:ext uri="{FF2B5EF4-FFF2-40B4-BE49-F238E27FC236}">
+                <a16:creationId xmlns:a16="http://schemas.microsoft.com/office/drawing/2014/main" id="{5B8B6CE0-96F1-FE31-6A30-9D720FFCF6B0}"/>
+              </a:ext>
+            </a:extLst>
+          </p:cNvPr>
+          <p:cNvPicPr>
+            <a:picLocks noChangeAspect="1"/>
+          </p:cNvPicPr>
+          <p:nvPr/>
+        </p:nvPicPr>
+        <p:blipFill>
+          <a:blip r:embed="rId2">
+            <a:extLst>
+              <a:ext uri="{96DAC541-7B7A-43D3-8B79-37D633B846F1}">
+                <asvg:svgBlip xmlns:asvg="http://schemas.microsoft.com/office/drawing/2016/SVG/main" r:embed="rId3"/>
+              </a:ext>
+            </a:extLst>
+          </a:blip>
+          <a:stretch>
+            <a:fillRect/>
+          </a:stretch>
+        </p:blipFill>
+        <p:spPr>
+          <a:xfrm>
+            <a:off x="3422441" y="3835021"/>
+            <a:ext cx="582058" cy="498480"/>
+          </a:xfrm>
+          <a:prstGeom prst="rect">
+            <a:avLst/>
+          </a:prstGeom>
+        </p:spPr>
+      </p:pic>
+      <p:pic>
+        <p:nvPicPr>
+          <p:cNvPr id="69" name="Graphic 68">
+            <a:extLst>
+              <a:ext uri="{FF2B5EF4-FFF2-40B4-BE49-F238E27FC236}">
+                <a16:creationId xmlns:a16="http://schemas.microsoft.com/office/drawing/2014/main" id="{E418F06E-C20B-037A-E6C6-026F0159DA28}"/>
+              </a:ext>
+            </a:extLst>
+          </p:cNvPr>
+          <p:cNvPicPr>
+            <a:picLocks noChangeAspect="1"/>
+          </p:cNvPicPr>
+          <p:nvPr/>
+        </p:nvPicPr>
+        <p:blipFill>
+          <a:blip r:embed="rId4">
+            <a:extLst>
+              <a:ext uri="{96DAC541-7B7A-43D3-8B79-37D633B846F1}">
+                <asvg:svgBlip xmlns:asvg="http://schemas.microsoft.com/office/drawing/2016/SVG/main" r:embed="rId5"/>
+              </a:ext>
+            </a:extLst>
+          </a:blip>
+          <a:stretch>
+            <a:fillRect/>
+          </a:stretch>
+        </p:blipFill>
+        <p:spPr>
+          <a:xfrm>
+            <a:off x="3458380" y="1520447"/>
+            <a:ext cx="515100" cy="436659"/>
+          </a:xfrm>
+          <a:prstGeom prst="rect">
+            <a:avLst/>
+          </a:prstGeom>
+        </p:spPr>
+      </p:pic>
+      <p:sp>
+        <p:nvSpPr>
+          <p:cNvPr id="71" name="TextBox 70">
+            <a:extLst>
+              <a:ext uri="{FF2B5EF4-FFF2-40B4-BE49-F238E27FC236}">
+                <a16:creationId xmlns:a16="http://schemas.microsoft.com/office/drawing/2014/main" id="{3830E433-EC1A-9E7D-C276-49B7EEF215C7}"/>
+              </a:ext>
+            </a:extLst>
+          </p:cNvPr>
+          <p:cNvSpPr txBox="1"/>
+          <p:nvPr/>
+        </p:nvSpPr>
+        <p:spPr>
+          <a:xfrm>
+            <a:off x="3175467" y="2067739"/>
+            <a:ext cx="1090012" cy="273023"/>
+          </a:xfrm>
+          <a:prstGeom prst="rect">
+            <a:avLst/>
+          </a:prstGeom>
+          <a:noFill/>
+        </p:spPr>
+        <p:txBody>
+          <a:bodyPr wrap="square" lIns="90000" rtlCol="0" anchor="t">
+            <a:spAutoFit/>
+          </a:bodyPr>
+          <a:lstStyle/>
+          <a:p>
+            <a:pPr algn="ctr">
+              <a:lnSpc>
+                <a:spcPct val="113000"/>
+              </a:lnSpc>
+            </a:pPr>
+            <a:r>
+              <a:rPr lang="en-US" sz="1100" b="1" dirty="0" err="1">
+                <a:solidFill>
+                  <a:schemeClr val="bg1"/>
+                </a:solidFill>
+              </a:rPr>
+              <a:t>Portfolio size</a:t>
+            </a:r>
+          </a:p>
+        </p:txBody>
+      </p:sp>
+      <p:sp>
+        <p:nvSpPr>
+          <p:cNvPr id="72" name="TextBox 71">
+            <a:extLst>
+              <a:ext uri="{FF2B5EF4-FFF2-40B4-BE49-F238E27FC236}">
+                <a16:creationId xmlns:a16="http://schemas.microsoft.com/office/drawing/2014/main" id="{4412F752-0CE5-8B8B-AF34-A1B61ECF1CEA}"/>
+              </a:ext>
+            </a:extLst>
+          </p:cNvPr>
+          <p:cNvSpPr txBox="1"/>
+          <p:nvPr/>
+        </p:nvSpPr>
+        <p:spPr>
+          <a:xfrm>
+            <a:off x="3175467" y="3240468"/>
+            <a:ext cx="1090012" cy="273023"/>
+          </a:xfrm>
+          <a:prstGeom prst="rect">
+            <a:avLst/>
+          </a:prstGeom>
+          <a:noFill/>
+        </p:spPr>
+        <p:txBody>
+          <a:bodyPr wrap="square" lIns="0" rIns="0" rtlCol="0" anchor="t">
+            <a:spAutoFit/>
+          </a:bodyPr>
+          <a:lstStyle/>
+          <a:p>
+            <a:pPr algn="ctr">
+              <a:lnSpc>
+                <a:spcPct val="113000"/>
+              </a:lnSpc>
+            </a:pPr>
+            <a:r>
+              <a:rPr lang="en-US" sz="1100" b="1" dirty="0" err="1">
+                <a:solidFill>
+                  <a:schemeClr val="bg1"/>
+                </a:solidFill>
+              </a:rPr>
+              <a:t>Technical debt</a:t>
+            </a:r>
+          </a:p>
+        </p:txBody>
+      </p:sp>
+      <p:sp>
+        <p:nvSpPr>
+          <p:cNvPr id="73" name="TextBox 72">
+            <a:extLst>
+              <a:ext uri="{FF2B5EF4-FFF2-40B4-BE49-F238E27FC236}">
+                <a16:creationId xmlns:a16="http://schemas.microsoft.com/office/drawing/2014/main" id="{289C0F40-A36E-1F14-8EA9-2B436B82C6AD}"/>
+              </a:ext>
+            </a:extLst>
+          </p:cNvPr>
+          <p:cNvSpPr txBox="1"/>
+          <p:nvPr/>
+        </p:nvSpPr>
+        <p:spPr>
+          <a:xfrm>
+            <a:off x="3175467" y="4409095"/>
+            <a:ext cx="1090012" cy="273023"/>
+          </a:xfrm>
+          <a:prstGeom prst="rect">
+            <a:avLst/>
+          </a:prstGeom>
+          <a:noFill/>
+        </p:spPr>
+        <p:txBody>
+          <a:bodyPr wrap="square" lIns="0" rIns="0" rtlCol="0" anchor="t">
+            <a:spAutoFit/>
+          </a:bodyPr>
+          <a:lstStyle/>
+          <a:p>
+            <a:pPr algn="ctr">
+              <a:lnSpc>
+                <a:spcPct val="113000"/>
+              </a:lnSpc>
+            </a:pPr>
+            <a:r>
+              <a:rPr lang="en-US" sz="1100" b="1" dirty="0" err="1">
+                <a:solidFill>
+                  <a:schemeClr val="bg1"/>
+                </a:solidFill>
+              </a:rPr>
+              <a:t>Potential return</a:t>
+            </a:r>
+          </a:p>
+        </p:txBody>
+      </p:sp>
+      <p:sp>
+        <p:nvSpPr>
+          <p:cNvPr id="74" name="TextBox 73">
+            <a:extLst>
+              <a:ext uri="{FF2B5EF4-FFF2-40B4-BE49-F238E27FC236}">
+                <a16:creationId xmlns:a16="http://schemas.microsoft.com/office/drawing/2014/main" id="{8AF88E4A-3FC6-78C6-09AF-810DBCFED102}"/>
+              </a:ext>
+            </a:extLst>
+          </p:cNvPr>
+          <p:cNvSpPr txBox="1"/>
+          <p:nvPr/>
+        </p:nvSpPr>
+        <p:spPr>
+          <a:xfrm>
+            <a:off x="3175467" y="5569522"/>
+            <a:ext cx="1090012" cy="273023"/>
+          </a:xfrm>
+          <a:prstGeom prst="rect">
+            <a:avLst/>
+          </a:prstGeom>
+          <a:noFill/>
+        </p:spPr>
+        <p:txBody>
+          <a:bodyPr wrap="square" lIns="0" rIns="0" rtlCol="0" anchor="t">
+            <a:spAutoFit/>
+          </a:bodyPr>
+          <a:lstStyle/>
+          <a:p>
+            <a:pPr algn="ctr">
+              <a:lnSpc>
+                <a:spcPct val="113000"/>
+              </a:lnSpc>
+            </a:pPr>
+            <a:r>
+              <a:rPr lang="en-US" sz="1100" b="1" dirty="0" err="1">
+                <a:solidFill>
+                  <a:schemeClr val="bg1"/>
+                </a:solidFill>
+              </a:rPr>
+              <a:t>Renovation effort</a:t>
+            </a:r>
+          </a:p>
+        </p:txBody>
+      </p:sp>
+      <p:sp>
+        <p:nvSpPr>
+          <p:cNvPr id="11" name="Freeform 10">
+            <a:extLst>
+              <a:ext uri="{FF2B5EF4-FFF2-40B4-BE49-F238E27FC236}">
+                <a16:creationId xmlns:a16="http://schemas.microsoft.com/office/drawing/2014/main" id="{9ED4C63B-3DE4-5CA5-C815-046602139C1B}"/>
+              </a:ext>
+            </a:extLst>
+          </p:cNvPr>
+          <p:cNvSpPr/>
+          <p:nvPr/>
+        </p:nvSpPr>
+        <p:spPr>
+          <a:xfrm>
+            <a:off x="3582405" y="5030147"/>
+            <a:ext cx="277167" cy="436147"/>
+          </a:xfrm>
+          <a:custGeom>
+            <a:avLst/>
+            <a:gdLst>
+              <a:gd name="connsiteX0" fmla="*/ 266486 w 277167"/>
+              <a:gd name="connsiteY0" fmla="*/ 327097 h 436147"/>
+              <a:gd name="connsiteX1" fmla="*/ 237092 w 277167"/>
+              <a:gd name="connsiteY1" fmla="*/ 360840 h 436147"/>
+              <a:gd name="connsiteX2" fmla="*/ 192336 w 277167"/>
+              <a:gd name="connsiteY2" fmla="*/ 381259 h 436147"/>
+              <a:gd name="connsiteX3" fmla="*/ 168741 w 277167"/>
+              <a:gd name="connsiteY3" fmla="*/ 385598 h 436147"/>
+              <a:gd name="connsiteX4" fmla="*/ 168741 w 277167"/>
+              <a:gd name="connsiteY4" fmla="*/ 436148 h 436147"/>
+              <a:gd name="connsiteX5" fmla="*/ 108427 w 277167"/>
+              <a:gd name="connsiteY5" fmla="*/ 436148 h 436147"/>
+              <a:gd name="connsiteX6" fmla="*/ 108427 w 277167"/>
+              <a:gd name="connsiteY6" fmla="*/ 386609 h 436147"/>
+              <a:gd name="connsiteX7" fmla="*/ 59369 w 277167"/>
+              <a:gd name="connsiteY7" fmla="*/ 378220 h 436147"/>
+              <a:gd name="connsiteX8" fmla="*/ 4856 w 277167"/>
+              <a:gd name="connsiteY8" fmla="*/ 345638 h 436147"/>
+              <a:gd name="connsiteX9" fmla="*/ 79 w 277167"/>
+              <a:gd name="connsiteY9" fmla="*/ 338372 h 436147"/>
+              <a:gd name="connsiteX10" fmla="*/ 2900 w 277167"/>
+              <a:gd name="connsiteY10" fmla="*/ 330119 h 436147"/>
+              <a:gd name="connsiteX11" fmla="*/ 33117 w 277167"/>
+              <a:gd name="connsiteY11" fmla="*/ 299878 h 436147"/>
+              <a:gd name="connsiteX12" fmla="*/ 45345 w 277167"/>
+              <a:gd name="connsiteY12" fmla="*/ 298440 h 436147"/>
+              <a:gd name="connsiteX13" fmla="*/ 85101 w 277167"/>
+              <a:gd name="connsiteY13" fmla="*/ 322771 h 436147"/>
+              <a:gd name="connsiteX14" fmla="*/ 136208 w 277167"/>
+              <a:gd name="connsiteY14" fmla="*/ 329773 h 436147"/>
+              <a:gd name="connsiteX15" fmla="*/ 189313 w 277167"/>
+              <a:gd name="connsiteY15" fmla="*/ 318432 h 436147"/>
+              <a:gd name="connsiteX16" fmla="*/ 210365 w 277167"/>
+              <a:gd name="connsiteY16" fmla="*/ 282974 h 436147"/>
+              <a:gd name="connsiteX17" fmla="*/ 200002 w 277167"/>
+              <a:gd name="connsiteY17" fmla="*/ 255554 h 436147"/>
+              <a:gd name="connsiteX18" fmla="*/ 164926 w 277167"/>
+              <a:gd name="connsiteY18" fmla="*/ 242870 h 436147"/>
+              <a:gd name="connsiteX19" fmla="*/ 110796 w 277167"/>
+              <a:gd name="connsiteY19" fmla="*/ 238211 h 436147"/>
+              <a:gd name="connsiteX20" fmla="*/ 36656 w 277167"/>
+              <a:gd name="connsiteY20" fmla="*/ 211484 h 436147"/>
+              <a:gd name="connsiteX21" fmla="*/ 10590 w 277167"/>
+              <a:gd name="connsiteY21" fmla="*/ 144653 h 436147"/>
+              <a:gd name="connsiteX22" fmla="*/ 20610 w 277167"/>
+              <a:gd name="connsiteY22" fmla="*/ 100531 h 436147"/>
+              <a:gd name="connsiteX23" fmla="*/ 48006 w 277167"/>
+              <a:gd name="connsiteY23" fmla="*/ 67801 h 436147"/>
+              <a:gd name="connsiteX24" fmla="*/ 88429 w 277167"/>
+              <a:gd name="connsiteY24" fmla="*/ 47755 h 436147"/>
+              <a:gd name="connsiteX25" fmla="*/ 108427 w 277167"/>
+              <a:gd name="connsiteY25" fmla="*/ 43549 h 436147"/>
+              <a:gd name="connsiteX26" fmla="*/ 108427 w 277167"/>
+              <a:gd name="connsiteY26" fmla="*/ 0 h 436147"/>
+              <a:gd name="connsiteX27" fmla="*/ 168741 w 277167"/>
+              <a:gd name="connsiteY27" fmla="*/ 0 h 436147"/>
+              <a:gd name="connsiteX28" fmla="*/ 168741 w 277167"/>
+              <a:gd name="connsiteY28" fmla="*/ 42673 h 436147"/>
+              <a:gd name="connsiteX29" fmla="*/ 208686 w 277167"/>
+              <a:gd name="connsiteY29" fmla="*/ 49754 h 436147"/>
+              <a:gd name="connsiteX30" fmla="*/ 252061 w 277167"/>
+              <a:gd name="connsiteY30" fmla="*/ 72914 h 436147"/>
+              <a:gd name="connsiteX31" fmla="*/ 257213 w 277167"/>
+              <a:gd name="connsiteY31" fmla="*/ 80155 h 436147"/>
+              <a:gd name="connsiteX32" fmla="*/ 254474 w 277167"/>
+              <a:gd name="connsiteY32" fmla="*/ 88647 h 436147"/>
+              <a:gd name="connsiteX33" fmla="*/ 226134 w 277167"/>
+              <a:gd name="connsiteY33" fmla="*/ 117423 h 436147"/>
+              <a:gd name="connsiteX34" fmla="*/ 214580 w 277167"/>
+              <a:gd name="connsiteY34" fmla="*/ 119287 h 436147"/>
+              <a:gd name="connsiteX35" fmla="*/ 183296 w 277167"/>
+              <a:gd name="connsiteY35" fmla="*/ 103555 h 436147"/>
+              <a:gd name="connsiteX36" fmla="*/ 137552 w 277167"/>
+              <a:gd name="connsiteY36" fmla="*/ 97857 h 436147"/>
+              <a:gd name="connsiteX37" fmla="*/ 91118 w 277167"/>
+              <a:gd name="connsiteY37" fmla="*/ 109876 h 436147"/>
+              <a:gd name="connsiteX38" fmla="*/ 76112 w 277167"/>
+              <a:gd name="connsiteY38" fmla="*/ 141288 h 436147"/>
+              <a:gd name="connsiteX39" fmla="*/ 86779 w 277167"/>
+              <a:gd name="connsiteY39" fmla="*/ 168001 h 436147"/>
+              <a:gd name="connsiteX40" fmla="*/ 122851 w 277167"/>
+              <a:gd name="connsiteY40" fmla="*/ 180034 h 436147"/>
+              <a:gd name="connsiteX41" fmla="*/ 170289 w 277167"/>
+              <a:gd name="connsiteY41" fmla="*/ 184080 h 436147"/>
+              <a:gd name="connsiteX42" fmla="*/ 250107 w 277167"/>
+              <a:gd name="connsiteY42" fmla="*/ 212125 h 436147"/>
+              <a:gd name="connsiteX43" fmla="*/ 277168 w 277167"/>
+              <a:gd name="connsiteY43" fmla="*/ 280286 h 436147"/>
+              <a:gd name="connsiteX44" fmla="*/ 266486 w 277167"/>
+              <a:gd name="connsiteY44" fmla="*/ 327097 h 436147"/>
+            </a:gdLst>
+            <a:ahLst/>
+            <a:cxnLst>
+              <a:cxn ang="0">
+                <a:pos x="connsiteX0" y="connsiteY0"/>
+              </a:cxn>
+              <a:cxn ang="0">
+                <a:pos x="connsiteX1" y="connsiteY1"/>
+              </a:cxn>
+              <a:cxn ang="0">
+                <a:pos x="connsiteX2" y="connsiteY2"/>
+              </a:cxn>
+              <a:cxn ang="0">
+                <a:pos x="connsiteX3" y="connsiteY3"/>
+              </a:cxn>
+              <a:cxn ang="0">
+                <a:pos x="connsiteX4" y="connsiteY4"/>
+              </a:cxn>
+              <a:cxn ang="0">
+                <a:pos x="connsiteX5" y="connsiteY5"/>
+              </a:cxn>
+              <a:cxn ang="0">
+                <a:pos x="connsiteX6" y="connsiteY6"/>
+              </a:cxn>
+              <a:cxn ang="0">
+                <a:pos x="connsiteX7" y="connsiteY7"/>
+              </a:cxn>
+              <a:cxn ang="0">
+                <a:pos x="connsiteX8" y="connsiteY8"/>
+              </a:cxn>
+              <a:cxn ang="0">
+                <a:pos x="connsiteX9" y="connsiteY9"/>
+              </a:cxn>
+              <a:cxn ang="0">
+                <a:pos x="connsiteX10" y="connsiteY10"/>
+              </a:cxn>
+              <a:cxn ang="0">
+                <a:pos x="connsiteX11" y="connsiteY11"/>
+              </a:cxn>
+              <a:cxn ang="0">
+                <a:pos x="connsiteX12" y="connsiteY12"/>
+              </a:cxn>
+              <a:cxn ang="0">
+                <a:pos x="connsiteX13" y="connsiteY13"/>
+              </a:cxn>
+              <a:cxn ang="0">
+                <a:pos x="connsiteX14" y="connsiteY14"/>
+              </a:cxn>
+              <a:cxn ang="0">
+                <a:pos x="connsiteX15" y="connsiteY15"/>
+              </a:cxn>
+              <a:cxn ang="0">
+                <a:pos x="connsiteX16" y="connsiteY16"/>
+              </a:cxn>
+              <a:cxn ang="0">
+                <a:pos x="connsiteX17" y="connsiteY17"/>
+              </a:cxn>
+              <a:cxn ang="0">
+                <a:pos x="connsiteX18" y="connsiteY18"/>
+              </a:cxn>
+              <a:cxn ang="0">
+                <a:pos x="connsiteX19" y="connsiteY19"/>
+              </a:cxn>
+              <a:cxn ang="0">
+                <a:pos x="connsiteX20" y="connsiteY20"/>
+              </a:cxn>
+              <a:cxn ang="0">
+                <a:pos x="connsiteX21" y="connsiteY21"/>
+              </a:cxn>
+              <a:cxn ang="0">
+                <a:pos x="connsiteX22" y="connsiteY22"/>
+              </a:cxn>
+              <a:cxn ang="0">
+                <a:pos x="connsiteX23" y="connsiteY23"/>
+              </a:cxn>
+              <a:cxn ang="0">
+                <a:pos x="connsiteX24" y="connsiteY24"/>
+              </a:cxn>
+              <a:cxn ang="0">
+                <a:pos x="connsiteX25" y="connsiteY25"/>
+              </a:cxn>
+              <a:cxn ang="0">
+                <a:pos x="connsiteX26" y="connsiteY26"/>
+              </a:cxn>
+              <a:cxn ang="0">
+                <a:pos x="connsiteX27" y="connsiteY27"/>
+              </a:cxn>
+              <a:cxn ang="0">
+                <a:pos x="connsiteX28" y="connsiteY28"/>
+              </a:cxn>
+              <a:cxn ang="0">
+                <a:pos x="connsiteX29" y="connsiteY29"/>
+              </a:cxn>
+              <a:cxn ang="0">
+                <a:pos x="connsiteX30" y="connsiteY30"/>
+              </a:cxn>
+              <a:cxn ang="0">
+                <a:pos x="connsiteX31" y="connsiteY31"/>
+              </a:cxn>
+              <a:cxn ang="0">
+                <a:pos x="connsiteX32" y="connsiteY32"/>
+              </a:cxn>
+              <a:cxn ang="0">
+                <a:pos x="connsiteX33" y="connsiteY33"/>
+              </a:cxn>
+              <a:cxn ang="0">
+                <a:pos x="connsiteX34" y="connsiteY34"/>
+              </a:cxn>
+              <a:cxn ang="0">
+                <a:pos x="connsiteX35" y="connsiteY35"/>
+              </a:cxn>
+              <a:cxn ang="0">
+                <a:pos x="connsiteX36" y="connsiteY36"/>
+              </a:cxn>
+              <a:cxn ang="0">
+                <a:pos x="connsiteX37" y="connsiteY37"/>
+              </a:cxn>
+              <a:cxn ang="0">
+                <a:pos x="connsiteX38" y="connsiteY38"/>
+              </a:cxn>
+              <a:cxn ang="0">
+                <a:pos x="connsiteX39" y="connsiteY39"/>
+              </a:cxn>
+              <a:cxn ang="0">
+                <a:pos x="connsiteX40" y="connsiteY40"/>
+              </a:cxn>
+              <a:cxn ang="0">
+                <a:pos x="connsiteX41" y="connsiteY41"/>
+              </a:cxn>
+              <a:cxn ang="0">
+                <a:pos x="connsiteX42" y="connsiteY42"/>
+              </a:cxn>
+              <a:cxn ang="0">
+                <a:pos x="connsiteX43" y="connsiteY43"/>
+              </a:cxn>
+              <a:cxn ang="0">
+                <a:pos x="connsiteX44" y="connsiteY44"/>
+              </a:cxn>
+            </a:cxnLst>
+            <a:rect l="l" t="t" r="r" b="b"/>
+            <a:pathLst>
+              <a:path w="277167" h="436147">
+                <a:moveTo>
+                  <a:pt x="266486" y="327097"/>
+                </a:moveTo>
+                <a:cubicBezTo>
+                  <a:pt x="259343" y="340501"/>
+                  <a:pt x="249525" y="351681"/>
+                  <a:pt x="237092" y="360840"/>
+                </a:cubicBezTo>
+                <a:cubicBezTo>
+                  <a:pt x="224615" y="369970"/>
+                  <a:pt x="209682" y="376774"/>
+                  <a:pt x="192336" y="381259"/>
+                </a:cubicBezTo>
+                <a:cubicBezTo>
+                  <a:pt x="184750" y="383170"/>
+                  <a:pt x="176807" y="384508"/>
+                  <a:pt x="168741" y="385598"/>
+                </a:cubicBezTo>
+                <a:lnTo>
+                  <a:pt x="168741" y="436148"/>
+                </a:lnTo>
+                <a:lnTo>
+                  <a:pt x="108427" y="436148"/>
+                </a:lnTo>
+                <a:lnTo>
+                  <a:pt x="108427" y="386609"/>
+                </a:lnTo>
+                <a:cubicBezTo>
+                  <a:pt x="91248" y="385155"/>
+                  <a:pt x="74833" y="382480"/>
+                  <a:pt x="59369" y="378220"/>
+                </a:cubicBezTo>
+                <a:cubicBezTo>
+                  <a:pt x="35765" y="371751"/>
+                  <a:pt x="4856" y="345638"/>
+                  <a:pt x="4856" y="345638"/>
+                </a:cubicBezTo>
+                <a:cubicBezTo>
+                  <a:pt x="2208" y="344094"/>
+                  <a:pt x="451" y="341379"/>
+                  <a:pt x="79" y="338372"/>
+                </a:cubicBezTo>
+                <a:cubicBezTo>
+                  <a:pt x="-307" y="335337"/>
+                  <a:pt x="732" y="332276"/>
+                  <a:pt x="2900" y="330119"/>
+                </a:cubicBezTo>
+                <a:lnTo>
+                  <a:pt x="33117" y="299878"/>
+                </a:lnTo>
+                <a:cubicBezTo>
+                  <a:pt x="36377" y="296657"/>
+                  <a:pt x="41434" y="296045"/>
+                  <a:pt x="45345" y="298440"/>
+                </a:cubicBezTo>
+                <a:cubicBezTo>
+                  <a:pt x="45345" y="298440"/>
+                  <a:pt x="67966" y="318086"/>
+                  <a:pt x="85101" y="322771"/>
+                </a:cubicBezTo>
+                <a:cubicBezTo>
+                  <a:pt x="102243" y="327430"/>
+                  <a:pt x="119247" y="329773"/>
+                  <a:pt x="136208" y="329773"/>
+                </a:cubicBezTo>
+                <a:cubicBezTo>
+                  <a:pt x="157608" y="329773"/>
+                  <a:pt x="175288" y="325992"/>
+                  <a:pt x="189313" y="318432"/>
+                </a:cubicBezTo>
+                <a:cubicBezTo>
+                  <a:pt x="203367" y="310819"/>
+                  <a:pt x="210365" y="299053"/>
+                  <a:pt x="210365" y="282974"/>
+                </a:cubicBezTo>
+                <a:cubicBezTo>
+                  <a:pt x="210365" y="271394"/>
+                  <a:pt x="206935" y="262263"/>
+                  <a:pt x="200002" y="255554"/>
+                </a:cubicBezTo>
+                <a:cubicBezTo>
+                  <a:pt x="193092" y="248899"/>
+                  <a:pt x="181414" y="244707"/>
+                  <a:pt x="164926" y="242870"/>
+                </a:cubicBezTo>
+                <a:lnTo>
+                  <a:pt x="110796" y="238211"/>
+                </a:lnTo>
+                <a:cubicBezTo>
+                  <a:pt x="78742" y="235083"/>
+                  <a:pt x="54021" y="226138"/>
+                  <a:pt x="36656" y="211484"/>
+                </a:cubicBezTo>
+                <a:cubicBezTo>
+                  <a:pt x="19239" y="196776"/>
+                  <a:pt x="10590" y="174469"/>
+                  <a:pt x="10590" y="144653"/>
+                </a:cubicBezTo>
+                <a:cubicBezTo>
+                  <a:pt x="10590" y="128149"/>
+                  <a:pt x="13916" y="113454"/>
+                  <a:pt x="20610" y="100531"/>
+                </a:cubicBezTo>
+                <a:cubicBezTo>
+                  <a:pt x="27316" y="87606"/>
+                  <a:pt x="36417" y="76692"/>
+                  <a:pt x="48006" y="67801"/>
+                </a:cubicBezTo>
+                <a:cubicBezTo>
+                  <a:pt x="59580" y="58883"/>
+                  <a:pt x="73074" y="52200"/>
+                  <a:pt x="88429" y="47755"/>
+                </a:cubicBezTo>
+                <a:cubicBezTo>
+                  <a:pt x="94860" y="45891"/>
+                  <a:pt x="101589" y="44667"/>
+                  <a:pt x="108427" y="43549"/>
+                </a:cubicBezTo>
+                <a:lnTo>
+                  <a:pt x="108427" y="0"/>
+                </a:lnTo>
+                <a:lnTo>
+                  <a:pt x="168741" y="0"/>
+                </a:lnTo>
+                <a:lnTo>
+                  <a:pt x="168741" y="42673"/>
+                </a:lnTo>
+                <a:cubicBezTo>
+                  <a:pt x="182824" y="44057"/>
+                  <a:pt x="196216" y="46320"/>
+                  <a:pt x="208686" y="49754"/>
+                </a:cubicBezTo>
+                <a:cubicBezTo>
+                  <a:pt x="229840" y="55530"/>
+                  <a:pt x="252061" y="72914"/>
+                  <a:pt x="252061" y="72914"/>
+                </a:cubicBezTo>
+                <a:cubicBezTo>
+                  <a:pt x="254845" y="74352"/>
+                  <a:pt x="256734" y="77067"/>
+                  <a:pt x="257213" y="80155"/>
+                </a:cubicBezTo>
+                <a:cubicBezTo>
+                  <a:pt x="257693" y="83296"/>
+                  <a:pt x="256669" y="86385"/>
+                  <a:pt x="254474" y="88647"/>
+                </a:cubicBezTo>
+                <a:lnTo>
+                  <a:pt x="226134" y="117423"/>
+                </a:lnTo>
+                <a:cubicBezTo>
+                  <a:pt x="223111" y="120485"/>
+                  <a:pt x="218438" y="121283"/>
+                  <a:pt x="214580" y="119287"/>
+                </a:cubicBezTo>
+                <a:cubicBezTo>
+                  <a:pt x="214580" y="119287"/>
+                  <a:pt x="197801" y="107335"/>
+                  <a:pt x="183296" y="103555"/>
+                </a:cubicBezTo>
+                <a:cubicBezTo>
+                  <a:pt x="168806" y="99774"/>
+                  <a:pt x="153590" y="97857"/>
+                  <a:pt x="137552" y="97857"/>
+                </a:cubicBezTo>
+                <a:cubicBezTo>
+                  <a:pt x="116595" y="97857"/>
+                  <a:pt x="101109" y="101877"/>
+                  <a:pt x="91118" y="109876"/>
+                </a:cubicBezTo>
+                <a:cubicBezTo>
+                  <a:pt x="81082" y="117929"/>
+                  <a:pt x="76112" y="128390"/>
+                  <a:pt x="76112" y="141288"/>
+                </a:cubicBezTo>
+                <a:cubicBezTo>
+                  <a:pt x="76112" y="152908"/>
+                  <a:pt x="79607" y="161799"/>
+                  <a:pt x="86779" y="168001"/>
+                </a:cubicBezTo>
+                <a:cubicBezTo>
+                  <a:pt x="93901" y="174257"/>
+                  <a:pt x="105913" y="178316"/>
+                  <a:pt x="122851" y="180034"/>
+                </a:cubicBezTo>
+                <a:lnTo>
+                  <a:pt x="170289" y="184080"/>
+                </a:lnTo>
+                <a:cubicBezTo>
+                  <a:pt x="205453" y="187195"/>
+                  <a:pt x="232078" y="196538"/>
+                  <a:pt x="250107" y="212125"/>
+                </a:cubicBezTo>
+                <a:cubicBezTo>
+                  <a:pt x="268165" y="227737"/>
+                  <a:pt x="277168" y="250472"/>
+                  <a:pt x="277168" y="280286"/>
+                </a:cubicBezTo>
+                <a:cubicBezTo>
+                  <a:pt x="277175" y="298162"/>
+                  <a:pt x="273607" y="313720"/>
+                  <a:pt x="266486" y="327097"/>
+                </a:cubicBezTo>
+                <a:close/>
+              </a:path>
+            </a:pathLst>
+          </a:custGeom>
+          <a:noFill/>
+          <a:ln w="7263" cap="flat">
+            <a:solidFill>
+              <a:srgbClr val="FFFFFF"/>
+            </a:solidFill>
+            <a:prstDash val="solid"/>
+            <a:miter/>
+          </a:ln>
+        </p:spPr>
+        <p:txBody>
+          <a:bodyPr rtlCol="0" anchor="ctr"/>
+          <a:lstStyle/>
+          <a:p>
+            <a:endParaRPr lang="en-US"/>
+          </a:p>
+        </p:txBody>
+      </p:sp>
+      <p:sp>
+        <p:nvSpPr>
+          <p:cNvPr id="75" name="TextBox 74">
+            <a:extLst>
+              <a:ext uri="{FF2B5EF4-FFF2-40B4-BE49-F238E27FC236}">
+                <a16:creationId xmlns:a16="http://schemas.microsoft.com/office/drawing/2014/main" id="{9E0714D8-2BA9-352D-6DFA-C4C0D883E977}"/>
+              </a:ext>
+            </a:extLst>
+          </p:cNvPr>
+          <p:cNvSpPr txBox="1"/>
+          <p:nvPr/>
+        </p:nvSpPr>
+        <p:spPr>
+          <a:xfrm>
+            <a:off x="4481963" y="3056186"/>
+            <a:ext cx="447387" cy="289438"/>
+          </a:xfrm>
+          <a:prstGeom prst="rect">
+            <a:avLst/>
+          </a:prstGeom>
+          <a:noFill/>
+        </p:spPr>
+        <p:txBody>
+          <a:bodyPr wrap="none" lIns="90000" rtlCol="0" anchor="t">
+            <a:spAutoFit/>
+          </a:bodyPr>
+          <a:lstStyle/>
+          <a:p>
+            <a:pPr algn="l">
+              <a:lnSpc>
+                <a:spcPct val="113000"/>
+              </a:lnSpc>
+            </a:pPr>
+            <a:r>
+              <a:rPr lang="en-US" sz="1200" b="1" dirty="0" err="1">
+                <a:solidFill>
+                  <a:srgbClr val="DF6837"/>
+                </a:solidFill>
+              </a:rPr>
+              <a:t>Low</a:t>
+            </a:r>
+          </a:p>
+        </p:txBody>
+      </p:sp>
+      <p:sp>
+        <p:nvSpPr>
+          <p:cNvPr id="76" name="TextBox 75">
+            <a:extLst>
+              <a:ext uri="{FF2B5EF4-FFF2-40B4-BE49-F238E27FC236}">
+                <a16:creationId xmlns:a16="http://schemas.microsoft.com/office/drawing/2014/main" id="{82AD63B6-A060-37AC-AE10-A89553C98806}"/>
+              </a:ext>
+            </a:extLst>
+          </p:cNvPr>
+          <p:cNvSpPr txBox="1"/>
+          <p:nvPr/>
+        </p:nvSpPr>
+        <p:spPr>
+          <a:xfrm>
+            <a:off x="4481963" y="4204311"/>
+            <a:ext cx="1428296" cy="289438"/>
+          </a:xfrm>
+          <a:prstGeom prst="rect">
+            <a:avLst/>
+          </a:prstGeom>
+          <a:noFill/>
+        </p:spPr>
+        <p:txBody>
+          <a:bodyPr wrap="none" lIns="90000" rtlCol="0" anchor="t">
+            <a:spAutoFit/>
+          </a:bodyPr>
+          <a:lstStyle/>
+          <a:p>
+            <a:pPr algn="l">
+              <a:lnSpc>
+                <a:spcPct val="113000"/>
+              </a:lnSpc>
+            </a:pPr>
+            <a:r>
+              <a:rPr lang="en-US" sz="1200" b="1" dirty="0" err="1">
+                <a:solidFill>
+                  <a:srgbClr val="DF6837"/>
+                </a:solidFill>
+              </a:rPr>
+              <a:t>Low speed increase</a:t>
+            </a:r>
+          </a:p>
+        </p:txBody>
+      </p:sp>
+      <p:sp>
+        <p:nvSpPr>
+          <p:cNvPr id="77" name="TextBox 76">
+            <a:extLst>
+              <a:ext uri="{FF2B5EF4-FFF2-40B4-BE49-F238E27FC236}">
+                <a16:creationId xmlns:a16="http://schemas.microsoft.com/office/drawing/2014/main" id="{F7F66163-B57E-3B36-7B32-0E916195F142}"/>
+              </a:ext>
+            </a:extLst>
+          </p:cNvPr>
+          <p:cNvSpPr txBox="1"/>
+          <p:nvPr/>
+        </p:nvSpPr>
+        <p:spPr>
+          <a:xfrm>
+            <a:off x="4481963" y="5364737"/>
+            <a:ext cx="447387" cy="289438"/>
+          </a:xfrm>
+          <a:prstGeom prst="rect">
+            <a:avLst/>
+          </a:prstGeom>
+          <a:noFill/>
+        </p:spPr>
+        <p:txBody>
+          <a:bodyPr wrap="none" lIns="90000" rtlCol="0" anchor="t">
+            <a:spAutoFit/>
+          </a:bodyPr>
+          <a:lstStyle/>
+          <a:p>
+            <a:pPr algn="l">
+              <a:lnSpc>
+                <a:spcPct val="113000"/>
+              </a:lnSpc>
+            </a:pPr>
+            <a:r>
+              <a:rPr lang="en-US" sz="1200" b="1" dirty="0" err="1">
+                <a:solidFill>
+                  <a:srgbClr val="DF6837"/>
+                </a:solidFill>
+              </a:rPr>
+              <a:t>Low</a:t>
+            </a:r>
+          </a:p>
+        </p:txBody>
+      </p:sp>
+      <p:sp>
+        <p:nvSpPr>
+          <p:cNvPr id="78" name="TextBox 77">
+            <a:extLst>
+              <a:ext uri="{FF2B5EF4-FFF2-40B4-BE49-F238E27FC236}">
+                <a16:creationId xmlns:a16="http://schemas.microsoft.com/office/drawing/2014/main" id="{79A09521-B886-B7CE-C3F8-4A6CE0EC12AC}"/>
+              </a:ext>
+            </a:extLst>
+          </p:cNvPr>
+          <p:cNvSpPr txBox="1"/>
+          <p:nvPr/>
+        </p:nvSpPr>
+        <p:spPr>
+          <a:xfrm>
+            <a:off x="8212338" y="3056186"/>
+            <a:ext cx="476562" cy="289438"/>
+          </a:xfrm>
+          <a:prstGeom prst="rect">
+            <a:avLst/>
+          </a:prstGeom>
+          <a:noFill/>
+        </p:spPr>
+        <p:txBody>
+          <a:bodyPr wrap="none" lIns="90000" rtlCol="0" anchor="t">
+            <a:spAutoFit/>
+          </a:bodyPr>
+          <a:lstStyle/>
+          <a:p>
+            <a:pPr algn="r">
+              <a:lnSpc>
+                <a:spcPct val="113000"/>
+              </a:lnSpc>
+            </a:pPr>
+            <a:r>
+              <a:rPr lang="en-US" sz="1200" b="1" dirty="0" err="1">
+                <a:solidFill>
+                  <a:srgbClr val="67E77F"/>
+                </a:solidFill>
+              </a:rPr>
+              <a:t>High</a:t>
+            </a:r>
+          </a:p>
+        </p:txBody>
+      </p:sp>
+      <p:sp>
+        <p:nvSpPr>
+          <p:cNvPr id="79" name="TextBox 78">
+            <a:extLst>
+              <a:ext uri="{FF2B5EF4-FFF2-40B4-BE49-F238E27FC236}">
+                <a16:creationId xmlns:a16="http://schemas.microsoft.com/office/drawing/2014/main" id="{3E171B44-7D55-3C69-AF53-2A643B381D0B}"/>
+              </a:ext>
+            </a:extLst>
+          </p:cNvPr>
+          <p:cNvSpPr txBox="1"/>
+          <p:nvPr/>
+        </p:nvSpPr>
+        <p:spPr>
+          <a:xfrm>
+            <a:off x="7231430" y="4204311"/>
+            <a:ext cx="1457470" cy="289438"/>
+          </a:xfrm>
+          <a:prstGeom prst="rect">
+            <a:avLst/>
+          </a:prstGeom>
+          <a:noFill/>
+        </p:spPr>
+        <p:txBody>
+          <a:bodyPr wrap="none" lIns="90000" rtlCol="0" anchor="t">
+            <a:spAutoFit/>
+          </a:bodyPr>
+          <a:lstStyle/>
+          <a:p>
+            <a:pPr algn="r">
+              <a:lnSpc>
+                <a:spcPct val="113000"/>
+              </a:lnSpc>
+            </a:pPr>
+            <a:r>
+              <a:rPr lang="en-US" sz="1200" b="1" dirty="0" err="1">
+                <a:solidFill>
+                  <a:srgbClr val="67E77F"/>
+                </a:solidFill>
+              </a:rPr>
+              <a:t>High speed increase</a:t>
+            </a:r>
+          </a:p>
+        </p:txBody>
+      </p:sp>
+      <p:sp>
+        <p:nvSpPr>
+          <p:cNvPr id="80" name="TextBox 79">
+            <a:extLst>
+              <a:ext uri="{FF2B5EF4-FFF2-40B4-BE49-F238E27FC236}">
+                <a16:creationId xmlns:a16="http://schemas.microsoft.com/office/drawing/2014/main" id="{F80FF2A0-2A6E-3FEB-983A-AF96E9799909}"/>
+              </a:ext>
+            </a:extLst>
+          </p:cNvPr>
+          <p:cNvSpPr txBox="1"/>
+          <p:nvPr/>
+        </p:nvSpPr>
+        <p:spPr>
+          <a:xfrm>
+            <a:off x="8212338" y="5364737"/>
+            <a:ext cx="476562" cy="289438"/>
+          </a:xfrm>
+          <a:prstGeom prst="rect">
+            <a:avLst/>
+          </a:prstGeom>
+          <a:noFill/>
+        </p:spPr>
+        <p:txBody>
+          <a:bodyPr wrap="none" lIns="90000" rtlCol="0" anchor="t">
+            <a:spAutoFit/>
+          </a:bodyPr>
+          <a:lstStyle/>
+          <a:p>
+            <a:pPr algn="r">
+              <a:lnSpc>
+                <a:spcPct val="113000"/>
+              </a:lnSpc>
+            </a:pPr>
+            <a:r>
+              <a:rPr lang="en-US" sz="1200" b="1" dirty="0" err="1">
+                <a:solidFill>
+                  <a:srgbClr val="67E77F"/>
+                </a:solidFill>
+              </a:rPr>
+              <a:t>High</a:t>
+            </a:r>
+          </a:p>
+        </p:txBody>
+      </p:sp>
+      <p:sp>
+        <p:nvSpPr>
+          <p:cNvPr id="81" name="Freeform 80">
+            <a:extLst>
+              <a:ext uri="{FF2B5EF4-FFF2-40B4-BE49-F238E27FC236}">
+                <a16:creationId xmlns:a16="http://schemas.microsoft.com/office/drawing/2014/main" id="{659BC7AE-1850-9CF5-C1C7-5F5104F1B756}"/>
+              </a:ext>
+            </a:extLst>
+          </p:cNvPr>
+          <p:cNvSpPr/>
+          <p:nvPr/>
+        </p:nvSpPr>
+        <p:spPr>
+          <a:xfrm>
+            <a:off x="4541614" y="1809446"/>
+            <a:ext cx="4083908" cy="14538"/>
+          </a:xfrm>
+          <a:custGeom>
+            <a:avLst/>
+            <a:gdLst>
+              <a:gd name="connsiteX0" fmla="*/ 4076642 w 4083908"/>
+              <a:gd name="connsiteY0" fmla="*/ 14538 h 14538"/>
+              <a:gd name="connsiteX1" fmla="*/ 4083909 w 4083908"/>
+              <a:gd name="connsiteY1" fmla="*/ 7269 h 14538"/>
+              <a:gd name="connsiteX2" fmla="*/ 4076642 w 4083908"/>
+              <a:gd name="connsiteY2" fmla="*/ 0 h 14538"/>
+              <a:gd name="connsiteX3" fmla="*/ 4076642 w 4083908"/>
+              <a:gd name="connsiteY3" fmla="*/ 14538 h 14538"/>
+              <a:gd name="connsiteX4" fmla="*/ 0 w 4083908"/>
+              <a:gd name="connsiteY4" fmla="*/ 14538 h 14538"/>
+              <a:gd name="connsiteX5" fmla="*/ 4076642 w 4083908"/>
+              <a:gd name="connsiteY5" fmla="*/ 14538 h 14538"/>
+              <a:gd name="connsiteX6" fmla="*/ 4076642 w 4083908"/>
+              <a:gd name="connsiteY6" fmla="*/ 0 h 14538"/>
+              <a:gd name="connsiteX7" fmla="*/ 0 w 4083908"/>
+              <a:gd name="connsiteY7" fmla="*/ 0 h 14538"/>
+              <a:gd name="connsiteX8" fmla="*/ 0 w 4083908"/>
+              <a:gd name="connsiteY8" fmla="*/ 14538 h 14538"/>
+            </a:gdLst>
+            <a:ahLst/>
+            <a:cxnLst>
+              <a:cxn ang="0">
+                <a:pos x="connsiteX0" y="connsiteY0"/>
+              </a:cxn>
+              <a:cxn ang="0">
+                <a:pos x="connsiteX1" y="connsiteY1"/>
+              </a:cxn>
+              <a:cxn ang="0">
+                <a:pos x="connsiteX2" y="connsiteY2"/>
+              </a:cxn>
+              <a:cxn ang="0">
+                <a:pos x="connsiteX3" y="connsiteY3"/>
+              </a:cxn>
+              <a:cxn ang="0">
+                <a:pos x="connsiteX4" y="connsiteY4"/>
+              </a:cxn>
+              <a:cxn ang="0">
+                <a:pos x="connsiteX5" y="connsiteY5"/>
+              </a:cxn>
+              <a:cxn ang="0">
+                <a:pos x="connsiteX6" y="connsiteY6"/>
+              </a:cxn>
+              <a:cxn ang="0">
+                <a:pos x="connsiteX7" y="connsiteY7"/>
+              </a:cxn>
+              <a:cxn ang="0">
+                <a:pos x="connsiteX8" y="connsiteY8"/>
+              </a:cxn>
+            </a:cxnLst>
+            <a:rect l="l" t="t" r="r" b="b"/>
+            <a:pathLst>
+              <a:path w="4083908" h="14538">
+                <a:moveTo>
+                  <a:pt x="4076642" y="14538"/>
+                </a:moveTo>
+                <a:cubicBezTo>
+                  <a:pt x="4080653" y="14538"/>
+                  <a:pt x="4083909" y="11282"/>
+                  <a:pt x="4083909" y="7269"/>
+                </a:cubicBezTo>
+                <a:cubicBezTo>
+                  <a:pt x="4083909" y="3257"/>
+                  <a:pt x="4080653" y="0"/>
+                  <a:pt x="4076642" y="0"/>
+                </a:cubicBezTo>
+                <a:lnTo>
+                  <a:pt x="4076642" y="14538"/>
+                </a:lnTo>
+                <a:close/>
+                <a:moveTo>
+                  <a:pt x="0" y="14538"/>
+                </a:moveTo>
+                <a:lnTo>
+                  <a:pt x="4076642" y="14538"/>
+                </a:lnTo>
+                <a:lnTo>
+                  <a:pt x="4076642" y="0"/>
+                </a:lnTo>
+                <a:lnTo>
+                  <a:pt x="0" y="0"/>
+                </a:lnTo>
+                <a:lnTo>
+                  <a:pt x="0" y="14538"/>
+                </a:lnTo>
+                <a:close/>
+              </a:path>
+            </a:pathLst>
+          </a:custGeom>
+          <a:gradFill>
+            <a:gsLst>
+              <a:gs pos="0">
+                <a:srgbClr val="DF6838"/>
+              </a:gs>
+              <a:gs pos="50000">
+                <a:srgbClr val="A3A75B"/>
+              </a:gs>
+              <a:gs pos="100000">
+                <a:srgbClr val="67E77F"/>
+              </a:gs>
+            </a:gsLst>
+            <a:lin ang="0" scaled="1"/>
+          </a:gradFill>
+          <a:ln w="7263" cap="flat">
+            <a:noFill/>
+            <a:prstDash val="solid"/>
+            <a:miter/>
+          </a:ln>
+        </p:spPr>
+        <p:txBody>
+          <a:bodyPr rtlCol="0" anchor="ctr"/>
+          <a:lstStyle/>
+          <a:p>
+            <a:endParaRPr lang="en-US"/>
+          </a:p>
+        </p:txBody>
+      </p:sp>
+      <p:sp>
+        <p:nvSpPr>
+          <p:cNvPr id="82" name="Freeform 81">
+            <a:extLst>
+              <a:ext uri="{FF2B5EF4-FFF2-40B4-BE49-F238E27FC236}">
+                <a16:creationId xmlns:a16="http://schemas.microsoft.com/office/drawing/2014/main" id="{A1436FEF-2734-3E85-C550-879300A56BB7}"/>
+              </a:ext>
+            </a:extLst>
+          </p:cNvPr>
+          <p:cNvSpPr/>
+          <p:nvPr/>
+        </p:nvSpPr>
+        <p:spPr>
+          <a:xfrm>
+            <a:off x="4416786" y="1595006"/>
+            <a:ext cx="343768" cy="301667"/>
+          </a:xfrm>
+          <a:custGeom>
+            <a:avLst/>
+            <a:gdLst>
+              <a:gd name="connsiteX0" fmla="*/ 184470 w 343768"/>
+              <a:gd name="connsiteY0" fmla="*/ 294400 h 301667"/>
+              <a:gd name="connsiteX1" fmla="*/ 159298 w 343768"/>
+              <a:gd name="connsiteY1" fmla="*/ 294400 h 301667"/>
+              <a:gd name="connsiteX2" fmla="*/ 1966 w 343768"/>
+              <a:gd name="connsiteY2" fmla="*/ 21807 h 301667"/>
+              <a:gd name="connsiteX3" fmla="*/ 14552 w 343768"/>
+              <a:gd name="connsiteY3" fmla="*/ 0 h 301667"/>
+              <a:gd name="connsiteX4" fmla="*/ 329216 w 343768"/>
+              <a:gd name="connsiteY4" fmla="*/ 0 h 301667"/>
+              <a:gd name="connsiteX5" fmla="*/ 341802 w 343768"/>
+              <a:gd name="connsiteY5" fmla="*/ 21807 h 301667"/>
+              <a:gd name="connsiteX6" fmla="*/ 184470 w 343768"/>
+              <a:gd name="connsiteY6" fmla="*/ 294400 h 301667"/>
+            </a:gdLst>
+            <a:ahLst/>
+            <a:cxnLst>
+              <a:cxn ang="0">
+                <a:pos x="connsiteX0" y="connsiteY0"/>
+              </a:cxn>
+              <a:cxn ang="0">
+                <a:pos x="connsiteX1" y="connsiteY1"/>
+              </a:cxn>
+              <a:cxn ang="0">
+                <a:pos x="connsiteX2" y="connsiteY2"/>
+              </a:cxn>
+              <a:cxn ang="0">
+                <a:pos x="connsiteX3" y="connsiteY3"/>
+              </a:cxn>
+              <a:cxn ang="0">
+                <a:pos x="connsiteX4" y="connsiteY4"/>
+              </a:cxn>
+              <a:cxn ang="0">
+                <a:pos x="connsiteX5" y="connsiteY5"/>
+              </a:cxn>
+              <a:cxn ang="0">
+                <a:pos x="connsiteX6" y="connsiteY6"/>
+              </a:cxn>
+            </a:cxnLst>
+            <a:rect l="l" t="t" r="r" b="b"/>
+            <a:pathLst>
+              <a:path w="343768" h="301667">
+                <a:moveTo>
+                  <a:pt x="184470" y="294400"/>
+                </a:moveTo>
+                <a:cubicBezTo>
+                  <a:pt x="178875" y="304090"/>
+                  <a:pt x="164893" y="304090"/>
+                  <a:pt x="159298" y="294400"/>
+                </a:cubicBezTo>
+                <a:lnTo>
+                  <a:pt x="1966" y="21807"/>
+                </a:lnTo>
+                <a:cubicBezTo>
+                  <a:pt x="-3622" y="12118"/>
+                  <a:pt x="3368" y="0"/>
+                  <a:pt x="14552" y="0"/>
+                </a:cubicBezTo>
+                <a:lnTo>
+                  <a:pt x="329216" y="0"/>
+                </a:lnTo>
+                <a:cubicBezTo>
+                  <a:pt x="340400" y="0"/>
+                  <a:pt x="347390" y="12118"/>
+                  <a:pt x="341802" y="21807"/>
+                </a:cubicBezTo>
+                <a:lnTo>
+                  <a:pt x="184470" y="294400"/>
+                </a:lnTo>
+                <a:close/>
+              </a:path>
+            </a:pathLst>
+          </a:custGeom>
+          <a:solidFill>
+            <a:srgbClr val="F89B3C"/>
+          </a:solidFill>
+          <a:ln w="7263" cap="flat">
+            <a:noFill/>
+            <a:prstDash val="solid"/>
+            <a:miter/>
+          </a:ln>
+        </p:spPr>
+        <p:txBody>
+          <a:bodyPr rtlCol="0" anchor="ctr"/>
+          <a:lstStyle/>
+          <a:p>
+            <a:r>
+              <a:rPr lang="en-US" sz="800">
+                <a:solidFill>
+                  <a:schemeClr val="tx2"/>
+                </a:solidFill>
+              </a:rPr>
+              <a:t>MARKER_MODERNIZATION_VOLUME</a:t>
+            </a:r>
+          </a:p>
+        </p:txBody>
+      </p:sp>
+      <p:sp>
+        <p:nvSpPr>
+          <p:cNvPr id="83" name="TextBox 82">
+            <a:extLst>
+              <a:ext uri="{FF2B5EF4-FFF2-40B4-BE49-F238E27FC236}">
+                <a16:creationId xmlns:a16="http://schemas.microsoft.com/office/drawing/2014/main" id="{B4B64E5A-9179-448E-090A-5864C363F480}"/>
+              </a:ext>
+            </a:extLst>
+          </p:cNvPr>
+          <p:cNvSpPr txBox="1"/>
+          <p:nvPr/>
+        </p:nvSpPr>
+        <p:spPr>
+          <a:xfrm>
+            <a:off x="4481963" y="1818652"/>
+            <a:ext cx="591978" cy="322268"/>
+          </a:xfrm>
+          <a:prstGeom prst="rect">
+            <a:avLst/>
+          </a:prstGeom>
+          <a:noFill/>
+        </p:spPr>
+        <p:txBody>
+          <a:bodyPr wrap="none" lIns="90000" rtlCol="0" anchor="t">
+            <a:spAutoFit/>
+          </a:bodyPr>
+          <a:lstStyle/>
+          <a:p>
+            <a:pPr algn="l">
+              <a:lnSpc>
+                <a:spcPct val="113000"/>
+              </a:lnSpc>
+            </a:pPr>
+            <a:r>
+              <a:rPr lang="en-US" sz="1400" b="1" dirty="0" err="1">
+                <a:solidFill>
+                  <a:srgbClr val="DF6837"/>
+                </a:solidFill>
+              </a:rPr>
+              <a:t>Small</a:t>
+            </a:r>
+          </a:p>
+        </p:txBody>
+      </p:sp>
+      <p:sp>
+        <p:nvSpPr>
+          <p:cNvPr id="84" name="TextBox 83">
+            <a:extLst>
+              <a:ext uri="{FF2B5EF4-FFF2-40B4-BE49-F238E27FC236}">
+                <a16:creationId xmlns:a16="http://schemas.microsoft.com/office/drawing/2014/main" id="{02B9148E-E5DB-E38E-63D0-559E35AAA3C9}"/>
+              </a:ext>
+            </a:extLst>
+          </p:cNvPr>
+          <p:cNvSpPr txBox="1"/>
+          <p:nvPr/>
+        </p:nvSpPr>
+        <p:spPr>
+          <a:xfrm>
+            <a:off x="8107374" y="1818652"/>
+            <a:ext cx="581526" cy="322268"/>
+          </a:xfrm>
+          <a:prstGeom prst="rect">
+            <a:avLst/>
+          </a:prstGeom>
+          <a:noFill/>
+        </p:spPr>
+        <p:txBody>
+          <a:bodyPr wrap="none" lIns="90000" rtlCol="0" anchor="t">
+            <a:spAutoFit/>
+          </a:bodyPr>
+          <a:lstStyle/>
+          <a:p>
+            <a:pPr algn="r">
+              <a:lnSpc>
+                <a:spcPct val="113000"/>
+              </a:lnSpc>
+            </a:pPr>
+            <a:r>
+              <a:rPr lang="en-US" sz="1400" b="1" dirty="0" err="1">
+                <a:solidFill>
+                  <a:srgbClr val="67E77F"/>
+                </a:solidFill>
+              </a:rPr>
+              <a:t>Large</a:t>
+            </a:r>
+          </a:p>
+        </p:txBody>
+      </p:sp>
+      <p:cxnSp>
+        <p:nvCxnSpPr>
+          <p:cNvPr id="86" name="Straight Arrow Connector 85">
+            <a:extLst>
+              <a:ext uri="{FF2B5EF4-FFF2-40B4-BE49-F238E27FC236}">
+                <a16:creationId xmlns:a16="http://schemas.microsoft.com/office/drawing/2014/main" id="{2431EC11-E004-CBAD-A155-7723F3CBB0E7}"/>
+              </a:ext>
+            </a:extLst>
+          </p:cNvPr>
+          <p:cNvCxnSpPr/>
+          <p:nvPr/>
+        </p:nvCxnSpPr>
+        <p:spPr>
+          <a:xfrm>
+            <a:off x="4578340" y="6141022"/>
+            <a:ext cx="4103685" cy="0"/>
+          </a:xfrm>
+          <a:prstGeom prst="straightConnector1">
+            <a:avLst/>
+          </a:prstGeom>
+          <a:ln w="19050">
+            <a:solidFill>
+              <a:srgbClr val="B3BECD"/>
+            </a:solidFill>
+            <a:prstDash val="sysDot"/>
+            <a:headEnd type="triangle"/>
+            <a:tailEnd type="triangle"/>
+          </a:ln>
+        </p:spPr>
+        <p:style>
+          <a:lnRef idx="1">
+            <a:schemeClr val="accent1"/>
+          </a:lnRef>
+          <a:fillRef idx="0">
+            <a:schemeClr val="accent1"/>
+          </a:fillRef>
+          <a:effectRef idx="0">
+            <a:schemeClr val="accent1"/>
+          </a:effectRef>
+          <a:fontRef idx="minor">
+            <a:schemeClr val="tx1"/>
+          </a:fontRef>
+        </p:style>
+      </p:cxnSp>
+      <p:sp>
+        <p:nvSpPr>
+          <p:cNvPr id="87" name="TextBox 86">
+            <a:extLst>
+              <a:ext uri="{FF2B5EF4-FFF2-40B4-BE49-F238E27FC236}">
+                <a16:creationId xmlns:a16="http://schemas.microsoft.com/office/drawing/2014/main" id="{C0E78637-2D76-EC46-D7A6-73BC4FE90B2F}"/>
+              </a:ext>
+            </a:extLst>
+          </p:cNvPr>
+          <p:cNvSpPr txBox="1"/>
+          <p:nvPr/>
+        </p:nvSpPr>
+        <p:spPr>
+          <a:xfrm>
+            <a:off x="4585214" y="6148250"/>
+            <a:ext cx="4076641" cy="273023"/>
+          </a:xfrm>
+          <a:prstGeom prst="rect">
+            <a:avLst/>
+          </a:prstGeom>
+          <a:noFill/>
+        </p:spPr>
+        <p:txBody>
+          <a:bodyPr wrap="square" lIns="90000" rtlCol="0" anchor="t">
+            <a:spAutoFit/>
+          </a:bodyPr>
+          <a:lstStyle/>
+          <a:p>
+            <a:pPr algn="ctr">
+              <a:lnSpc>
+                <a:spcPct val="113000"/>
+              </a:lnSpc>
+            </a:pPr>
+            <a:r>
+              <a:rPr lang="en-US" sz="1100" b="1" dirty="0" err="1">
+                <a:solidFill>
+                  <a:srgbClr val="8A98A8"/>
+                </a:solidFill>
+              </a:rPr>
+              <a:t>Relative to SIG benchmark</a:t>
+            </a:r>
+          </a:p>
+        </p:txBody>
+      </p:sp>
+    </p:spTree>
+    <p:extLst>
+      <p:ext uri="{BB962C8B-B14F-4D97-AF65-F5344CB8AC3E}">
+        <p14:creationId xmlns:p14="http://schemas.microsoft.com/office/powerpoint/2010/main" val="2879068791"/>
+      </p:ext>
+    </p:extLst>
+  </p:cSld>
+  <p:clrMapOvr>
+    <a:masterClrMapping/>
+  </p:clrMapOvr>
+</p:sld>
+</file>
+
+<file path=ppt/slides/slide5.xml><?xml version="1.0" encoding="utf-8"?>
+<p:sld xmlns:a="http://schemas.openxmlformats.org/drawingml/2006/main" xmlns:r="http://schemas.openxmlformats.org/officeDocument/2006/relationships" xmlns:p="http://schemas.openxmlformats.org/presentationml/2006/main">
+  <p:cSld>
+    <p:spTree>
+      <p:nvGrpSpPr>
+        <p:cNvPr id="1" name=""/>
+        <p:cNvGrpSpPr/>
+        <p:nvPr/>
+      </p:nvGrpSpPr>
+      <p:grpSpPr>
+        <a:xfrm>
+          <a:off x="0" y="0"/>
+          <a:ext cx="0" cy="0"/>
+          <a:chOff x="0" y="0"/>
+          <a:chExt cx="0" cy="0"/>
+        </a:xfrm>
+      </p:grpSpPr>
+      <p:sp>
+        <p:nvSpPr>
+          <p:cNvPr id="2" name="Slide Number Placeholder 1">
+            <a:extLst>
+              <a:ext uri="{FF2B5EF4-FFF2-40B4-BE49-F238E27FC236}">
                 <a16:creationId xmlns:a16="http://schemas.microsoft.com/office/drawing/2014/main" id="{65DF466E-D479-3CDB-520B-7A4B78107F94}"/>
               </a:ext>
             </a:extLst>
@@ -29816,7 +33009,7 @@
             <a:fld id="{E242BD21-9B61-2246-BCB1-4BE5E1BEBE1C}" type="slidenum">
               <a:rPr lang="en-US" smtClean="0"/>
               <a:pPr/>
-              <a:t>4</a:t>
+              <a:t>5</a:t>
             </a:fld>
             <a:endParaRPr lang="en-US"/>
           </a:p>
@@ -37620,7 +40813,7 @@
 </p:sld>
 </file>
 
-<file path=ppt/slides/slide5.xml><?xml version="1.0" encoding="utf-8"?>
+<file path=ppt/slides/slide6.xml><?xml version="1.0" encoding="utf-8"?>
 <p:sld xmlns:a="http://schemas.openxmlformats.org/drawingml/2006/main" xmlns:r="http://schemas.openxmlformats.org/officeDocument/2006/relationships" xmlns:p="http://schemas.openxmlformats.org/presentationml/2006/main">
   <p:cSld>
     <p:spTree>
@@ -37661,7 +40854,7 @@
             <a:fld id="{E242BD21-9B61-2246-BCB1-4BE5E1BEBE1C}" type="slidenum">
               <a:rPr lang="en-US" smtClean="0"/>
               <a:pPr/>
-              <a:t>5</a:t>
+              <a:t>6</a:t>
             </a:fld>
             <a:endParaRPr lang="en-US"/>
           </a:p>
@@ -37985,7 +41178,7 @@
 </p:sld>
 </file>
 
-<file path=ppt/slides/slide6.xml><?xml version="1.0" encoding="utf-8"?>
+<file path=ppt/slides/slide7.xml><?xml version="1.0" encoding="utf-8"?>
 <p:sld xmlns:a="http://schemas.openxmlformats.org/drawingml/2006/main" xmlns:r="http://schemas.openxmlformats.org/officeDocument/2006/relationships" xmlns:p="http://schemas.openxmlformats.org/presentationml/2006/main">
   <p:cSld>
     <p:spTree>
@@ -38032,7 +41225,7 @@
             <a:fld id="{E242BD21-9B61-2246-BCB1-4BE5E1BEBE1C}" type="slidenum">
               <a:rPr lang="en-US" smtClean="0"/>
               <a:pPr/>
-              <a:t>6</a:t>
+              <a:t>7</a:t>
             </a:fld>
             <a:endParaRPr lang="en-US"/>
           </a:p>
@@ -38538,7 +41731,7 @@
 </p:sld>
 </file>
 
-<file path=ppt/slides/slide7.xml><?xml version="1.0" encoding="utf-8"?>
+<file path=ppt/slides/slide8.xml><?xml version="1.0" encoding="utf-8"?>
 <p:sld xmlns:a="http://schemas.openxmlformats.org/drawingml/2006/main" xmlns:r="http://schemas.openxmlformats.org/officeDocument/2006/relationships" xmlns:p="http://schemas.openxmlformats.org/presentationml/2006/main">
   <p:cSld>
     <p:spTree>
@@ -39469,6 +42662,26 @@
 </file>
 
 <file path=customXml/item1.xml><?xml version="1.0" encoding="utf-8"?>
+<p:properties xmlns:p="http://schemas.microsoft.com/office/2006/metadata/properties" xmlns:xsi="http://www.w3.org/2001/XMLSchema-instance" xmlns:pc="http://schemas.microsoft.com/office/infopath/2007/PartnerControls">
+  <documentManagement>
+    <lcf76f155ced4ddcb4097134ff3c332f xmlns="fa937df2-abe2-4d38-b5f4-c228acba3827">
+      <Terms xmlns="http://schemas.microsoft.com/office/infopath/2007/PartnerControls"/>
+    </lcf76f155ced4ddcb4097134ff3c332f>
+    <TaxCatchAll xmlns="bc8ba18a-4a58-4ad2-bfc0-6516af8e7dc2" xsi:nil="true"/>
+  </documentManagement>
+</p:properties>
+</file>
+
+<file path=customXml/item2.xml><?xml version="1.0" encoding="utf-8"?>
+<?mso-contentType ?>
+<FormTemplates xmlns="http://schemas.microsoft.com/sharepoint/v3/contenttype/forms">
+  <Display>DocumentLibraryForm</Display>
+  <Edit>DocumentLibraryForm</Edit>
+  <New>DocumentLibraryForm</New>
+</FormTemplates>
+</file>
+
+<file path=customXml/item3.xml><?xml version="1.0" encoding="utf-8"?>
 <ct:contentTypeSchema xmlns:ct="http://schemas.microsoft.com/office/2006/metadata/contentType" xmlns:ma="http://schemas.microsoft.com/office/2006/metadata/properties/metaAttributes" ct:_="" ma:_="" ma:contentTypeName="Document" ma:contentTypeID="0x010100398B4EB28540854BB4092730D7F67224" ma:contentTypeVersion="13" ma:contentTypeDescription="Create a new document." ma:contentTypeScope="" ma:versionID="07d6997c7358ecc3b6f0d78039f1ac55">
   <xsd:schema xmlns:xsd="http://www.w3.org/2001/XMLSchema" xmlns:xs="http://www.w3.org/2001/XMLSchema" xmlns:p="http://schemas.microsoft.com/office/2006/metadata/properties" xmlns:ns2="fa937df2-abe2-4d38-b5f4-c228acba3827" xmlns:ns3="bc8ba18a-4a58-4ad2-bfc0-6516af8e7dc2" targetNamespace="http://schemas.microsoft.com/office/2006/metadata/properties" ma:root="true" ma:fieldsID="a7d20d2c9a349b6838acf4b79389f2fd" ns2:_="" ns3:_="">
     <xsd:import namespace="fa937df2-abe2-4d38-b5f4-c228acba3827"/>
@@ -39691,27 +42904,32 @@
 </ct:contentTypeSchema>
 </file>
 
-<file path=customXml/item2.xml><?xml version="1.0" encoding="utf-8"?>
-<?mso-contentType ?>
-<FormTemplates xmlns="http://schemas.microsoft.com/sharepoint/v3/contenttype/forms">
-  <Display>DocumentLibraryForm</Display>
-  <Edit>DocumentLibraryForm</Edit>
-  <New>DocumentLibraryForm</New>
-</FormTemplates>
+<file path=customXml/itemProps1.xml><?xml version="1.0" encoding="utf-8"?>
+<ds:datastoreItem xmlns:ds="http://schemas.openxmlformats.org/officeDocument/2006/customXml" ds:itemID="{4B629362-CF15-4610-8FAC-A8E699942233}">
+  <ds:schemaRefs>
+    <ds:schemaRef ds:uri="http://schemas.microsoft.com/office/2006/documentManagement/types"/>
+    <ds:schemaRef ds:uri="http://purl.org/dc/elements/1.1/"/>
+    <ds:schemaRef ds:uri="bc8ba18a-4a58-4ad2-bfc0-6516af8e7dc2"/>
+    <ds:schemaRef ds:uri="http://purl.org/dc/terms/"/>
+    <ds:schemaRef ds:uri="http://www.w3.org/XML/1998/namespace"/>
+    <ds:schemaRef ds:uri="http://schemas.microsoft.com/office/2006/metadata/properties"/>
+    <ds:schemaRef ds:uri="http://schemas.microsoft.com/office/infopath/2007/PartnerControls"/>
+    <ds:schemaRef ds:uri="http://schemas.openxmlformats.org/package/2006/metadata/core-properties"/>
+    <ds:schemaRef ds:uri="fa937df2-abe2-4d38-b5f4-c228acba3827"/>
+    <ds:schemaRef ds:uri="http://purl.org/dc/dcmitype/"/>
+  </ds:schemaRefs>
+</ds:datastoreItem>
 </file>
 
-<file path=customXml/item3.xml><?xml version="1.0" encoding="utf-8"?>
-<p:properties xmlns:p="http://schemas.microsoft.com/office/2006/metadata/properties" xmlns:xsi="http://www.w3.org/2001/XMLSchema-instance" xmlns:pc="http://schemas.microsoft.com/office/infopath/2007/PartnerControls">
-  <documentManagement>
-    <lcf76f155ced4ddcb4097134ff3c332f xmlns="fa937df2-abe2-4d38-b5f4-c228acba3827">
-      <Terms xmlns="http://schemas.microsoft.com/office/infopath/2007/PartnerControls"/>
-    </lcf76f155ced4ddcb4097134ff3c332f>
-    <TaxCatchAll xmlns="bc8ba18a-4a58-4ad2-bfc0-6516af8e7dc2" xsi:nil="true"/>
-  </documentManagement>
-</p:properties>
+<file path=customXml/itemProps2.xml><?xml version="1.0" encoding="utf-8"?>
+<ds:datastoreItem xmlns:ds="http://schemas.openxmlformats.org/officeDocument/2006/customXml" ds:itemID="{570928F0-D7CA-4732-B7F3-1F945720D0AA}">
+  <ds:schemaRefs>
+    <ds:schemaRef ds:uri="http://schemas.microsoft.com/sharepoint/v3/contenttype/forms"/>
+  </ds:schemaRefs>
+</ds:datastoreItem>
 </file>
 
-<file path=customXml/itemProps1.xml><?xml version="1.0" encoding="utf-8"?>
+<file path=customXml/itemProps3.xml><?xml version="1.0" encoding="utf-8"?>
 <ds:datastoreItem xmlns:ds="http://schemas.openxmlformats.org/officeDocument/2006/customXml" ds:itemID="{06E6923A-C221-4753-B75B-BA213EEB7564}">
   <ds:schemaRefs>
     <ds:schemaRef ds:uri="bc8ba18a-4a58-4ad2-bfc0-6516af8e7dc2"/>
@@ -39728,29 +42946,4 @@
     <ds:schemaRef ds:uri="http://www.w3.org/2001/XMLSchema"/>
   </ds:schemaRefs>
 </ds:datastoreItem>
-</file>
-
-<file path=customXml/itemProps2.xml><?xml version="1.0" encoding="utf-8"?>
-<ds:datastoreItem xmlns:ds="http://schemas.openxmlformats.org/officeDocument/2006/customXml" ds:itemID="{570928F0-D7CA-4732-B7F3-1F945720D0AA}">
-  <ds:schemaRefs>
-    <ds:schemaRef ds:uri="http://schemas.microsoft.com/sharepoint/v3/contenttype/forms"/>
-  </ds:schemaRefs>
-</ds:datastoreItem>
-</file>
-
-<file path=customXml/itemProps3.xml><?xml version="1.0" encoding="utf-8"?>
-<ds:datastoreItem xmlns:ds="http://schemas.openxmlformats.org/officeDocument/2006/customXml" ds:itemID="{4B629362-CF15-4610-8FAC-A8E699942233}">
-  <ds:schemaRefs>
-    <ds:schemaRef ds:uri="http://schemas.microsoft.com/office/2006/documentManagement/types"/>
-    <ds:schemaRef ds:uri="http://purl.org/dc/elements/1.1/"/>
-    <ds:schemaRef ds:uri="bc8ba18a-4a58-4ad2-bfc0-6516af8e7dc2"/>
-    <ds:schemaRef ds:uri="http://purl.org/dc/terms/"/>
-    <ds:schemaRef ds:uri="http://www.w3.org/XML/1998/namespace"/>
-    <ds:schemaRef ds:uri="http://schemas.microsoft.com/office/2006/metadata/properties"/>
-    <ds:schemaRef ds:uri="http://schemas.microsoft.com/office/infopath/2007/PartnerControls"/>
-    <ds:schemaRef ds:uri="http://schemas.openxmlformats.org/package/2006/metadata/core-properties"/>
-    <ds:schemaRef ds:uri="fa937df2-abe2-4d38-b5f4-c228acba3827"/>
-    <ds:schemaRef ds:uri="http://purl.org/dc/dcmitype/"/>
-  </ds:schemaRefs>
-</ds:datastoreItem>
 </file>
</xml_diff>

<commit_message>
Show the actual numbers as text labels.
</commit_message>
<xml_diff>
--- a/report-generator/src/report_generator/presets/templates/modernization.pptx
+++ b/report-generator/src/report_generator/presets/templates/modernization.pptx
@@ -485,7 +485,7 @@
           <a:lstStyle/>
           <a:p>
             <a:pPr>
-              <a:defRPr sz="1400" b="0" i="0" u="none" strike="noStrike" kern="1200" baseline="0">
+              <a:defRPr sz="1000" b="0" i="0" u="none" strike="noStrike" kern="1200" baseline="0">
                 <a:solidFill>
                   <a:schemeClr val="tx2"/>
                 </a:solidFill>
@@ -2052,7 +2052,7 @@
           <a:p>
             <a:fld id="{C1255C68-584F-174D-BB81-51BF91708794}" type="datetimeFigureOut">
               <a:rPr lang="en-US" smtClean="0"/>
-              <a:t>6/24/25</a:t>
+              <a:t>6/25/25</a:t>
             </a:fld>
             <a:endParaRPr lang="en-US"/>
           </a:p>
@@ -2229,7 +2229,7 @@
           <a:p>
             <a:fld id="{A1EDAAC4-819D-C544-9EA1-C73624CFD70B}" type="datetimeFigureOut">
               <a:rPr lang="en-US" smtClean="0"/>
-              <a:t>6/24/25</a:t>
+              <a:t>6/25/25</a:t>
             </a:fld>
             <a:endParaRPr lang="en-US"/>
           </a:p>
@@ -30901,8 +30901,8 @@
         </p:nvSpPr>
         <p:spPr>
           <a:xfrm>
-            <a:off x="4416786" y="2832540"/>
-            <a:ext cx="343768" cy="301667"/>
+            <a:off x="4399598" y="2832540"/>
+            <a:ext cx="378145" cy="301667"/>
           </a:xfrm>
           <a:custGeom>
             <a:avLst/>
@@ -30981,7 +30981,7 @@
             </a:pathLst>
           </a:custGeom>
           <a:solidFill>
-            <a:srgbClr val="F89B3C"/>
+            <a:srgbClr val="0066FF"/>
           </a:solidFill>
           <a:ln w="7263" cap="flat">
             <a:noFill/>
@@ -30990,13 +30990,14 @@
           </a:ln>
         </p:spPr>
         <p:txBody>
-          <a:bodyPr rtlCol="0" anchor="ctr"/>
+          <a:bodyPr lIns="0" rIns="0" rtlCol="0" anchor="ctr"/>
           <a:lstStyle/>
           <a:p>
+            <a:pPr algn="ctr"/>
             <a:r>
-              <a:rPr lang="en-US" sz="800">
-                <a:solidFill>
-                  <a:schemeClr val="tx2"/>
+              <a:rPr lang="en-US" sz="1000" b="1">
+                <a:solidFill>
+                  <a:srgbClr val="0066FF"/>
                 </a:solidFill>
               </a:rPr>
               <a:t>MARKER_MODERNIZATION_TECHNICAL_DEBT</a:t>
@@ -31154,8 +31155,8 @@
         </p:nvSpPr>
         <p:spPr>
           <a:xfrm>
-            <a:off x="4416786" y="3959256"/>
-            <a:ext cx="343768" cy="301667"/>
+            <a:off x="4399598" y="3959256"/>
+            <a:ext cx="378145" cy="301667"/>
           </a:xfrm>
           <a:custGeom>
             <a:avLst/>
@@ -31234,7 +31235,7 @@
             </a:pathLst>
           </a:custGeom>
           <a:solidFill>
-            <a:srgbClr val="DF6838"/>
+            <a:srgbClr val="0066FF"/>
           </a:solidFill>
           <a:ln w="7263" cap="flat">
             <a:noFill/>
@@ -31243,13 +31244,14 @@
           </a:ln>
         </p:spPr>
         <p:txBody>
-          <a:bodyPr rtlCol="0" anchor="ctr"/>
+          <a:bodyPr lIns="0" rIns="0" rtlCol="0" anchor="ctr"/>
           <a:lstStyle/>
           <a:p>
+            <a:pPr algn="ctr"/>
             <a:r>
-              <a:rPr lang="en-US" sz="800">
-                <a:solidFill>
-                  <a:schemeClr val="tx2"/>
+              <a:rPr lang="en-US" sz="1000" b="1">
+                <a:solidFill>
+                  <a:srgbClr val="0066FF"/>
                 </a:solidFill>
               </a:rPr>
               <a:t>MARKER_MODERNIZATION_SPEED</a:t>
@@ -31271,8 +31273,8 @@
         </p:nvSpPr>
         <p:spPr>
           <a:xfrm>
-            <a:off x="4416787" y="5144124"/>
-            <a:ext cx="343767" cy="301667"/>
+            <a:off x="4399598" y="5144124"/>
+            <a:ext cx="378144" cy="301667"/>
           </a:xfrm>
           <a:custGeom>
             <a:avLst/>
@@ -31351,7 +31353,7 @@
             </a:pathLst>
           </a:custGeom>
           <a:solidFill>
-            <a:srgbClr val="67E77F"/>
+            <a:srgbClr val="0066FF"/>
           </a:solidFill>
           <a:ln w="7263" cap="flat">
             <a:noFill/>
@@ -31360,13 +31362,14 @@
           </a:ln>
         </p:spPr>
         <p:txBody>
-          <a:bodyPr rtlCol="0" anchor="ctr"/>
+          <a:bodyPr lIns="0" rIns="0" rtlCol="0" anchor="ctr"/>
           <a:lstStyle/>
           <a:p>
+            <a:pPr algn="ctr"/>
             <a:r>
-              <a:rPr lang="en-US" sz="800">
-                <a:solidFill>
-                  <a:schemeClr val="tx2"/>
+              <a:rPr lang="en-US" sz="1000" b="1">
+                <a:solidFill>
+                  <a:srgbClr val="0066FF"/>
                 </a:solidFill>
               </a:rPr>
               <a:t>MARKER_MODERNIZATION_EFFORT</a:t>
@@ -32676,8 +32679,8 @@
         </p:nvSpPr>
         <p:spPr>
           <a:xfrm>
-            <a:off x="4416786" y="1595006"/>
-            <a:ext cx="343768" cy="301667"/>
+            <a:off x="4399598" y="1595006"/>
+            <a:ext cx="378145" cy="301667"/>
           </a:xfrm>
           <a:custGeom>
             <a:avLst/>
@@ -32756,7 +32759,7 @@
             </a:pathLst>
           </a:custGeom>
           <a:solidFill>
-            <a:srgbClr val="F89B3C"/>
+            <a:srgbClr val="0066FF"/>
           </a:solidFill>
           <a:ln w="7263" cap="flat">
             <a:noFill/>
@@ -32765,13 +32768,14 @@
           </a:ln>
         </p:spPr>
         <p:txBody>
-          <a:bodyPr rtlCol="0" anchor="ctr"/>
+          <a:bodyPr lIns="0" rIns="0" rtlCol="0" anchor="ctr"/>
           <a:lstStyle/>
           <a:p>
+            <a:pPr algn="ctr"/>
             <a:r>
-              <a:rPr lang="en-US" sz="800">
-                <a:solidFill>
-                  <a:schemeClr val="tx2"/>
+              <a:rPr lang="en-US" sz="1000" b="1">
+                <a:solidFill>
+                  <a:srgbClr val="0066FF"/>
                 </a:solidFill>
               </a:rPr>
               <a:t>MARKER_MODERNIZATION_VOLUME</a:t>
@@ -41038,7 +41042,7 @@
           <p:nvPr>
             <p:extLst>
               <p:ext uri="{D42A27DB-BD31-4B8C-83A1-F6EECF244321}">
-                <p14:modId xmlns:p14="http://schemas.microsoft.com/office/powerpoint/2010/main" val="3802377821"/>
+                <p14:modId xmlns:p14="http://schemas.microsoft.com/office/powerpoint/2010/main" val="1447979476"/>
               </p:ext>
             </p:extLst>
           </p:nvPr>

</xml_diff>